<commit_message>
Updated the slide deck with new talk flow
</commit_message>
<xml_diff>
--- a/slides/d3.pptx
+++ b/slides/d3.pptx
@@ -5,24 +5,19 @@
     <p:sldMasterId id="2147483696" r:id="rId1"/>
   </p:sldMasterIdLst>
   <p:notesMasterIdLst>
-    <p:notesMasterId r:id="rId17"/>
+    <p:notesMasterId r:id="rId12"/>
   </p:notesMasterIdLst>
   <p:sldIdLst>
     <p:sldId id="256" r:id="rId2"/>
-    <p:sldId id="257" r:id="rId3"/>
-    <p:sldId id="273" r:id="rId4"/>
-    <p:sldId id="275" r:id="rId5"/>
-    <p:sldId id="259" r:id="rId6"/>
-    <p:sldId id="274" r:id="rId7"/>
-    <p:sldId id="258" r:id="rId8"/>
-    <p:sldId id="260" r:id="rId9"/>
-    <p:sldId id="261" r:id="rId10"/>
-    <p:sldId id="262" r:id="rId11"/>
-    <p:sldId id="265" r:id="rId12"/>
-    <p:sldId id="266" r:id="rId13"/>
-    <p:sldId id="267" r:id="rId14"/>
-    <p:sldId id="263" r:id="rId15"/>
-    <p:sldId id="272" r:id="rId16"/>
+    <p:sldId id="277" r:id="rId3"/>
+    <p:sldId id="257" r:id="rId4"/>
+    <p:sldId id="273" r:id="rId5"/>
+    <p:sldId id="275" r:id="rId6"/>
+    <p:sldId id="259" r:id="rId7"/>
+    <p:sldId id="274" r:id="rId8"/>
+    <p:sldId id="258" r:id="rId9"/>
+    <p:sldId id="263" r:id="rId10"/>
+    <p:sldId id="272" r:id="rId11"/>
   </p:sldIdLst>
   <p:sldSz cx="12192000" cy="6858000"/>
   <p:notesSz cx="6858000" cy="9144000"/>
@@ -211,7 +206,7 @@
           <a:p>
             <a:fld id="{F2FD5E34-5871-4249-913E-D69CD2F5B120}" type="datetimeFigureOut">
               <a:rPr lang="en-US" smtClean="0"/>
-              <a:t>4/2/2014</a:t>
+              <a:t>7/21/2014</a:t>
             </a:fld>
             <a:endParaRPr lang="en-US"/>
           </a:p>
@@ -506,12 +501,7 @@
             <p:ph type="sldImg"/>
           </p:nvPr>
         </p:nvSpPr>
-        <p:spPr>
-          <a:xfrm>
-            <a:off x="685800" y="1143000"/>
-            <a:ext cx="5486400" cy="3086100"/>
-          </a:xfrm>
-        </p:spPr>
+        <p:spPr/>
       </p:sp>
       <p:sp>
         <p:nvSpPr>
@@ -528,48 +518,7 @@
           <a:bodyPr/>
           <a:lstStyle/>
           <a:p>
-            <a:r>
-              <a:rPr lang="en-US" dirty="0" smtClean="0"/>
-              <a:t>Goal</a:t>
-            </a:r>
-            <a:r>
-              <a:rPr lang="en-US" baseline="0" dirty="0" smtClean="0"/>
-              <a:t>: To show you how to add data visualizations to </a:t>
-            </a:r>
-            <a:r>
-              <a:rPr lang="en-US" baseline="0" dirty="0" err="1" smtClean="0"/>
-              <a:t>.net</a:t>
-            </a:r>
-            <a:r>
-              <a:rPr lang="en-US" baseline="0" dirty="0" smtClean="0"/>
-              <a:t> applications. </a:t>
-            </a:r>
-            <a:endParaRPr lang="en-US" dirty="0" smtClean="0"/>
-          </a:p>
-          <a:p>
-            <a:endParaRPr lang="en-US" dirty="0" smtClean="0"/>
-          </a:p>
-          <a:p>
-            <a:r>
-              <a:rPr lang="en-US" dirty="0" smtClean="0"/>
-              <a:t>Why?</a:t>
-            </a:r>
-            <a:r>
-              <a:rPr lang="en-US" baseline="0" dirty="0" smtClean="0"/>
-              <a:t> </a:t>
-            </a:r>
-          </a:p>
-          <a:p>
-            <a:r>
-              <a:rPr lang="en-US" baseline="0" dirty="0" smtClean="0"/>
-              <a:t>What? </a:t>
-            </a:r>
-          </a:p>
-          <a:p>
-            <a:r>
-              <a:rPr lang="en-US" baseline="0" dirty="0" smtClean="0"/>
-              <a:t>How? </a:t>
-            </a:r>
+            <a:endParaRPr lang="en-US" dirty="0"/>
           </a:p>
         </p:txBody>
       </p:sp>
@@ -599,588 +548,7 @@
     </p:spTree>
     <p:extLst>
       <p:ext uri="{BB962C8B-B14F-4D97-AF65-F5344CB8AC3E}">
-        <p14:creationId xmlns:p14="http://schemas.microsoft.com/office/powerpoint/2010/main" val="2127028354"/>
-      </p:ext>
-    </p:extLst>
-  </p:cSld>
-  <p:clrMapOvr>
-    <a:masterClrMapping/>
-  </p:clrMapOvr>
-</p:notes>
-</file>
-
-<file path=ppt/notesSlides/notesSlide10.xml><?xml version="1.0" encoding="utf-8"?>
-<p:notes xmlns:a="http://schemas.openxmlformats.org/drawingml/2006/main" xmlns:r="http://schemas.openxmlformats.org/officeDocument/2006/relationships" xmlns:p="http://schemas.openxmlformats.org/presentationml/2006/main">
-  <p:cSld>
-    <p:spTree>
-      <p:nvGrpSpPr>
-        <p:cNvPr id="1" name=""/>
-        <p:cNvGrpSpPr/>
-        <p:nvPr/>
-      </p:nvGrpSpPr>
-      <p:grpSpPr>
-        <a:xfrm>
-          <a:off x="0" y="0"/>
-          <a:ext cx="0" cy="0"/>
-          <a:chOff x="0" y="0"/>
-          <a:chExt cx="0" cy="0"/>
-        </a:xfrm>
-      </p:grpSpPr>
-      <p:sp>
-        <p:nvSpPr>
-          <p:cNvPr id="2" name="Slide Image Placeholder 1"/>
-          <p:cNvSpPr>
-            <a:spLocks noGrp="1" noRot="1" noChangeAspect="1"/>
-          </p:cNvSpPr>
-          <p:nvPr>
-            <p:ph type="sldImg"/>
-          </p:nvPr>
-        </p:nvSpPr>
-        <p:spPr>
-          <a:xfrm>
-            <a:off x="685800" y="1143000"/>
-            <a:ext cx="5486400" cy="3086100"/>
-          </a:xfrm>
-        </p:spPr>
-      </p:sp>
-      <p:sp>
-        <p:nvSpPr>
-          <p:cNvPr id="3" name="Notes Placeholder 2"/>
-          <p:cNvSpPr>
-            <a:spLocks noGrp="1"/>
-          </p:cNvSpPr>
-          <p:nvPr>
-            <p:ph type="body" idx="1"/>
-          </p:nvPr>
-        </p:nvSpPr>
-        <p:spPr/>
-        <p:txBody>
-          <a:bodyPr/>
-          <a:lstStyle/>
-          <a:p>
-            <a:r>
-              <a:rPr lang="en-US" dirty="0" smtClean="0"/>
-              <a:t>SVG = Scalable Vector</a:t>
-            </a:r>
-            <a:r>
-              <a:rPr lang="en-US" baseline="0" dirty="0" smtClean="0"/>
-              <a:t> Graphics</a:t>
-            </a:r>
-          </a:p>
-          <a:p>
-            <a:endParaRPr lang="en-US" baseline="0" dirty="0" smtClean="0"/>
-          </a:p>
-          <a:p>
-            <a:r>
-              <a:rPr lang="en-US" baseline="0" dirty="0" smtClean="0"/>
-              <a:t>Vector, math based as opposed to bitmap based like JPEG or PNG</a:t>
-            </a:r>
-          </a:p>
-          <a:p>
-            <a:r>
-              <a:rPr lang="en-US" baseline="0" dirty="0" smtClean="0"/>
-              <a:t>HTML Based</a:t>
-            </a:r>
-          </a:p>
-          <a:p>
-            <a:endParaRPr lang="en-US" baseline="0" dirty="0" smtClean="0"/>
-          </a:p>
-          <a:p>
-            <a:pPr marL="0" marR="0" indent="0" algn="l" defTabSz="914400" rtl="0" eaLnBrk="1" fontAlgn="auto" latinLnBrk="0" hangingPunct="1">
-              <a:lnSpc>
-                <a:spcPct val="100000"/>
-              </a:lnSpc>
-              <a:spcBef>
-                <a:spcPts val="0"/>
-              </a:spcBef>
-              <a:spcAft>
-                <a:spcPts val="0"/>
-              </a:spcAft>
-              <a:buClrTx/>
-              <a:buSzTx/>
-              <a:buFontTx/>
-              <a:buNone/>
-              <a:tabLst/>
-              <a:defRPr/>
-            </a:pPr>
-            <a:r>
-              <a:rPr lang="en-US" dirty="0" smtClean="0"/>
-              <a:t>There are several</a:t>
-            </a:r>
-            <a:r>
-              <a:rPr lang="en-US" baseline="0" dirty="0" smtClean="0"/>
-              <a:t> basic SVG shapes, including circles, ellipses, rectangles, and lines</a:t>
-            </a:r>
-          </a:p>
-          <a:p>
-            <a:pPr marL="0" indent="0">
-              <a:buFontTx/>
-              <a:buNone/>
-            </a:pPr>
-            <a:endParaRPr lang="en-US" baseline="0" dirty="0" smtClean="0"/>
-          </a:p>
-        </p:txBody>
-      </p:sp>
-      <p:sp>
-        <p:nvSpPr>
-          <p:cNvPr id="4" name="Slide Number Placeholder 3"/>
-          <p:cNvSpPr>
-            <a:spLocks noGrp="1"/>
-          </p:cNvSpPr>
-          <p:nvPr>
-            <p:ph type="sldNum" sz="quarter" idx="10"/>
-          </p:nvPr>
-        </p:nvSpPr>
-        <p:spPr/>
-        <p:txBody>
-          <a:bodyPr/>
-          <a:lstStyle/>
-          <a:p>
-            <a:fld id="{2CA6A022-9899-462F-AF11-091E7F58E280}" type="slidenum">
-              <a:rPr lang="en-US" smtClean="0"/>
-              <a:t>11</a:t>
-            </a:fld>
-            <a:endParaRPr lang="en-US"/>
-          </a:p>
-        </p:txBody>
-      </p:sp>
-    </p:spTree>
-    <p:extLst>
-      <p:ext uri="{BB962C8B-B14F-4D97-AF65-F5344CB8AC3E}">
-        <p14:creationId xmlns:p14="http://schemas.microsoft.com/office/powerpoint/2010/main" val="1967444448"/>
-      </p:ext>
-    </p:extLst>
-  </p:cSld>
-  <p:clrMapOvr>
-    <a:masterClrMapping/>
-  </p:clrMapOvr>
-</p:notes>
-</file>
-
-<file path=ppt/notesSlides/notesSlide11.xml><?xml version="1.0" encoding="utf-8"?>
-<p:notes xmlns:a="http://schemas.openxmlformats.org/drawingml/2006/main" xmlns:r="http://schemas.openxmlformats.org/officeDocument/2006/relationships" xmlns:p="http://schemas.openxmlformats.org/presentationml/2006/main">
-  <p:cSld>
-    <p:spTree>
-      <p:nvGrpSpPr>
-        <p:cNvPr id="1" name=""/>
-        <p:cNvGrpSpPr/>
-        <p:nvPr/>
-      </p:nvGrpSpPr>
-      <p:grpSpPr>
-        <a:xfrm>
-          <a:off x="0" y="0"/>
-          <a:ext cx="0" cy="0"/>
-          <a:chOff x="0" y="0"/>
-          <a:chExt cx="0" cy="0"/>
-        </a:xfrm>
-      </p:grpSpPr>
-      <p:sp>
-        <p:nvSpPr>
-          <p:cNvPr id="2" name="Slide Image Placeholder 1"/>
-          <p:cNvSpPr>
-            <a:spLocks noGrp="1" noRot="1" noChangeAspect="1"/>
-          </p:cNvSpPr>
-          <p:nvPr>
-            <p:ph type="sldImg"/>
-          </p:nvPr>
-        </p:nvSpPr>
-        <p:spPr>
-          <a:xfrm>
-            <a:off x="685800" y="1143000"/>
-            <a:ext cx="5486400" cy="3086100"/>
-          </a:xfrm>
-        </p:spPr>
-      </p:sp>
-      <p:sp>
-        <p:nvSpPr>
-          <p:cNvPr id="3" name="Notes Placeholder 2"/>
-          <p:cNvSpPr>
-            <a:spLocks noGrp="1"/>
-          </p:cNvSpPr>
-          <p:nvPr>
-            <p:ph type="body" idx="1"/>
-          </p:nvPr>
-        </p:nvSpPr>
-        <p:spPr/>
-        <p:txBody>
-          <a:bodyPr/>
-          <a:lstStyle/>
-          <a:p>
-            <a:endParaRPr lang="en-US" baseline="0" dirty="0" smtClean="0"/>
-          </a:p>
-          <a:p>
-            <a:r>
-              <a:rPr lang="en-US" baseline="0" dirty="0" smtClean="0"/>
-              <a:t>Circles have a center x, y and a radius</a:t>
-            </a:r>
-          </a:p>
-          <a:p>
-            <a:endParaRPr lang="en-US" dirty="0" smtClean="0"/>
-          </a:p>
-          <a:p>
-            <a:r>
-              <a:rPr lang="en-US" dirty="0" smtClean="0"/>
-              <a:t>SVG Concepts:</a:t>
-            </a:r>
-            <a:r>
-              <a:rPr lang="en-US" baseline="0" dirty="0" smtClean="0"/>
-              <a:t> </a:t>
-            </a:r>
-          </a:p>
-          <a:p>
-            <a:r>
-              <a:rPr lang="en-US" baseline="0" dirty="0" smtClean="0"/>
-              <a:t>It’s just XML (based)</a:t>
-            </a:r>
-            <a:endParaRPr lang="en-US" dirty="0"/>
-          </a:p>
-        </p:txBody>
-      </p:sp>
-      <p:sp>
-        <p:nvSpPr>
-          <p:cNvPr id="4" name="Slide Number Placeholder 3"/>
-          <p:cNvSpPr>
-            <a:spLocks noGrp="1"/>
-          </p:cNvSpPr>
-          <p:nvPr>
-            <p:ph type="sldNum" sz="quarter" idx="10"/>
-          </p:nvPr>
-        </p:nvSpPr>
-        <p:spPr/>
-        <p:txBody>
-          <a:bodyPr/>
-          <a:lstStyle/>
-          <a:p>
-            <a:fld id="{2CA6A022-9899-462F-AF11-091E7F58E280}" type="slidenum">
-              <a:rPr lang="en-US" smtClean="0"/>
-              <a:t>12</a:t>
-            </a:fld>
-            <a:endParaRPr lang="en-US"/>
-          </a:p>
-        </p:txBody>
-      </p:sp>
-    </p:spTree>
-    <p:extLst>
-      <p:ext uri="{BB962C8B-B14F-4D97-AF65-F5344CB8AC3E}">
-        <p14:creationId xmlns:p14="http://schemas.microsoft.com/office/powerpoint/2010/main" val="2161615869"/>
-      </p:ext>
-    </p:extLst>
-  </p:cSld>
-  <p:clrMapOvr>
-    <a:masterClrMapping/>
-  </p:clrMapOvr>
-</p:notes>
-</file>
-
-<file path=ppt/notesSlides/notesSlide12.xml><?xml version="1.0" encoding="utf-8"?>
-<p:notes xmlns:a="http://schemas.openxmlformats.org/drawingml/2006/main" xmlns:r="http://schemas.openxmlformats.org/officeDocument/2006/relationships" xmlns:p="http://schemas.openxmlformats.org/presentationml/2006/main">
-  <p:cSld>
-    <p:spTree>
-      <p:nvGrpSpPr>
-        <p:cNvPr id="1" name=""/>
-        <p:cNvGrpSpPr/>
-        <p:nvPr/>
-      </p:nvGrpSpPr>
-      <p:grpSpPr>
-        <a:xfrm>
-          <a:off x="0" y="0"/>
-          <a:ext cx="0" cy="0"/>
-          <a:chOff x="0" y="0"/>
-          <a:chExt cx="0" cy="0"/>
-        </a:xfrm>
-      </p:grpSpPr>
-      <p:sp>
-        <p:nvSpPr>
-          <p:cNvPr id="2" name="Slide Image Placeholder 1"/>
-          <p:cNvSpPr>
-            <a:spLocks noGrp="1" noRot="1" noChangeAspect="1"/>
-          </p:cNvSpPr>
-          <p:nvPr>
-            <p:ph type="sldImg"/>
-          </p:nvPr>
-        </p:nvSpPr>
-        <p:spPr>
-          <a:xfrm>
-            <a:off x="685800" y="1143000"/>
-            <a:ext cx="5486400" cy="3086100"/>
-          </a:xfrm>
-        </p:spPr>
-      </p:sp>
-      <p:sp>
-        <p:nvSpPr>
-          <p:cNvPr id="3" name="Notes Placeholder 2"/>
-          <p:cNvSpPr>
-            <a:spLocks noGrp="1"/>
-          </p:cNvSpPr>
-          <p:nvPr>
-            <p:ph type="body" idx="1"/>
-          </p:nvPr>
-        </p:nvSpPr>
-        <p:spPr/>
-        <p:txBody>
-          <a:bodyPr/>
-          <a:lstStyle/>
-          <a:p>
-            <a:r>
-              <a:rPr lang="en-US" dirty="0" err="1" smtClean="0"/>
-              <a:t>Rect</a:t>
-            </a:r>
-            <a:r>
-              <a:rPr lang="en-US" baseline="0" dirty="0" smtClean="0"/>
-              <a:t> – x, y, width, height</a:t>
-            </a:r>
-          </a:p>
-          <a:p>
-            <a:endParaRPr lang="en-US" baseline="0" dirty="0" smtClean="0"/>
-          </a:p>
-          <a:p>
-            <a:r>
-              <a:rPr lang="en-US" baseline="0" dirty="0" smtClean="0"/>
-              <a:t>SVG concepts</a:t>
-            </a:r>
-          </a:p>
-          <a:p>
-            <a:pPr marL="171450" indent="-171450">
-              <a:buFontTx/>
-              <a:buChar char="-"/>
-            </a:pPr>
-            <a:r>
-              <a:rPr lang="en-US" baseline="0" dirty="0" smtClean="0"/>
-              <a:t>Can apply classes</a:t>
-            </a:r>
-          </a:p>
-          <a:p>
-            <a:pPr marL="171450" indent="-171450">
-              <a:buFontTx/>
-              <a:buChar char="-"/>
-            </a:pPr>
-            <a:r>
-              <a:rPr lang="en-US" dirty="0" smtClean="0"/>
-              <a:t>Layering</a:t>
-            </a:r>
-            <a:r>
-              <a:rPr lang="en-US" baseline="0" dirty="0" smtClean="0"/>
-              <a:t> -&gt; no z-index</a:t>
-            </a:r>
-          </a:p>
-          <a:p>
-            <a:pPr marL="171450" indent="-171450">
-              <a:buFontTx/>
-              <a:buChar char="-"/>
-            </a:pPr>
-            <a:endParaRPr lang="en-US" dirty="0"/>
-          </a:p>
-        </p:txBody>
-      </p:sp>
-      <p:sp>
-        <p:nvSpPr>
-          <p:cNvPr id="4" name="Slide Number Placeholder 3"/>
-          <p:cNvSpPr>
-            <a:spLocks noGrp="1"/>
-          </p:cNvSpPr>
-          <p:nvPr>
-            <p:ph type="sldNum" sz="quarter" idx="10"/>
-          </p:nvPr>
-        </p:nvSpPr>
-        <p:spPr/>
-        <p:txBody>
-          <a:bodyPr/>
-          <a:lstStyle/>
-          <a:p>
-            <a:fld id="{2CA6A022-9899-462F-AF11-091E7F58E280}" type="slidenum">
-              <a:rPr lang="en-US" smtClean="0"/>
-              <a:t>13</a:t>
-            </a:fld>
-            <a:endParaRPr lang="en-US"/>
-          </a:p>
-        </p:txBody>
-      </p:sp>
-    </p:spTree>
-    <p:extLst>
-      <p:ext uri="{BB962C8B-B14F-4D97-AF65-F5344CB8AC3E}">
-        <p14:creationId xmlns:p14="http://schemas.microsoft.com/office/powerpoint/2010/main" val="4083622278"/>
-      </p:ext>
-    </p:extLst>
-  </p:cSld>
-  <p:clrMapOvr>
-    <a:masterClrMapping/>
-  </p:clrMapOvr>
-</p:notes>
-</file>
-
-<file path=ppt/notesSlides/notesSlide13.xml><?xml version="1.0" encoding="utf-8"?>
-<p:notes xmlns:a="http://schemas.openxmlformats.org/drawingml/2006/main" xmlns:r="http://schemas.openxmlformats.org/officeDocument/2006/relationships" xmlns:p="http://schemas.openxmlformats.org/presentationml/2006/main">
-  <p:cSld>
-    <p:spTree>
-      <p:nvGrpSpPr>
-        <p:cNvPr id="1" name=""/>
-        <p:cNvGrpSpPr/>
-        <p:nvPr/>
-      </p:nvGrpSpPr>
-      <p:grpSpPr>
-        <a:xfrm>
-          <a:off x="0" y="0"/>
-          <a:ext cx="0" cy="0"/>
-          <a:chOff x="0" y="0"/>
-          <a:chExt cx="0" cy="0"/>
-        </a:xfrm>
-      </p:grpSpPr>
-      <p:sp>
-        <p:nvSpPr>
-          <p:cNvPr id="2" name="Slide Image Placeholder 1"/>
-          <p:cNvSpPr>
-            <a:spLocks noGrp="1" noRot="1" noChangeAspect="1"/>
-          </p:cNvSpPr>
-          <p:nvPr>
-            <p:ph type="sldImg"/>
-          </p:nvPr>
-        </p:nvSpPr>
-        <p:spPr>
-          <a:xfrm>
-            <a:off x="685800" y="1143000"/>
-            <a:ext cx="5486400" cy="3086100"/>
-          </a:xfrm>
-        </p:spPr>
-      </p:sp>
-      <p:sp>
-        <p:nvSpPr>
-          <p:cNvPr id="3" name="Notes Placeholder 2"/>
-          <p:cNvSpPr>
-            <a:spLocks noGrp="1"/>
-          </p:cNvSpPr>
-          <p:nvPr>
-            <p:ph type="body" idx="1"/>
-          </p:nvPr>
-        </p:nvSpPr>
-        <p:spPr/>
-        <p:txBody>
-          <a:bodyPr/>
-          <a:lstStyle/>
-          <a:p>
-            <a:r>
-              <a:rPr lang="en-US" dirty="0" smtClean="0"/>
-              <a:t>Demo</a:t>
-            </a:r>
-            <a:endParaRPr lang="en-US" dirty="0"/>
-          </a:p>
-        </p:txBody>
-      </p:sp>
-      <p:sp>
-        <p:nvSpPr>
-          <p:cNvPr id="4" name="Slide Number Placeholder 3"/>
-          <p:cNvSpPr>
-            <a:spLocks noGrp="1"/>
-          </p:cNvSpPr>
-          <p:nvPr>
-            <p:ph type="sldNum" sz="quarter" idx="10"/>
-          </p:nvPr>
-        </p:nvSpPr>
-        <p:spPr/>
-        <p:txBody>
-          <a:bodyPr/>
-          <a:lstStyle/>
-          <a:p>
-            <a:fld id="{2CA6A022-9899-462F-AF11-091E7F58E280}" type="slidenum">
-              <a:rPr lang="en-US" smtClean="0"/>
-              <a:t>14</a:t>
-            </a:fld>
-            <a:endParaRPr lang="en-US"/>
-          </a:p>
-        </p:txBody>
-      </p:sp>
-    </p:spTree>
-    <p:extLst>
-      <p:ext uri="{BB962C8B-B14F-4D97-AF65-F5344CB8AC3E}">
-        <p14:creationId xmlns:p14="http://schemas.microsoft.com/office/powerpoint/2010/main" val="158761495"/>
-      </p:ext>
-    </p:extLst>
-  </p:cSld>
-  <p:clrMapOvr>
-    <a:masterClrMapping/>
-  </p:clrMapOvr>
-</p:notes>
-</file>
-
-<file path=ppt/notesSlides/notesSlide14.xml><?xml version="1.0" encoding="utf-8"?>
-<p:notes xmlns:a="http://schemas.openxmlformats.org/drawingml/2006/main" xmlns:r="http://schemas.openxmlformats.org/officeDocument/2006/relationships" xmlns:p="http://schemas.openxmlformats.org/presentationml/2006/main">
-  <p:cSld>
-    <p:spTree>
-      <p:nvGrpSpPr>
-        <p:cNvPr id="1" name=""/>
-        <p:cNvGrpSpPr/>
-        <p:nvPr/>
-      </p:nvGrpSpPr>
-      <p:grpSpPr>
-        <a:xfrm>
-          <a:off x="0" y="0"/>
-          <a:ext cx="0" cy="0"/>
-          <a:chOff x="0" y="0"/>
-          <a:chExt cx="0" cy="0"/>
-        </a:xfrm>
-      </p:grpSpPr>
-      <p:sp>
-        <p:nvSpPr>
-          <p:cNvPr id="2" name="Slide Image Placeholder 1"/>
-          <p:cNvSpPr>
-            <a:spLocks noGrp="1" noRot="1" noChangeAspect="1"/>
-          </p:cNvSpPr>
-          <p:nvPr>
-            <p:ph type="sldImg"/>
-          </p:nvPr>
-        </p:nvSpPr>
-        <p:spPr>
-          <a:xfrm>
-            <a:off x="685800" y="1143000"/>
-            <a:ext cx="5486400" cy="3086100"/>
-          </a:xfrm>
-        </p:spPr>
-      </p:sp>
-      <p:sp>
-        <p:nvSpPr>
-          <p:cNvPr id="3" name="Notes Placeholder 2"/>
-          <p:cNvSpPr>
-            <a:spLocks noGrp="1"/>
-          </p:cNvSpPr>
-          <p:nvPr>
-            <p:ph type="body" idx="1"/>
-          </p:nvPr>
-        </p:nvSpPr>
-        <p:spPr/>
-        <p:txBody>
-          <a:bodyPr/>
-          <a:lstStyle/>
-          <a:p>
-            <a:endParaRPr lang="en-US" dirty="0"/>
-          </a:p>
-        </p:txBody>
-      </p:sp>
-      <p:sp>
-        <p:nvSpPr>
-          <p:cNvPr id="4" name="Slide Number Placeholder 3"/>
-          <p:cNvSpPr>
-            <a:spLocks noGrp="1"/>
-          </p:cNvSpPr>
-          <p:nvPr>
-            <p:ph type="sldNum" sz="quarter" idx="10"/>
-          </p:nvPr>
-        </p:nvSpPr>
-        <p:spPr/>
-        <p:txBody>
-          <a:bodyPr/>
-          <a:lstStyle/>
-          <a:p>
-            <a:fld id="{2CA6A022-9899-462F-AF11-091E7F58E280}" type="slidenum">
-              <a:rPr lang="en-US" smtClean="0"/>
-              <a:t>15</a:t>
-            </a:fld>
-            <a:endParaRPr lang="en-US"/>
-          </a:p>
-        </p:txBody>
-      </p:sp>
-    </p:spTree>
-    <p:extLst>
-      <p:ext uri="{BB962C8B-B14F-4D97-AF65-F5344CB8AC3E}">
-        <p14:creationId xmlns:p14="http://schemas.microsoft.com/office/powerpoint/2010/main" val="694072251"/>
+        <p14:creationId xmlns:p14="http://schemas.microsoft.com/office/powerpoint/2010/main" val="1663577141"/>
       </p:ext>
     </p:extLst>
   </p:cSld>
@@ -1241,7 +609,29 @@
           <a:p>
             <a:r>
               <a:rPr lang="en-US" dirty="0" smtClean="0"/>
-              <a:t>Why not just use Excel?</a:t>
+              <a:t>Goal</a:t>
+            </a:r>
+            <a:r>
+              <a:rPr lang="en-US" baseline="0" dirty="0" smtClean="0"/>
+              <a:t>: To show you how to add data visualizations to </a:t>
+            </a:r>
+            <a:r>
+              <a:rPr lang="en-US" baseline="0" dirty="0" err="1" smtClean="0"/>
+              <a:t>.net</a:t>
+            </a:r>
+            <a:r>
+              <a:rPr lang="en-US" baseline="0" dirty="0" smtClean="0"/>
+              <a:t> applications. </a:t>
+            </a:r>
+            <a:endParaRPr lang="en-US" dirty="0" smtClean="0"/>
+          </a:p>
+          <a:p>
+            <a:endParaRPr lang="en-US" dirty="0" smtClean="0"/>
+          </a:p>
+          <a:p>
+            <a:r>
+              <a:rPr lang="en-US" dirty="0" smtClean="0"/>
+              <a:t>Why?</a:t>
             </a:r>
             <a:r>
               <a:rPr lang="en-US" baseline="0" dirty="0" smtClean="0"/>
@@ -1251,30 +641,14 @@
           <a:p>
             <a:r>
               <a:rPr lang="en-US" baseline="0" dirty="0" smtClean="0"/>
-              <a:t>…or stats? </a:t>
+              <a:t>What? </a:t>
             </a:r>
           </a:p>
           <a:p>
             <a:r>
               <a:rPr lang="en-US" baseline="0" dirty="0" smtClean="0"/>
-              <a:t>…numbers? </a:t>
-            </a:r>
-          </a:p>
-          <a:p>
-            <a:endParaRPr lang="en-US" baseline="0" dirty="0" smtClean="0"/>
-          </a:p>
-          <a:p>
-            <a:r>
-              <a:rPr lang="en-US" baseline="0" dirty="0" smtClean="0"/>
-              <a:t>- Numbers are more precise</a:t>
-            </a:r>
-          </a:p>
-          <a:p>
-            <a:r>
-              <a:rPr lang="en-US" baseline="0" dirty="0" smtClean="0"/>
-              <a:t>- Numbers are less prone to manipulation</a:t>
-            </a:r>
-            <a:endParaRPr lang="en-US" dirty="0"/>
+              <a:t>How? </a:t>
+            </a:r>
           </a:p>
         </p:txBody>
       </p:sp>
@@ -1304,7 +678,7 @@
     </p:spTree>
     <p:extLst>
       <p:ext uri="{BB962C8B-B14F-4D97-AF65-F5344CB8AC3E}">
-        <p14:creationId xmlns:p14="http://schemas.microsoft.com/office/powerpoint/2010/main" val="1713446858"/>
+        <p14:creationId xmlns:p14="http://schemas.microsoft.com/office/powerpoint/2010/main" val="2127028354"/>
       </p:ext>
     </p:extLst>
   </p:cSld>
@@ -1363,108 +737,42 @@
           <a:bodyPr/>
           <a:lstStyle/>
           <a:p>
-            <a:pPr marL="0" indent="0">
-              <a:buNone/>
-            </a:pPr>
+            <a:r>
+              <a:rPr lang="en-US" dirty="0" smtClean="0"/>
+              <a:t>Why not just use Excel?</a:t>
+            </a:r>
             <a:r>
               <a:rPr lang="en-US" baseline="0" dirty="0" smtClean="0"/>
-              <a:t>We can use visualization to provide context to otherwise hard to understand numbers. </a:t>
-            </a:r>
-          </a:p>
-          <a:p>
-            <a:pPr marL="228600" indent="-228600">
-              <a:buAutoNum type="arabicPeriod"/>
-            </a:pPr>
+              <a:t> </a:t>
+            </a:r>
+          </a:p>
+          <a:p>
+            <a:r>
+              <a:rPr lang="en-US" baseline="0" dirty="0" smtClean="0"/>
+              <a:t>…or stats? </a:t>
+            </a:r>
+          </a:p>
+          <a:p>
+            <a:r>
+              <a:rPr lang="en-US" baseline="0" dirty="0" smtClean="0"/>
+              <a:t>…numbers? </a:t>
+            </a:r>
+          </a:p>
+          <a:p>
             <a:endParaRPr lang="en-US" baseline="0" dirty="0" smtClean="0"/>
           </a:p>
           <a:p>
-            <a:pPr marL="228600" indent="-228600">
-              <a:buAutoNum type="arabicPeriod"/>
-            </a:pPr>
             <a:r>
               <a:rPr lang="en-US" baseline="0" dirty="0" smtClean="0"/>
-              <a:t>Increased conceptualization of large numbers</a:t>
-            </a:r>
-          </a:p>
-          <a:p>
-            <a:pPr marL="228600" indent="-228600">
-              <a:buAutoNum type="arabicPeriod"/>
-            </a:pPr>
+              <a:t>- Numbers are more precise</a:t>
+            </a:r>
+          </a:p>
+          <a:p>
             <a:r>
               <a:rPr lang="en-US" baseline="0" dirty="0" smtClean="0"/>
-              <a:t>Increased ability to digest large sets of data quickly</a:t>
-            </a:r>
-          </a:p>
-          <a:p>
-            <a:pPr marL="228600" indent="-228600">
-              <a:buAutoNum type="arabicPeriod"/>
-            </a:pPr>
-            <a:endParaRPr lang="en-US" baseline="0" dirty="0" smtClean="0"/>
-          </a:p>
-          <a:p>
-            <a:pPr marL="0" indent="0">
-              <a:buNone/>
-            </a:pPr>
-            <a:r>
-              <a:rPr lang="en-US" baseline="0" dirty="0" smtClean="0"/>
-              <a:t>Examples: </a:t>
-            </a:r>
-          </a:p>
-          <a:p>
-            <a:pPr marL="685800" lvl="1" indent="-228600">
-              <a:buAutoNum type="arabicPeriod"/>
-            </a:pPr>
-            <a:r>
-              <a:rPr lang="en-US" baseline="0" dirty="0" smtClean="0"/>
-              <a:t>National Budgets</a:t>
-            </a:r>
-          </a:p>
-          <a:p>
-            <a:pPr marL="685800" lvl="1" indent="-228600">
-              <a:buAutoNum type="arabicPeriod"/>
-            </a:pPr>
-            <a:r>
-              <a:rPr lang="en-US" baseline="0" dirty="0" smtClean="0"/>
-              <a:t>Planet Sizes</a:t>
-            </a:r>
-          </a:p>
-          <a:p>
-            <a:pPr marL="337500" lvl="1" indent="0">
-              <a:buNone/>
-            </a:pPr>
-            <a:endParaRPr lang="en-US" baseline="0" dirty="0" smtClean="0">
-              <a:hlinkClick r:id="rId3"/>
-            </a:endParaRPr>
-          </a:p>
-          <a:p>
-            <a:pPr marL="337500" lvl="1" indent="0">
-              <a:buNone/>
-            </a:pPr>
-            <a:r>
-              <a:rPr lang="en-US" dirty="0" smtClean="0">
-                <a:hlinkClick r:id="rId3"/>
-              </a:rPr>
-              <a:t>http://xkcd.com/980/huge</a:t>
-            </a:r>
-            <a:endParaRPr lang="en-US" dirty="0" smtClean="0"/>
-          </a:p>
-          <a:p>
-            <a:pPr marL="337500" lvl="1" indent="0">
-              <a:buNone/>
-            </a:pPr>
-            <a:r>
-              <a:rPr lang="en-US" dirty="0" smtClean="0">
-                <a:hlinkClick r:id="rId4"/>
-              </a:rPr>
-              <a:t>http://www.nytimes.com/interactive/2012/02/13/us/politics/2013-budget-proposal-graphic.html?_r=0</a:t>
-            </a:r>
-            <a:endParaRPr lang="en-US" dirty="0" smtClean="0"/>
-          </a:p>
-          <a:p>
-            <a:pPr marL="685800" lvl="1" indent="-228600">
-              <a:buAutoNum type="arabicPeriod"/>
-            </a:pPr>
-            <a:endParaRPr lang="en-US" baseline="0" dirty="0" smtClean="0"/>
+              <a:t>- Numbers are less prone to manipulation</a:t>
+            </a:r>
+            <a:endParaRPr lang="en-US" dirty="0"/>
           </a:p>
         </p:txBody>
       </p:sp>
@@ -1494,7 +802,7 @@
     </p:spTree>
     <p:extLst>
       <p:ext uri="{BB962C8B-B14F-4D97-AF65-F5344CB8AC3E}">
-        <p14:creationId xmlns:p14="http://schemas.microsoft.com/office/powerpoint/2010/main" val="1244309802"/>
+        <p14:creationId xmlns:p14="http://schemas.microsoft.com/office/powerpoint/2010/main" val="1713446858"/>
       </p:ext>
     </p:extLst>
   </p:cSld>
@@ -1557,22 +865,15 @@
               <a:buNone/>
             </a:pPr>
             <a:r>
-              <a:rPr lang="en-US" baseline="0" dirty="0" err="1" smtClean="0"/>
-              <a:t>Gapminder</a:t>
-            </a:r>
-            <a:r>
               <a:rPr lang="en-US" baseline="0" dirty="0" smtClean="0"/>
-              <a:t> Data stories:</a:t>
+              <a:t>We can use visualization to provide context to otherwise hard to understand numbers. </a:t>
             </a:r>
           </a:p>
           <a:p>
             <a:pPr marL="228600" indent="-228600">
               <a:buAutoNum type="arabicPeriod"/>
             </a:pPr>
-            <a:r>
-              <a:rPr lang="en-US" baseline="0" dirty="0" smtClean="0"/>
-              <a:t>200 years ago, everyone was poor, most people lived very short lives</a:t>
-            </a:r>
+            <a:endParaRPr lang="en-US" baseline="0" dirty="0" smtClean="0"/>
           </a:p>
           <a:p>
             <a:pPr marL="228600" indent="-228600">
@@ -1580,7 +881,7 @@
             </a:pPr>
             <a:r>
               <a:rPr lang="en-US" baseline="0" dirty="0" smtClean="0"/>
-              <a:t>1800 – 1900 Major industrial powers like US, UK, Germany and France started gaining wealth, but most people were still poor and lived short lives</a:t>
+              <a:t>Increased conceptualization of large numbers</a:t>
             </a:r>
           </a:p>
           <a:p>
@@ -1589,26 +890,73 @@
             </a:pPr>
             <a:r>
               <a:rPr lang="en-US" baseline="0" dirty="0" smtClean="0"/>
-              <a:t>1900-1950 Industrial nations (Japan, US, Western Europe) had massive increases in both wealth and life expectancy</a:t>
+              <a:t>Increased ability to digest large sets of data quickly</a:t>
             </a:r>
           </a:p>
           <a:p>
             <a:pPr marL="228600" indent="-228600">
               <a:buAutoNum type="arabicPeriod"/>
             </a:pPr>
+            <a:endParaRPr lang="en-US" baseline="0" dirty="0" smtClean="0"/>
+          </a:p>
+          <a:p>
+            <a:pPr marL="0" indent="0">
+              <a:buNone/>
+            </a:pPr>
             <a:r>
               <a:rPr lang="en-US" baseline="0" dirty="0" smtClean="0"/>
-              <a:t>1950-1980 Even though many countries were still poor, they had massive gains in life expectancy (the opposite of the industrialized nations, who got rich and then got healthy)</a:t>
-            </a:r>
-          </a:p>
-          <a:p>
-            <a:pPr marL="228600" indent="-228600">
+              <a:t>Examples: </a:t>
+            </a:r>
+          </a:p>
+          <a:p>
+            <a:pPr marL="685800" lvl="1" indent="-228600">
               <a:buAutoNum type="arabicPeriod"/>
             </a:pPr>
             <a:r>
               <a:rPr lang="en-US" baseline="0" dirty="0" smtClean="0"/>
-              <a:t>1980-Present India, China, and the rest of the world starts to gain wealth</a:t>
-            </a:r>
+              <a:t>National Budgets</a:t>
+            </a:r>
+          </a:p>
+          <a:p>
+            <a:pPr marL="685800" lvl="1" indent="-228600">
+              <a:buAutoNum type="arabicPeriod"/>
+            </a:pPr>
+            <a:r>
+              <a:rPr lang="en-US" baseline="0" dirty="0" smtClean="0"/>
+              <a:t>Planet Sizes</a:t>
+            </a:r>
+          </a:p>
+          <a:p>
+            <a:pPr marL="337500" lvl="1" indent="0">
+              <a:buNone/>
+            </a:pPr>
+            <a:endParaRPr lang="en-US" baseline="0" dirty="0" smtClean="0">
+              <a:hlinkClick r:id="rId3"/>
+            </a:endParaRPr>
+          </a:p>
+          <a:p>
+            <a:pPr marL="337500" lvl="1" indent="0">
+              <a:buNone/>
+            </a:pPr>
+            <a:r>
+              <a:rPr lang="en-US" dirty="0" smtClean="0">
+                <a:hlinkClick r:id="rId3"/>
+              </a:rPr>
+              <a:t>http://xkcd.com/980/huge</a:t>
+            </a:r>
+            <a:endParaRPr lang="en-US" dirty="0" smtClean="0"/>
+          </a:p>
+          <a:p>
+            <a:pPr marL="337500" lvl="1" indent="0">
+              <a:buNone/>
+            </a:pPr>
+            <a:r>
+              <a:rPr lang="en-US" dirty="0" smtClean="0">
+                <a:hlinkClick r:id="rId4"/>
+              </a:rPr>
+              <a:t>http://www.nytimes.com/interactive/2012/02/13/us/politics/2013-budget-proposal-graphic.html?_r=0</a:t>
+            </a:r>
+            <a:endParaRPr lang="en-US" dirty="0" smtClean="0"/>
           </a:p>
           <a:p>
             <a:pPr marL="685800" lvl="1" indent="-228600">
@@ -1616,142 +964,6 @@
             </a:pPr>
             <a:endParaRPr lang="en-US" baseline="0" dirty="0" smtClean="0"/>
           </a:p>
-          <a:p>
-            <a:pPr marL="685800" lvl="1" indent="-228600">
-              <a:buAutoNum type="arabicPeriod"/>
-            </a:pPr>
-            <a:endParaRPr lang="en-US" baseline="0" dirty="0" smtClean="0"/>
-          </a:p>
-          <a:p>
-            <a:pPr marL="27675" indent="0">
-              <a:buNone/>
-            </a:pPr>
-            <a:r>
-              <a:rPr lang="en-US" sz="1200" dirty="0" smtClean="0">
-                <a:hlinkClick r:id="rId3"/>
-              </a:rPr>
-              <a:t>http://bost.ocks.org/mike/nations/</a:t>
-            </a:r>
-            <a:endParaRPr lang="en-US" sz="1200" dirty="0" smtClean="0"/>
-          </a:p>
-          <a:p>
-            <a:pPr marL="27675" indent="0">
-              <a:buNone/>
-            </a:pPr>
-            <a:endParaRPr lang="en-US" sz="1200" dirty="0" smtClean="0"/>
-          </a:p>
-          <a:p>
-            <a:endParaRPr lang="en-US" baseline="0" dirty="0" smtClean="0"/>
-          </a:p>
-          <a:p>
-            <a:r>
-              <a:rPr lang="en-US" baseline="0" dirty="0" smtClean="0"/>
-              <a:t>Examples: </a:t>
-            </a:r>
-          </a:p>
-          <a:p>
-            <a:r>
-              <a:rPr lang="en-US" baseline="0" dirty="0" smtClean="0"/>
-              <a:t>http://xkcd.com/980/huge</a:t>
-            </a:r>
-          </a:p>
-          <a:p>
-            <a:r>
-              <a:rPr lang="en-US" baseline="0" dirty="0" smtClean="0"/>
-              <a:t>- Money from 1$ to National Budget</a:t>
-            </a:r>
-          </a:p>
-          <a:p>
-            <a:endParaRPr lang="en-US" baseline="0" dirty="0" smtClean="0"/>
-          </a:p>
-          <a:p>
-            <a:r>
-              <a:rPr lang="en-US" baseline="0" dirty="0" smtClean="0"/>
-              <a:t>http://bost.ocks.org/mike/nations/</a:t>
-            </a:r>
-          </a:p>
-          <a:p>
-            <a:pPr marL="171450" indent="-171450">
-              <a:buFontTx/>
-              <a:buChar char="-"/>
-            </a:pPr>
-            <a:r>
-              <a:rPr lang="en-US" baseline="0" dirty="0" smtClean="0"/>
-              <a:t>D3 representation of </a:t>
-            </a:r>
-            <a:r>
-              <a:rPr lang="en-US" baseline="0" dirty="0" err="1" smtClean="0"/>
-              <a:t>Gapminder</a:t>
-            </a:r>
-            <a:r>
-              <a:rPr lang="en-US" baseline="0" dirty="0" smtClean="0"/>
-              <a:t> data</a:t>
-            </a:r>
-          </a:p>
-          <a:p>
-            <a:pPr marL="171450" indent="-171450">
-              <a:buFontTx/>
-              <a:buChar char="-"/>
-            </a:pPr>
-            <a:endParaRPr lang="en-US" baseline="0" dirty="0" smtClean="0"/>
-          </a:p>
-          <a:p>
-            <a:pPr marL="171450" indent="-171450">
-              <a:buFontTx/>
-              <a:buChar char="-"/>
-            </a:pPr>
-            <a:r>
-              <a:rPr lang="en-US" baseline="0" dirty="0" smtClean="0"/>
-              <a:t>200 years that changed the world (</a:t>
-            </a:r>
-            <a:r>
-              <a:rPr lang="en-US" baseline="0" dirty="0" err="1" smtClean="0"/>
-              <a:t>Gapminder</a:t>
-            </a:r>
-            <a:r>
-              <a:rPr lang="en-US" baseline="0" dirty="0" smtClean="0"/>
-              <a:t>)</a:t>
-            </a:r>
-          </a:p>
-          <a:p>
-            <a:pPr marL="0" indent="0">
-              <a:buFontTx/>
-              <a:buNone/>
-            </a:pPr>
-            <a:r>
-              <a:rPr lang="en-US" baseline="0" dirty="0" smtClean="0"/>
-              <a:t>www.bit.ly/c6ItL7</a:t>
-            </a:r>
-          </a:p>
-          <a:p>
-            <a:pPr marL="171450" indent="-171450">
-              <a:buFontTx/>
-              <a:buChar char="-"/>
-            </a:pPr>
-            <a:endParaRPr lang="en-US" baseline="0" dirty="0" smtClean="0"/>
-          </a:p>
-          <a:p>
-            <a:pPr marL="0" indent="0">
-              <a:buFontTx/>
-              <a:buNone/>
-            </a:pPr>
-            <a:r>
-              <a:rPr lang="en-US" baseline="0" dirty="0" smtClean="0"/>
-              <a:t>Additional Representations</a:t>
-            </a:r>
-          </a:p>
-          <a:p>
-            <a:r>
-              <a:rPr lang="en-US" baseline="0" dirty="0" smtClean="0"/>
-              <a:t>-  https://github.com/mbostock/d3/wiki/Gallery</a:t>
-            </a:r>
-          </a:p>
-          <a:p>
-            <a:endParaRPr lang="en-US" baseline="0" dirty="0" smtClean="0"/>
-          </a:p>
-          <a:p>
-            <a:endParaRPr lang="en-US" dirty="0"/>
-          </a:p>
         </p:txBody>
       </p:sp>
       <p:sp>
@@ -1780,7 +992,7 @@
     </p:spTree>
     <p:extLst>
       <p:ext uri="{BB962C8B-B14F-4D97-AF65-F5344CB8AC3E}">
-        <p14:creationId xmlns:p14="http://schemas.microsoft.com/office/powerpoint/2010/main" val="1345226008"/>
+        <p14:creationId xmlns:p14="http://schemas.microsoft.com/office/powerpoint/2010/main" val="1244309802"/>
       </p:ext>
     </p:extLst>
   </p:cSld>
@@ -1839,46 +1051,197 @@
           <a:bodyPr/>
           <a:lstStyle/>
           <a:p>
+            <a:pPr marL="0" indent="0">
+              <a:buNone/>
+            </a:pPr>
             <a:r>
               <a:rPr lang="en-US" baseline="0" dirty="0" err="1" smtClean="0"/>
-              <a:t>Github</a:t>
-            </a:r>
+              <a:t>Gapminder</a:t>
+            </a:r>
+            <a:r>
+              <a:rPr lang="en-US" baseline="0" dirty="0" smtClean="0"/>
+              <a:t> Data stories:</a:t>
+            </a:r>
+          </a:p>
+          <a:p>
+            <a:pPr marL="228600" indent="-228600">
+              <a:buAutoNum type="arabicPeriod"/>
+            </a:pPr>
+            <a:r>
+              <a:rPr lang="en-US" baseline="0" dirty="0" smtClean="0"/>
+              <a:t>200 years ago, everyone was poor, most people lived very short lives</a:t>
+            </a:r>
+          </a:p>
+          <a:p>
+            <a:pPr marL="228600" indent="-228600">
+              <a:buAutoNum type="arabicPeriod"/>
+            </a:pPr>
+            <a:r>
+              <a:rPr lang="en-US" baseline="0" dirty="0" smtClean="0"/>
+              <a:t>1800 – 1900 Major industrial powers like US, UK, Germany and France started gaining wealth, but most people were still poor and lived short lives</a:t>
+            </a:r>
+          </a:p>
+          <a:p>
+            <a:pPr marL="228600" indent="-228600">
+              <a:buAutoNum type="arabicPeriod"/>
+            </a:pPr>
+            <a:r>
+              <a:rPr lang="en-US" baseline="0" dirty="0" smtClean="0"/>
+              <a:t>1900-1950 Industrial nations (Japan, US, Western Europe) had massive increases in both wealth and life expectancy</a:t>
+            </a:r>
+          </a:p>
+          <a:p>
+            <a:pPr marL="228600" indent="-228600">
+              <a:buAutoNum type="arabicPeriod"/>
+            </a:pPr>
+            <a:r>
+              <a:rPr lang="en-US" baseline="0" dirty="0" smtClean="0"/>
+              <a:t>1950-1980 Even though many countries were still poor, they had massive gains in life expectancy (the opposite of the industrialized nations, who got rich and then got healthy)</a:t>
+            </a:r>
+          </a:p>
+          <a:p>
+            <a:pPr marL="228600" indent="-228600">
+              <a:buAutoNum type="arabicPeriod"/>
+            </a:pPr>
+            <a:r>
+              <a:rPr lang="en-US" baseline="0" dirty="0" smtClean="0"/>
+              <a:t>1980-Present India, China, and the rest of the world starts to gain wealth</a:t>
+            </a:r>
+          </a:p>
+          <a:p>
+            <a:pPr marL="685800" lvl="1" indent="-228600">
+              <a:buAutoNum type="arabicPeriod"/>
+            </a:pPr>
             <a:endParaRPr lang="en-US" baseline="0" dirty="0" smtClean="0"/>
           </a:p>
           <a:p>
-            <a:pPr marL="0" marR="0" indent="0" algn="l" defTabSz="914400" rtl="0" eaLnBrk="1" fontAlgn="auto" latinLnBrk="0" hangingPunct="1">
-              <a:lnSpc>
-                <a:spcPct val="100000"/>
-              </a:lnSpc>
-              <a:spcBef>
-                <a:spcPts val="0"/>
-              </a:spcBef>
-              <a:spcAft>
-                <a:spcPts val="0"/>
-              </a:spcAft>
-              <a:buClrTx/>
-              <a:buSzTx/>
+            <a:pPr marL="685800" lvl="1" indent="-228600">
+              <a:buAutoNum type="arabicPeriod"/>
+            </a:pPr>
+            <a:endParaRPr lang="en-US" baseline="0" dirty="0" smtClean="0"/>
+          </a:p>
+          <a:p>
+            <a:pPr marL="27675" indent="0">
+              <a:buNone/>
+            </a:pPr>
+            <a:r>
+              <a:rPr lang="en-US" sz="1200" dirty="0" smtClean="0">
+                <a:hlinkClick r:id="rId3"/>
+              </a:rPr>
+              <a:t>http://bost.ocks.org/mike/nations/</a:t>
+            </a:r>
+            <a:endParaRPr lang="en-US" sz="1200" dirty="0" smtClean="0"/>
+          </a:p>
+          <a:p>
+            <a:pPr marL="27675" indent="0">
+              <a:buNone/>
+            </a:pPr>
+            <a:endParaRPr lang="en-US" sz="1200" dirty="0" smtClean="0"/>
+          </a:p>
+          <a:p>
+            <a:endParaRPr lang="en-US" baseline="0" dirty="0" smtClean="0"/>
+          </a:p>
+          <a:p>
+            <a:r>
+              <a:rPr lang="en-US" baseline="0" dirty="0" smtClean="0"/>
+              <a:t>Examples: </a:t>
+            </a:r>
+          </a:p>
+          <a:p>
+            <a:r>
+              <a:rPr lang="en-US" baseline="0" dirty="0" smtClean="0"/>
+              <a:t>http://xkcd.com/980/huge</a:t>
+            </a:r>
+          </a:p>
+          <a:p>
+            <a:r>
+              <a:rPr lang="en-US" baseline="0" dirty="0" smtClean="0"/>
+              <a:t>- Money from 1$ to National Budget</a:t>
+            </a:r>
+          </a:p>
+          <a:p>
+            <a:endParaRPr lang="en-US" baseline="0" dirty="0" smtClean="0"/>
+          </a:p>
+          <a:p>
+            <a:r>
+              <a:rPr lang="en-US" baseline="0" dirty="0" smtClean="0"/>
+              <a:t>http://bost.ocks.org/mike/nations/</a:t>
+            </a:r>
+          </a:p>
+          <a:p>
+            <a:pPr marL="171450" indent="-171450">
               <a:buFontTx/>
-              <a:buNone/>
-              <a:tabLst/>
-              <a:defRPr/>
+              <a:buChar char="-"/>
             </a:pPr>
             <a:r>
               <a:rPr lang="en-US" baseline="0" dirty="0" smtClean="0"/>
-              <a:t>Khan Academy</a:t>
-            </a:r>
-            <a:endParaRPr lang="en-US" dirty="0" smtClean="0"/>
-          </a:p>
-          <a:p>
-            <a:r>
-              <a:rPr lang="en-US" dirty="0" smtClean="0"/>
-              <a:t>Mint</a:t>
-            </a:r>
-          </a:p>
-          <a:p>
+              <a:t>D3 representation of </a:t>
+            </a:r>
+            <a:r>
+              <a:rPr lang="en-US" baseline="0" dirty="0" err="1" smtClean="0"/>
+              <a:t>Gapminder</a:t>
+            </a:r>
             <a:r>
               <a:rPr lang="en-US" baseline="0" dirty="0" smtClean="0"/>
-              <a:t>https://www.mint.com/how-it-works/graphs/</a:t>
+              <a:t> data</a:t>
+            </a:r>
+          </a:p>
+          <a:p>
+            <a:pPr marL="171450" indent="-171450">
+              <a:buFontTx/>
+              <a:buChar char="-"/>
+            </a:pPr>
+            <a:endParaRPr lang="en-US" baseline="0" dirty="0" smtClean="0"/>
+          </a:p>
+          <a:p>
+            <a:pPr marL="171450" indent="-171450">
+              <a:buFontTx/>
+              <a:buChar char="-"/>
+            </a:pPr>
+            <a:r>
+              <a:rPr lang="en-US" baseline="0" dirty="0" smtClean="0"/>
+              <a:t>200 years that changed the world (</a:t>
+            </a:r>
+            <a:r>
+              <a:rPr lang="en-US" baseline="0" dirty="0" err="1" smtClean="0"/>
+              <a:t>Gapminder</a:t>
+            </a:r>
+            <a:r>
+              <a:rPr lang="en-US" baseline="0" dirty="0" smtClean="0"/>
+              <a:t>)</a:t>
+            </a:r>
+          </a:p>
+          <a:p>
+            <a:pPr marL="0" indent="0">
+              <a:buFontTx/>
+              <a:buNone/>
+            </a:pPr>
+            <a:r>
+              <a:rPr lang="en-US" baseline="0" dirty="0" smtClean="0"/>
+              <a:t>www.bit.ly/c6ItL7</a:t>
+            </a:r>
+          </a:p>
+          <a:p>
+            <a:pPr marL="171450" indent="-171450">
+              <a:buFontTx/>
+              <a:buChar char="-"/>
+            </a:pPr>
+            <a:endParaRPr lang="en-US" baseline="0" dirty="0" smtClean="0"/>
+          </a:p>
+          <a:p>
+            <a:pPr marL="0" indent="0">
+              <a:buFontTx/>
+              <a:buNone/>
+            </a:pPr>
+            <a:r>
+              <a:rPr lang="en-US" baseline="0" dirty="0" smtClean="0"/>
+              <a:t>Additional Representations</a:t>
+            </a:r>
+          </a:p>
+          <a:p>
+            <a:r>
+              <a:rPr lang="en-US" baseline="0" dirty="0" smtClean="0"/>
+              <a:t>-  https://github.com/mbostock/d3/wiki/Gallery</a:t>
             </a:r>
           </a:p>
           <a:p>
@@ -1915,7 +1278,7 @@
     </p:spTree>
     <p:extLst>
       <p:ext uri="{BB962C8B-B14F-4D97-AF65-F5344CB8AC3E}">
-        <p14:creationId xmlns:p14="http://schemas.microsoft.com/office/powerpoint/2010/main" val="2874735513"/>
+        <p14:creationId xmlns:p14="http://schemas.microsoft.com/office/powerpoint/2010/main" val="1345226008"/>
       </p:ext>
     </p:extLst>
   </p:cSld>
@@ -1975,313 +1338,49 @@
           <a:lstStyle/>
           <a:p>
             <a:r>
+              <a:rPr lang="en-US" baseline="0" dirty="0" err="1" smtClean="0"/>
+              <a:t>Github</a:t>
+            </a:r>
+            <a:endParaRPr lang="en-US" baseline="0" dirty="0" smtClean="0"/>
+          </a:p>
+          <a:p>
+            <a:pPr marL="0" marR="0" indent="0" algn="l" defTabSz="914400" rtl="0" eaLnBrk="1" fontAlgn="auto" latinLnBrk="0" hangingPunct="1">
+              <a:lnSpc>
+                <a:spcPct val="100000"/>
+              </a:lnSpc>
+              <a:spcBef>
+                <a:spcPts val="0"/>
+              </a:spcBef>
+              <a:spcAft>
+                <a:spcPts val="0"/>
+              </a:spcAft>
+              <a:buClrTx/>
+              <a:buSzTx/>
+              <a:buFontTx/>
+              <a:buNone/>
+              <a:tabLst/>
+              <a:defRPr/>
+            </a:pPr>
+            <a:r>
+              <a:rPr lang="en-US" baseline="0" dirty="0" smtClean="0"/>
+              <a:t>Khan Academy</a:t>
+            </a:r>
+            <a:endParaRPr lang="en-US" dirty="0" smtClean="0"/>
+          </a:p>
+          <a:p>
+            <a:r>
               <a:rPr lang="en-US" dirty="0" smtClean="0"/>
-              <a:t>The amount of data available</a:t>
-            </a:r>
+              <a:t>Mint</a:t>
+            </a:r>
+          </a:p>
+          <a:p>
             <a:r>
               <a:rPr lang="en-US" baseline="0" dirty="0" smtClean="0"/>
-              <a:t> to humanity is huge. </a:t>
+              <a:t>https://www.mint.com/how-it-works/graphs/</a:t>
             </a:r>
           </a:p>
           <a:p>
             <a:endParaRPr lang="en-US" baseline="0" dirty="0" smtClean="0"/>
-          </a:p>
-          <a:p>
-            <a:pPr marL="171450" indent="-171450">
-              <a:buFontTx/>
-              <a:buChar char="-"/>
-            </a:pPr>
-            <a:r>
-              <a:rPr lang="en-US" baseline="0" dirty="0" smtClean="0"/>
-              <a:t>Eric Schmidt claims that we are creating as much data in two days as humanity has created up until 2003</a:t>
-            </a:r>
-          </a:p>
-          <a:p>
-            <a:pPr marL="171450" indent="-171450">
-              <a:buFontTx/>
-              <a:buChar char="-"/>
-            </a:pPr>
-            <a:r>
-              <a:rPr lang="en-US" baseline="0" dirty="0" smtClean="0"/>
-              <a:t>IBM claims that we create 2.5 Quintillion Bytes of data every day</a:t>
-            </a:r>
-          </a:p>
-          <a:p>
-            <a:pPr marL="171450" indent="-171450">
-              <a:buFontTx/>
-              <a:buChar char="-"/>
-            </a:pPr>
-            <a:r>
-              <a:rPr lang="en-US" sz="1200" b="0" i="0" kern="1200" dirty="0" smtClean="0">
-                <a:solidFill>
-                  <a:schemeClr val="tx1"/>
-                </a:solidFill>
-                <a:effectLst/>
-                <a:latin typeface="+mn-lt"/>
-                <a:ea typeface="+mn-ea"/>
-                <a:cs typeface="+mn-cs"/>
-              </a:rPr>
-              <a:t>SINTEF </a:t>
-            </a:r>
-            <a:r>
-              <a:rPr lang="en-US" dirty="0" smtClean="0"/>
-              <a:t>claims that 90%</a:t>
-            </a:r>
-            <a:r>
-              <a:rPr lang="en-US" baseline="0" dirty="0" smtClean="0"/>
-              <a:t> of the our current data was created in the last two years</a:t>
-            </a:r>
-          </a:p>
-          <a:p>
-            <a:pPr marL="171450" indent="-171450">
-              <a:buFontTx/>
-              <a:buChar char="-"/>
-            </a:pPr>
-            <a:endParaRPr lang="en-US" baseline="0" dirty="0" smtClean="0"/>
-          </a:p>
-          <a:p>
-            <a:pPr marL="171450" indent="-171450">
-              <a:buFontTx/>
-              <a:buChar char="-"/>
-            </a:pPr>
-            <a:r>
-              <a:rPr lang="en-US" baseline="0" dirty="0" smtClean="0"/>
-              <a:t>Governments and research organizations are opening up their data sets</a:t>
-            </a:r>
-          </a:p>
-          <a:p>
-            <a:r>
-              <a:rPr lang="en-US" sz="1200" b="0" i="0" kern="1200" dirty="0" smtClean="0">
-                <a:solidFill>
-                  <a:schemeClr val="tx1"/>
-                </a:solidFill>
-                <a:effectLst/>
-                <a:latin typeface="+mn-lt"/>
-                <a:ea typeface="+mn-ea"/>
-                <a:cs typeface="+mn-cs"/>
-                <a:hlinkClick r:id="rId3"/>
-              </a:rPr>
-              <a:t>http://www.data.gov/education/</a:t>
-            </a:r>
-            <a:endParaRPr lang="en-US" sz="1200" b="0" i="0" kern="1200" dirty="0" smtClean="0">
-              <a:solidFill>
-                <a:schemeClr val="tx1"/>
-              </a:solidFill>
-              <a:effectLst/>
-              <a:latin typeface="+mn-lt"/>
-              <a:ea typeface="+mn-ea"/>
-              <a:cs typeface="+mn-cs"/>
-            </a:endParaRPr>
-          </a:p>
-          <a:p>
-            <a:r>
-              <a:rPr lang="en-US" sz="1200" b="0" i="0" kern="1200" dirty="0" smtClean="0">
-                <a:solidFill>
-                  <a:schemeClr val="tx1"/>
-                </a:solidFill>
-                <a:effectLst/>
-                <a:latin typeface="+mn-lt"/>
-                <a:ea typeface="+mn-ea"/>
-                <a:cs typeface="+mn-cs"/>
-                <a:hlinkClick r:id="rId4"/>
-              </a:rPr>
-              <a:t>http://www.census.gov/</a:t>
-            </a:r>
-            <a:endParaRPr lang="en-US" sz="1200" b="0" i="0" kern="1200" dirty="0" smtClean="0">
-              <a:solidFill>
-                <a:schemeClr val="tx1"/>
-              </a:solidFill>
-              <a:effectLst/>
-              <a:latin typeface="+mn-lt"/>
-              <a:ea typeface="+mn-ea"/>
-              <a:cs typeface="+mn-cs"/>
-            </a:endParaRPr>
-          </a:p>
-          <a:p>
-            <a:r>
-              <a:rPr lang="en-US" sz="1200" b="0" i="0" kern="1200" dirty="0" smtClean="0">
-                <a:solidFill>
-                  <a:schemeClr val="tx1"/>
-                </a:solidFill>
-                <a:effectLst/>
-                <a:latin typeface="+mn-lt"/>
-                <a:ea typeface="+mn-ea"/>
-                <a:cs typeface="+mn-cs"/>
-                <a:hlinkClick r:id="rId5"/>
-              </a:rPr>
-              <a:t>http://www.bls.gov/</a:t>
-            </a:r>
-            <a:endParaRPr lang="en-US" sz="1200" b="0" i="0" kern="1200" dirty="0" smtClean="0">
-              <a:solidFill>
-                <a:schemeClr val="tx1"/>
-              </a:solidFill>
-              <a:effectLst/>
-              <a:latin typeface="+mn-lt"/>
-              <a:ea typeface="+mn-ea"/>
-              <a:cs typeface="+mn-cs"/>
-            </a:endParaRPr>
-          </a:p>
-          <a:p>
-            <a:r>
-              <a:rPr lang="en-US" sz="1200" b="0" i="0" kern="1200" dirty="0" smtClean="0">
-                <a:solidFill>
-                  <a:schemeClr val="tx1"/>
-                </a:solidFill>
-                <a:effectLst/>
-                <a:latin typeface="+mn-lt"/>
-                <a:ea typeface="+mn-ea"/>
-                <a:cs typeface="+mn-cs"/>
-                <a:hlinkClick r:id="rId6"/>
-              </a:rPr>
-              <a:t>http://www.gapminder.org/data/</a:t>
-            </a:r>
-            <a:r>
-              <a:rPr lang="en-US" sz="1200" b="0" i="0" kern="1200" dirty="0" smtClean="0">
-                <a:solidFill>
-                  <a:schemeClr val="tx1"/>
-                </a:solidFill>
-                <a:effectLst/>
-                <a:latin typeface="+mn-lt"/>
-                <a:ea typeface="+mn-ea"/>
-                <a:cs typeface="+mn-cs"/>
-              </a:rPr>
-              <a:t> </a:t>
-            </a:r>
-          </a:p>
-          <a:p>
-            <a:r>
-              <a:rPr lang="en-US" sz="1200" b="0" i="0" kern="1200" dirty="0" smtClean="0">
-                <a:solidFill>
-                  <a:schemeClr val="tx1"/>
-                </a:solidFill>
-                <a:effectLst/>
-                <a:latin typeface="+mn-lt"/>
-                <a:ea typeface="+mn-ea"/>
-                <a:cs typeface="+mn-cs"/>
-                <a:hlinkClick r:id="rId7"/>
-              </a:rPr>
-              <a:t>https://data.cityofmadison.com/</a:t>
-            </a:r>
-            <a:endParaRPr lang="en-US" sz="1200" b="0" i="0" kern="1200" dirty="0" smtClean="0">
-              <a:solidFill>
-                <a:schemeClr val="tx1"/>
-              </a:solidFill>
-              <a:effectLst/>
-              <a:latin typeface="+mn-lt"/>
-              <a:ea typeface="+mn-ea"/>
-              <a:cs typeface="+mn-cs"/>
-            </a:endParaRPr>
-          </a:p>
-          <a:p>
-            <a:pPr marL="171450" indent="-171450">
-              <a:buFontTx/>
-              <a:buChar char="-"/>
-            </a:pPr>
-            <a:endParaRPr lang="en-US" baseline="0" dirty="0" smtClean="0"/>
-          </a:p>
-          <a:p>
-            <a:pPr marL="171450" indent="-171450">
-              <a:buFontTx/>
-              <a:buChar char="-"/>
-            </a:pPr>
-            <a:r>
-              <a:rPr lang="en-US" baseline="0" dirty="0" smtClean="0"/>
-              <a:t>Data from Social Media sites</a:t>
-            </a:r>
-          </a:p>
-          <a:p>
-            <a:pPr marL="171450" indent="-171450">
-              <a:buFontTx/>
-              <a:buChar char="-"/>
-            </a:pPr>
-            <a:r>
-              <a:rPr lang="en-US" baseline="0" dirty="0" smtClean="0"/>
-              <a:t>Marketing and Tracking Data</a:t>
-            </a:r>
-          </a:p>
-          <a:p>
-            <a:pPr marL="171450" indent="-171450">
-              <a:buFontTx/>
-              <a:buChar char="-"/>
-            </a:pPr>
-            <a:r>
-              <a:rPr lang="en-US" baseline="0" dirty="0" smtClean="0"/>
-              <a:t>The Internet of Things</a:t>
-            </a:r>
-          </a:p>
-          <a:p>
-            <a:pPr marL="171450" indent="-171450">
-              <a:buFontTx/>
-              <a:buChar char="-"/>
-            </a:pPr>
-            <a:r>
-              <a:rPr lang="en-US" baseline="0" dirty="0" smtClean="0"/>
-              <a:t>Logging Data</a:t>
-            </a:r>
-          </a:p>
-          <a:p>
-            <a:pPr marL="171450" indent="-171450">
-              <a:buFontTx/>
-              <a:buChar char="-"/>
-            </a:pPr>
-            <a:r>
-              <a:rPr lang="en-US" baseline="0" dirty="0" smtClean="0"/>
-              <a:t>A/B Tests and Usage Data</a:t>
-            </a:r>
-          </a:p>
-          <a:p>
-            <a:pPr marL="171450" indent="-171450">
-              <a:buFontTx/>
-              <a:buChar char="-"/>
-            </a:pPr>
-            <a:endParaRPr lang="en-US" baseline="0" dirty="0" smtClean="0"/>
-          </a:p>
-          <a:p>
-            <a:pPr marL="171450" indent="-171450">
-              <a:buFontTx/>
-              <a:buChar char="-"/>
-            </a:pPr>
-            <a:r>
-              <a:rPr lang="en-US" baseline="0" dirty="0" smtClean="0"/>
-              <a:t>Sources: </a:t>
-            </a:r>
-          </a:p>
-          <a:p>
-            <a:pPr marL="171450" indent="-171450">
-              <a:buFontTx/>
-              <a:buChar char="-"/>
-            </a:pPr>
-            <a:r>
-              <a:rPr lang="en-US" baseline="0" dirty="0" smtClean="0"/>
-              <a:t>http://www.storagenewsletter.com/rubriques/market-reportsresearch/ibm-cmo-study/</a:t>
-            </a:r>
-          </a:p>
-          <a:p>
-            <a:pPr marL="171450" indent="-171450">
-              <a:buFontTx/>
-              <a:buChar char="-"/>
-            </a:pPr>
-            <a:r>
-              <a:rPr lang="en-US" baseline="0" dirty="0" smtClean="0"/>
-              <a:t>http://www.sciencedaily.com/releases/2013/05/130522085217.htm</a:t>
-            </a:r>
-          </a:p>
-          <a:p>
-            <a:pPr marL="171450" indent="-171450">
-              <a:buFontTx/>
-              <a:buChar char="-"/>
-            </a:pPr>
-            <a:endParaRPr lang="en-US" baseline="0" dirty="0" smtClean="0"/>
-          </a:p>
-          <a:p>
-            <a:pPr marL="171450" indent="-171450">
-              <a:buFontTx/>
-              <a:buChar char="-"/>
-            </a:pPr>
-            <a:endParaRPr lang="en-US" dirty="0" smtClean="0"/>
-          </a:p>
-          <a:p>
-            <a:endParaRPr lang="en-US" dirty="0" smtClean="0"/>
           </a:p>
           <a:p>
             <a:endParaRPr lang="en-US" dirty="0"/>
@@ -2314,7 +1413,7 @@
     </p:spTree>
     <p:extLst>
       <p:ext uri="{BB962C8B-B14F-4D97-AF65-F5344CB8AC3E}">
-        <p14:creationId xmlns:p14="http://schemas.microsoft.com/office/powerpoint/2010/main" val="986720431"/>
+        <p14:creationId xmlns:p14="http://schemas.microsoft.com/office/powerpoint/2010/main" val="2874735513"/>
       </p:ext>
     </p:extLst>
   </p:cSld>
@@ -2375,75 +1474,15 @@
           <a:p>
             <a:r>
               <a:rPr lang="en-US" dirty="0" smtClean="0"/>
-              <a:t>Stands</a:t>
+              <a:t>The amount of data available</a:t>
             </a:r>
             <a:r>
               <a:rPr lang="en-US" baseline="0" dirty="0" smtClean="0"/>
-              <a:t> for </a:t>
-            </a:r>
-            <a:r>
-              <a:rPr lang="en-US" dirty="0" smtClean="0"/>
-              <a:t>Data Driven Documents</a:t>
-            </a:r>
-          </a:p>
-          <a:p>
-            <a:endParaRPr lang="en-US" dirty="0" smtClean="0"/>
-          </a:p>
-          <a:p>
-            <a:r>
-              <a:rPr lang="en-US" dirty="0" smtClean="0"/>
-              <a:t>D3.js is like jQuery</a:t>
-            </a:r>
-            <a:r>
-              <a:rPr lang="en-US" baseline="0" dirty="0" smtClean="0"/>
-              <a:t> – jQuery helps with DOM manipulation. </a:t>
-            </a:r>
-            <a:r>
-              <a:rPr lang="en-US" baseline="0" smtClean="0"/>
-              <a:t>D3.js is for SVGs</a:t>
-            </a:r>
-            <a:endParaRPr lang="en-US" dirty="0" smtClean="0"/>
-          </a:p>
-          <a:p>
-            <a:endParaRPr lang="en-US" dirty="0" smtClean="0"/>
-          </a:p>
-          <a:p>
-            <a:r>
-              <a:rPr lang="en-US" dirty="0" smtClean="0"/>
-              <a:t>Invented by Mike </a:t>
-            </a:r>
-            <a:r>
-              <a:rPr lang="en-US" dirty="0" err="1" smtClean="0"/>
-              <a:t>Bostock</a:t>
-            </a:r>
-            <a:r>
-              <a:rPr lang="en-US" dirty="0" smtClean="0"/>
-              <a:t> in 2011</a:t>
-            </a:r>
-          </a:p>
-          <a:p>
-            <a:r>
-              <a:rPr lang="en-US" dirty="0" smtClean="0"/>
-              <a:t>-</a:t>
-            </a:r>
-            <a:r>
-              <a:rPr lang="en-US" baseline="0" dirty="0" smtClean="0"/>
-              <a:t> NY Times -&gt; Where you’ll find some nice Data Vis</a:t>
-            </a:r>
-            <a:endParaRPr lang="en-US" dirty="0" smtClean="0"/>
-          </a:p>
-          <a:p>
-            <a:endParaRPr lang="en-US" dirty="0" smtClean="0"/>
-          </a:p>
-          <a:p>
-            <a:r>
-              <a:rPr lang="en-US" dirty="0" smtClean="0"/>
-              <a:t>A toolbox for creating</a:t>
-            </a:r>
-            <a:r>
-              <a:rPr lang="en-US" baseline="0" dirty="0" smtClean="0"/>
-              <a:t> data visualizations on the web using JavaScript (usually in SVG)</a:t>
-            </a:r>
+              <a:t> to humanity is huge. </a:t>
+            </a:r>
+          </a:p>
+          <a:p>
+            <a:endParaRPr lang="en-US" baseline="0" dirty="0" smtClean="0"/>
           </a:p>
           <a:p>
             <a:pPr marL="171450" indent="-171450">
@@ -2452,7 +1491,7 @@
             </a:pPr>
             <a:r>
               <a:rPr lang="en-US" baseline="0" dirty="0" smtClean="0"/>
-              <a:t>Doesn’t render canned visuals</a:t>
+              <a:t>Eric Schmidt claims that we are creating as much data in two days as humanity has created up until 2003</a:t>
             </a:r>
           </a:p>
           <a:p>
@@ -2461,12 +1500,8 @@
               <a:buChar char="-"/>
             </a:pPr>
             <a:r>
-              <a:rPr lang="en-US" dirty="0" smtClean="0"/>
-              <a:t>Uses web standards like SVG, JavaScript</a:t>
-            </a:r>
-            <a:r>
               <a:rPr lang="en-US" baseline="0" dirty="0" smtClean="0"/>
-              <a:t>, etc…</a:t>
+              <a:t>IBM claims that we create 2.5 Quintillion Bytes of data every day</a:t>
             </a:r>
           </a:p>
           <a:p>
@@ -2475,16 +1510,24 @@
               <a:buChar char="-"/>
             </a:pPr>
             <a:r>
+              <a:rPr lang="en-US" sz="1200" b="0" i="0" kern="1200" dirty="0" smtClean="0">
+                <a:solidFill>
+                  <a:schemeClr val="tx1"/>
+                </a:solidFill>
+                <a:effectLst/>
+                <a:latin typeface="+mn-lt"/>
+                <a:ea typeface="+mn-ea"/>
+                <a:cs typeface="+mn-cs"/>
+              </a:rPr>
+              <a:t>SINTEF </a:t>
+            </a:r>
+            <a:r>
+              <a:rPr lang="en-US" dirty="0" smtClean="0"/>
+              <a:t>claims that 90%</a:t>
+            </a:r>
+            <a:r>
               <a:rPr lang="en-US" baseline="0" dirty="0" smtClean="0"/>
-              <a:t>Comes from a history of plugin based tools like </a:t>
-            </a:r>
-            <a:r>
-              <a:rPr lang="en-US" baseline="0" dirty="0" err="1" smtClean="0"/>
-              <a:t>prefuse</a:t>
-            </a:r>
-            <a:r>
-              <a:rPr lang="en-US" baseline="0" dirty="0" smtClean="0"/>
-              <a:t> and Flare</a:t>
+              <a:t> of the our current data was created in the last two years</a:t>
             </a:r>
           </a:p>
           <a:p>
@@ -2492,14 +1535,250 @@
               <a:buFontTx/>
               <a:buChar char="-"/>
             </a:pPr>
-            <a:r>
-              <a:rPr lang="en-US" dirty="0" smtClean="0"/>
-              <a:t>Supports a large number of types of visuals,</a:t>
-            </a:r>
+            <a:endParaRPr lang="en-US" baseline="0" dirty="0" smtClean="0"/>
+          </a:p>
+          <a:p>
+            <a:pPr marL="171450" indent="-171450">
+              <a:buFontTx/>
+              <a:buChar char="-"/>
+            </a:pPr>
             <a:r>
               <a:rPr lang="en-US" baseline="0" dirty="0" smtClean="0"/>
-              <a:t> including maps and animations</a:t>
-            </a:r>
+              <a:t>Governments and research organizations are opening up their data sets</a:t>
+            </a:r>
+          </a:p>
+          <a:p>
+            <a:r>
+              <a:rPr lang="en-US" sz="1200" b="0" i="0" kern="1200" dirty="0" smtClean="0">
+                <a:solidFill>
+                  <a:schemeClr val="tx1"/>
+                </a:solidFill>
+                <a:effectLst/>
+                <a:latin typeface="+mn-lt"/>
+                <a:ea typeface="+mn-ea"/>
+                <a:cs typeface="+mn-cs"/>
+                <a:hlinkClick r:id="rId3"/>
+              </a:rPr>
+              <a:t>http://www.data.gov/education/</a:t>
+            </a:r>
+            <a:endParaRPr lang="en-US" sz="1200" b="0" i="0" kern="1200" dirty="0" smtClean="0">
+              <a:solidFill>
+                <a:schemeClr val="tx1"/>
+              </a:solidFill>
+              <a:effectLst/>
+              <a:latin typeface="+mn-lt"/>
+              <a:ea typeface="+mn-ea"/>
+              <a:cs typeface="+mn-cs"/>
+            </a:endParaRPr>
+          </a:p>
+          <a:p>
+            <a:r>
+              <a:rPr lang="en-US" sz="1200" b="0" i="0" kern="1200" dirty="0" smtClean="0">
+                <a:solidFill>
+                  <a:schemeClr val="tx1"/>
+                </a:solidFill>
+                <a:effectLst/>
+                <a:latin typeface="+mn-lt"/>
+                <a:ea typeface="+mn-ea"/>
+                <a:cs typeface="+mn-cs"/>
+                <a:hlinkClick r:id="rId4"/>
+              </a:rPr>
+              <a:t>http://www.census.gov/</a:t>
+            </a:r>
+            <a:endParaRPr lang="en-US" sz="1200" b="0" i="0" kern="1200" dirty="0" smtClean="0">
+              <a:solidFill>
+                <a:schemeClr val="tx1"/>
+              </a:solidFill>
+              <a:effectLst/>
+              <a:latin typeface="+mn-lt"/>
+              <a:ea typeface="+mn-ea"/>
+              <a:cs typeface="+mn-cs"/>
+            </a:endParaRPr>
+          </a:p>
+          <a:p>
+            <a:r>
+              <a:rPr lang="en-US" sz="1200" b="0" i="0" kern="1200" dirty="0" smtClean="0">
+                <a:solidFill>
+                  <a:schemeClr val="tx1"/>
+                </a:solidFill>
+                <a:effectLst/>
+                <a:latin typeface="+mn-lt"/>
+                <a:ea typeface="+mn-ea"/>
+                <a:cs typeface="+mn-cs"/>
+                <a:hlinkClick r:id="rId5"/>
+              </a:rPr>
+              <a:t>http://www.bls.gov/</a:t>
+            </a:r>
+            <a:endParaRPr lang="en-US" sz="1200" b="0" i="0" kern="1200" dirty="0" smtClean="0">
+              <a:solidFill>
+                <a:schemeClr val="tx1"/>
+              </a:solidFill>
+              <a:effectLst/>
+              <a:latin typeface="+mn-lt"/>
+              <a:ea typeface="+mn-ea"/>
+              <a:cs typeface="+mn-cs"/>
+            </a:endParaRPr>
+          </a:p>
+          <a:p>
+            <a:r>
+              <a:rPr lang="en-US" sz="1200" b="0" i="0" kern="1200" dirty="0" smtClean="0">
+                <a:solidFill>
+                  <a:schemeClr val="tx1"/>
+                </a:solidFill>
+                <a:effectLst/>
+                <a:latin typeface="+mn-lt"/>
+                <a:ea typeface="+mn-ea"/>
+                <a:cs typeface="+mn-cs"/>
+                <a:hlinkClick r:id="rId6"/>
+              </a:rPr>
+              <a:t>http://www.gapminder.org/data/</a:t>
+            </a:r>
+            <a:r>
+              <a:rPr lang="en-US" sz="1200" b="0" i="0" kern="1200" dirty="0" smtClean="0">
+                <a:solidFill>
+                  <a:schemeClr val="tx1"/>
+                </a:solidFill>
+                <a:effectLst/>
+                <a:latin typeface="+mn-lt"/>
+                <a:ea typeface="+mn-ea"/>
+                <a:cs typeface="+mn-cs"/>
+              </a:rPr>
+              <a:t> </a:t>
+            </a:r>
+          </a:p>
+          <a:p>
+            <a:r>
+              <a:rPr lang="en-US" sz="1200" b="0" i="0" kern="1200" dirty="0" smtClean="0">
+                <a:solidFill>
+                  <a:schemeClr val="tx1"/>
+                </a:solidFill>
+                <a:effectLst/>
+                <a:latin typeface="+mn-lt"/>
+                <a:ea typeface="+mn-ea"/>
+                <a:cs typeface="+mn-cs"/>
+                <a:hlinkClick r:id="rId7"/>
+              </a:rPr>
+              <a:t>https://data.cityofmadison.com/</a:t>
+            </a:r>
+            <a:endParaRPr lang="en-US" sz="1200" b="0" i="0" kern="1200" dirty="0" smtClean="0">
+              <a:solidFill>
+                <a:schemeClr val="tx1"/>
+              </a:solidFill>
+              <a:effectLst/>
+              <a:latin typeface="+mn-lt"/>
+              <a:ea typeface="+mn-ea"/>
+              <a:cs typeface="+mn-cs"/>
+            </a:endParaRPr>
+          </a:p>
+          <a:p>
+            <a:pPr marL="171450" indent="-171450">
+              <a:buFontTx/>
+              <a:buChar char="-"/>
+            </a:pPr>
+            <a:endParaRPr lang="en-US" baseline="0" dirty="0" smtClean="0"/>
+          </a:p>
+          <a:p>
+            <a:pPr marL="171450" indent="-171450">
+              <a:buFontTx/>
+              <a:buChar char="-"/>
+            </a:pPr>
+            <a:r>
+              <a:rPr lang="en-US" baseline="0" dirty="0" smtClean="0"/>
+              <a:t>Data from Social Media sites</a:t>
+            </a:r>
+          </a:p>
+          <a:p>
+            <a:pPr marL="171450" indent="-171450">
+              <a:buFontTx/>
+              <a:buChar char="-"/>
+            </a:pPr>
+            <a:r>
+              <a:rPr lang="en-US" baseline="0" dirty="0" smtClean="0"/>
+              <a:t>Marketing and Tracking Data</a:t>
+            </a:r>
+          </a:p>
+          <a:p>
+            <a:pPr marL="171450" indent="-171450">
+              <a:buFontTx/>
+              <a:buChar char="-"/>
+            </a:pPr>
+            <a:r>
+              <a:rPr lang="en-US" baseline="0" dirty="0" smtClean="0"/>
+              <a:t>The Internet of Things</a:t>
+            </a:r>
+          </a:p>
+          <a:p>
+            <a:pPr marL="171450" indent="-171450">
+              <a:buFontTx/>
+              <a:buChar char="-"/>
+            </a:pPr>
+            <a:r>
+              <a:rPr lang="en-US" baseline="0" dirty="0" smtClean="0"/>
+              <a:t>Logging Data</a:t>
+            </a:r>
+          </a:p>
+          <a:p>
+            <a:pPr marL="171450" indent="-171450">
+              <a:buFontTx/>
+              <a:buChar char="-"/>
+            </a:pPr>
+            <a:r>
+              <a:rPr lang="en-US" baseline="0" dirty="0" smtClean="0"/>
+              <a:t>A/B Tests and Usage Data</a:t>
+            </a:r>
+          </a:p>
+          <a:p>
+            <a:pPr marL="171450" indent="-171450">
+              <a:buFontTx/>
+              <a:buChar char="-"/>
+            </a:pPr>
+            <a:endParaRPr lang="en-US" baseline="0" dirty="0" smtClean="0"/>
+          </a:p>
+          <a:p>
+            <a:pPr marL="171450" indent="-171450">
+              <a:buFontTx/>
+              <a:buChar char="-"/>
+            </a:pPr>
+            <a:r>
+              <a:rPr lang="en-US" baseline="0" dirty="0" smtClean="0"/>
+              <a:t>Sources: </a:t>
+            </a:r>
+          </a:p>
+          <a:p>
+            <a:pPr marL="171450" indent="-171450">
+              <a:buFontTx/>
+              <a:buChar char="-"/>
+            </a:pPr>
+            <a:r>
+              <a:rPr lang="en-US" baseline="0" dirty="0" smtClean="0"/>
+              <a:t>http://www.storagenewsletter.com/rubriques/market-reportsresearch/ibm-cmo-study/</a:t>
+            </a:r>
+          </a:p>
+          <a:p>
+            <a:pPr marL="171450" indent="-171450">
+              <a:buFontTx/>
+              <a:buChar char="-"/>
+            </a:pPr>
+            <a:r>
+              <a:rPr lang="en-US" baseline="0" dirty="0" smtClean="0"/>
+              <a:t>http://www.sciencedaily.com/releases/2013/05/130522085217.htm</a:t>
+            </a:r>
+          </a:p>
+          <a:p>
+            <a:pPr marL="171450" indent="-171450">
+              <a:buFontTx/>
+              <a:buChar char="-"/>
+            </a:pPr>
+            <a:endParaRPr lang="en-US" baseline="0" dirty="0" smtClean="0"/>
+          </a:p>
+          <a:p>
+            <a:pPr marL="171450" indent="-171450">
+              <a:buFontTx/>
+              <a:buChar char="-"/>
+            </a:pPr>
+            <a:endParaRPr lang="en-US" dirty="0" smtClean="0"/>
+          </a:p>
+          <a:p>
             <a:endParaRPr lang="en-US" dirty="0" smtClean="0"/>
           </a:p>
           <a:p>
@@ -2533,7 +1812,7 @@
     </p:spTree>
     <p:extLst>
       <p:ext uri="{BB962C8B-B14F-4D97-AF65-F5344CB8AC3E}">
-        <p14:creationId xmlns:p14="http://schemas.microsoft.com/office/powerpoint/2010/main" val="2181638493"/>
+        <p14:creationId xmlns:p14="http://schemas.microsoft.com/office/powerpoint/2010/main" val="986720431"/>
       </p:ext>
     </p:extLst>
   </p:cSld>
@@ -2594,92 +1873,8 @@
           <a:p>
             <a:r>
               <a:rPr lang="en-US" dirty="0" smtClean="0"/>
-              <a:t>D3 uses modern web standards like JavaScript,</a:t>
-            </a:r>
-            <a:r>
-              <a:rPr lang="en-US" baseline="0" dirty="0" smtClean="0"/>
-              <a:t> SVG, and CSS</a:t>
-            </a:r>
-            <a:endParaRPr lang="en-US" dirty="0" smtClean="0"/>
-          </a:p>
-          <a:p>
-            <a:endParaRPr lang="en-US" dirty="0" smtClean="0"/>
-          </a:p>
-          <a:p>
-            <a:r>
-              <a:rPr lang="en-US" dirty="0" smtClean="0"/>
-              <a:t>D3 excels at creating interactive web visualizations in SVG</a:t>
-            </a:r>
-            <a:endParaRPr lang="en-US" baseline="0" dirty="0" smtClean="0"/>
-          </a:p>
-          <a:p>
-            <a:endParaRPr lang="en-US" baseline="0" dirty="0" smtClean="0"/>
-          </a:p>
-          <a:p>
-            <a:r>
-              <a:rPr lang="en-US" baseline="0" dirty="0" smtClean="0"/>
-              <a:t>Includes tools for creating lots of common data visualizations, including Geo Maps</a:t>
-            </a:r>
-          </a:p>
-          <a:p>
-            <a:endParaRPr lang="en-US" baseline="0" dirty="0" smtClean="0"/>
-          </a:p>
-          <a:p>
-            <a:r>
-              <a:rPr lang="en-US" baseline="0" dirty="0" smtClean="0"/>
-              <a:t>There’s no plugins</a:t>
-            </a:r>
-          </a:p>
-          <a:p>
-            <a:endParaRPr lang="en-US" baseline="0" dirty="0" smtClean="0"/>
-          </a:p>
-          <a:p>
-            <a:r>
-              <a:rPr lang="en-US" baseline="0" dirty="0" smtClean="0"/>
-              <a:t>It’s free and Open Source</a:t>
-            </a:r>
-            <a:endParaRPr lang="en-US" dirty="0" smtClean="0"/>
-          </a:p>
-          <a:p>
-            <a:endParaRPr lang="en-US" dirty="0" smtClean="0"/>
-          </a:p>
-          <a:p>
-            <a:pPr marL="27675" indent="0">
-              <a:buNone/>
-            </a:pPr>
-            <a:r>
-              <a:rPr lang="en-US" dirty="0" smtClean="0">
-                <a:hlinkClick r:id="rId3"/>
-              </a:rPr>
-              <a:t>http://www.nytimes.com/interactive/2013/05/25/sunday-review/corporate-taxes.html</a:t>
-            </a:r>
-            <a:endParaRPr lang="en-US" dirty="0" smtClean="0"/>
-          </a:p>
-          <a:p>
-            <a:pPr marL="27675" indent="0">
-              <a:buNone/>
-            </a:pPr>
-            <a:r>
-              <a:rPr lang="en-US" dirty="0" smtClean="0">
-                <a:hlinkClick r:id="rId4"/>
-              </a:rPr>
-              <a:t>http://www.koalastothemax.com/</a:t>
-            </a:r>
-            <a:endParaRPr lang="en-US" dirty="0" smtClean="0"/>
-          </a:p>
-          <a:p>
-            <a:pPr marL="27675" indent="0">
-              <a:buNone/>
-            </a:pPr>
-            <a:r>
-              <a:rPr lang="en-US" dirty="0" smtClean="0">
-                <a:hlinkClick r:id="rId5"/>
-              </a:rPr>
-              <a:t>http://www.jasondavies.com/maps/countries-by-area/</a:t>
-            </a:r>
-            <a:endParaRPr lang="en-US" dirty="0" smtClean="0"/>
-          </a:p>
-          <a:p>
+              <a:t>Demo</a:t>
+            </a:r>
             <a:endParaRPr lang="en-US" dirty="0"/>
           </a:p>
         </p:txBody>
@@ -2710,7 +1905,7 @@
     </p:spTree>
     <p:extLst>
       <p:ext uri="{BB962C8B-B14F-4D97-AF65-F5344CB8AC3E}">
-        <p14:creationId xmlns:p14="http://schemas.microsoft.com/office/powerpoint/2010/main" val="1599171817"/>
+        <p14:creationId xmlns:p14="http://schemas.microsoft.com/office/powerpoint/2010/main" val="158761495"/>
       </p:ext>
     </p:extLst>
   </p:cSld>
@@ -2769,47 +1964,6 @@
           <a:bodyPr/>
           <a:lstStyle/>
           <a:p>
-            <a:r>
-              <a:rPr lang="en-US" dirty="0" smtClean="0"/>
-              <a:t>Doesn’t include</a:t>
-            </a:r>
-            <a:r>
-              <a:rPr lang="en-US" baseline="0" dirty="0" smtClean="0"/>
-              <a:t> any pre-canned visuals</a:t>
-            </a:r>
-          </a:p>
-          <a:p>
-            <a:endParaRPr lang="en-US" baseline="0" dirty="0" smtClean="0"/>
-          </a:p>
-          <a:p>
-            <a:r>
-              <a:rPr lang="en-US" baseline="0" dirty="0" smtClean="0"/>
-              <a:t>Doesn’t support older browsers (no IE 8)</a:t>
-            </a:r>
-          </a:p>
-          <a:p>
-            <a:endParaRPr lang="en-US" baseline="0" dirty="0" smtClean="0"/>
-          </a:p>
-          <a:p>
-            <a:r>
-              <a:rPr lang="en-US" baseline="0" dirty="0" smtClean="0"/>
-              <a:t>Best for SVG, not bitmaps or canvas</a:t>
-            </a:r>
-          </a:p>
-          <a:p>
-            <a:endParaRPr lang="en-US" baseline="0" dirty="0" smtClean="0"/>
-          </a:p>
-          <a:p>
-            <a:r>
-              <a:rPr lang="en-US" baseline="0" dirty="0" smtClean="0"/>
-              <a:t>Doesn’t hide root data (because JavaScript)</a:t>
-            </a:r>
-          </a:p>
-          <a:p>
-            <a:r>
-              <a:rPr lang="en-US" baseline="0" dirty="0" smtClean="0"/>
-              <a:t>	</a:t>
-            </a:r>
             <a:endParaRPr lang="en-US" dirty="0"/>
           </a:p>
         </p:txBody>
@@ -2840,7 +1994,7 @@
     </p:spTree>
     <p:extLst>
       <p:ext uri="{BB962C8B-B14F-4D97-AF65-F5344CB8AC3E}">
-        <p14:creationId xmlns:p14="http://schemas.microsoft.com/office/powerpoint/2010/main" val="3125936859"/>
+        <p14:creationId xmlns:p14="http://schemas.microsoft.com/office/powerpoint/2010/main" val="694072251"/>
       </p:ext>
     </p:extLst>
   </p:cSld>
@@ -3035,7 +2189,7 @@
           <a:p>
             <a:fld id="{67971B23-299D-4CF4-B59D-A17DAEBDFBC2}" type="datetimeFigureOut">
               <a:rPr lang="en-US" smtClean="0"/>
-              <a:t>4/2/2014</a:t>
+              <a:t>7/21/2014</a:t>
             </a:fld>
             <a:endParaRPr lang="en-US"/>
           </a:p>
@@ -3333,7 +2487,7 @@
           <a:p>
             <a:fld id="{67971B23-299D-4CF4-B59D-A17DAEBDFBC2}" type="datetimeFigureOut">
               <a:rPr lang="en-US" smtClean="0"/>
-              <a:t>4/2/2014</a:t>
+              <a:t>7/21/2014</a:t>
             </a:fld>
             <a:endParaRPr lang="en-US"/>
           </a:p>
@@ -3525,7 +2679,7 @@
           <a:p>
             <a:fld id="{67971B23-299D-4CF4-B59D-A17DAEBDFBC2}" type="datetimeFigureOut">
               <a:rPr lang="en-US" smtClean="0"/>
-              <a:t>4/2/2014</a:t>
+              <a:t>7/21/2014</a:t>
             </a:fld>
             <a:endParaRPr lang="en-US"/>
           </a:p>
@@ -3786,7 +2940,7 @@
           <a:p>
             <a:fld id="{67971B23-299D-4CF4-B59D-A17DAEBDFBC2}" type="datetimeFigureOut">
               <a:rPr lang="en-US" smtClean="0"/>
-              <a:t>4/2/2014</a:t>
+              <a:t>7/21/2014</a:t>
             </a:fld>
             <a:endParaRPr lang="en-US"/>
           </a:p>
@@ -4210,7 +3364,7 @@
           <a:p>
             <a:fld id="{67971B23-299D-4CF4-B59D-A17DAEBDFBC2}" type="datetimeFigureOut">
               <a:rPr lang="en-US" smtClean="0"/>
-              <a:t>4/2/2014</a:t>
+              <a:t>7/21/2014</a:t>
             </a:fld>
             <a:endParaRPr lang="en-US"/>
           </a:p>
@@ -4747,7 +3901,7 @@
           <a:p>
             <a:fld id="{67971B23-299D-4CF4-B59D-A17DAEBDFBC2}" type="datetimeFigureOut">
               <a:rPr lang="en-US" smtClean="0"/>
-              <a:t>4/2/2014</a:t>
+              <a:t>7/21/2014</a:t>
             </a:fld>
             <a:endParaRPr lang="en-US"/>
           </a:p>
@@ -5611,7 +4765,7 @@
           <a:p>
             <a:fld id="{67971B23-299D-4CF4-B59D-A17DAEBDFBC2}" type="datetimeFigureOut">
               <a:rPr lang="en-US" smtClean="0"/>
-              <a:t>4/2/2014</a:t>
+              <a:t>7/21/2014</a:t>
             </a:fld>
             <a:endParaRPr lang="en-US"/>
           </a:p>
@@ -5781,7 +4935,7 @@
           <a:p>
             <a:fld id="{67971B23-299D-4CF4-B59D-A17DAEBDFBC2}" type="datetimeFigureOut">
               <a:rPr lang="en-US" smtClean="0"/>
-              <a:t>4/2/2014</a:t>
+              <a:t>7/21/2014</a:t>
             </a:fld>
             <a:endParaRPr lang="en-US"/>
           </a:p>
@@ -5965,7 +5119,7 @@
           <a:p>
             <a:fld id="{67971B23-299D-4CF4-B59D-A17DAEBDFBC2}" type="datetimeFigureOut">
               <a:rPr lang="en-US" smtClean="0"/>
-              <a:t>4/2/2014</a:t>
+              <a:t>7/21/2014</a:t>
             </a:fld>
             <a:endParaRPr lang="en-US"/>
           </a:p>
@@ -6135,7 +5289,7 @@
           <a:p>
             <a:fld id="{67971B23-299D-4CF4-B59D-A17DAEBDFBC2}" type="datetimeFigureOut">
               <a:rPr lang="en-US" smtClean="0"/>
-              <a:t>4/2/2014</a:t>
+              <a:t>7/21/2014</a:t>
             </a:fld>
             <a:endParaRPr lang="en-US"/>
           </a:p>
@@ -6379,7 +5533,7 @@
           <a:p>
             <a:fld id="{67971B23-299D-4CF4-B59D-A17DAEBDFBC2}" type="datetimeFigureOut">
               <a:rPr lang="en-US" smtClean="0"/>
-              <a:t>4/2/2014</a:t>
+              <a:t>7/21/2014</a:t>
             </a:fld>
             <a:endParaRPr lang="en-US"/>
           </a:p>
@@ -6615,7 +5769,7 @@
           <a:p>
             <a:fld id="{67971B23-299D-4CF4-B59D-A17DAEBDFBC2}" type="datetimeFigureOut">
               <a:rPr lang="en-US" smtClean="0"/>
-              <a:t>4/2/2014</a:t>
+              <a:t>7/21/2014</a:t>
             </a:fld>
             <a:endParaRPr lang="en-US"/>
           </a:p>
@@ -7081,7 +6235,7 @@
           <a:p>
             <a:fld id="{67971B23-299D-4CF4-B59D-A17DAEBDFBC2}" type="datetimeFigureOut">
               <a:rPr lang="en-US" smtClean="0"/>
-              <a:t>4/2/2014</a:t>
+              <a:t>7/21/2014</a:t>
             </a:fld>
             <a:endParaRPr lang="en-US"/>
           </a:p>
@@ -7199,7 +6353,7 @@
           <a:p>
             <a:fld id="{67971B23-299D-4CF4-B59D-A17DAEBDFBC2}" type="datetimeFigureOut">
               <a:rPr lang="en-US" smtClean="0"/>
-              <a:t>4/2/2014</a:t>
+              <a:t>7/21/2014</a:t>
             </a:fld>
             <a:endParaRPr lang="en-US"/>
           </a:p>
@@ -7294,7 +6448,7 @@
           <a:p>
             <a:fld id="{67971B23-299D-4CF4-B59D-A17DAEBDFBC2}" type="datetimeFigureOut">
               <a:rPr lang="en-US" smtClean="0"/>
-              <a:t>4/2/2014</a:t>
+              <a:t>7/21/2014</a:t>
             </a:fld>
             <a:endParaRPr lang="en-US"/>
           </a:p>
@@ -7549,7 +6703,7 @@
           <a:p>
             <a:fld id="{67971B23-299D-4CF4-B59D-A17DAEBDFBC2}" type="datetimeFigureOut">
               <a:rPr lang="en-US" smtClean="0"/>
-              <a:t>4/2/2014</a:t>
+              <a:t>7/21/2014</a:t>
             </a:fld>
             <a:endParaRPr lang="en-US"/>
           </a:p>
@@ -7849,7 +7003,7 @@
           <a:p>
             <a:fld id="{67971B23-299D-4CF4-B59D-A17DAEBDFBC2}" type="datetimeFigureOut">
               <a:rPr lang="en-US" smtClean="0"/>
-              <a:t>4/2/2014</a:t>
+              <a:t>7/21/2014</a:t>
             </a:fld>
             <a:endParaRPr lang="en-US"/>
           </a:p>
@@ -8083,7 +7237,7 @@
           <a:p>
             <a:fld id="{67971B23-299D-4CF4-B59D-A17DAEBDFBC2}" type="datetimeFigureOut">
               <a:rPr lang="en-US" smtClean="0"/>
-              <a:t>4/2/2014</a:t>
+              <a:t>7/21/2014</a:t>
             </a:fld>
             <a:endParaRPr lang="en-US"/>
           </a:p>
@@ -8769,8 +7923,8 @@
         </p:nvSpPr>
         <p:spPr>
           <a:xfrm>
-            <a:off x="0" y="235504"/>
-            <a:ext cx="12192000" cy="1371601"/>
+            <a:off x="138700" y="210105"/>
+            <a:ext cx="12053300" cy="780496"/>
           </a:xfrm>
         </p:spPr>
         <p:txBody>
@@ -8779,11 +7933,30 @@
           </a:bodyPr>
           <a:lstStyle/>
           <a:p>
-            <a:r>
-              <a:rPr lang="en-US" sz="7200" b="1" dirty="0">
+            <a:pPr algn="l"/>
+            <a:r>
+              <a:rPr lang="en-US" sz="6000" b="1" dirty="0">
                 <a:effectLst/>
               </a:rPr>
-              <a:t>Telling Stories with Data</a:t>
+              <a:t>Telling </a:t>
+            </a:r>
+            <a:r>
+              <a:rPr lang="en-US" sz="6000" b="1" dirty="0" smtClean="0">
+                <a:effectLst/>
+              </a:rPr>
+              <a:t>Campfire </a:t>
+            </a:r>
+            <a:r>
+              <a:rPr lang="en-US" sz="6000" b="1" dirty="0" smtClean="0">
+                <a:effectLst/>
+              </a:rPr>
+              <a:t>Stories </a:t>
+            </a:r>
+            <a:r>
+              <a:rPr lang="en-US" sz="6000" b="1" dirty="0">
+                <a:effectLst/>
+              </a:rPr>
+              <a:t>with Data</a:t>
             </a:r>
           </a:p>
         </p:txBody>
@@ -8800,8 +7973,8 @@
         </p:nvSpPr>
         <p:spPr>
           <a:xfrm>
-            <a:off x="138699" y="1466522"/>
-            <a:ext cx="11904912" cy="787400"/>
+            <a:off x="138699" y="990602"/>
+            <a:ext cx="7955211" cy="787400"/>
           </a:xfrm>
         </p:spPr>
         <p:txBody>
@@ -8810,17 +7983,18 @@
           </a:bodyPr>
           <a:lstStyle/>
           <a:p>
+            <a:pPr algn="l"/>
             <a:r>
               <a:rPr lang="en-US" sz="3200" b="1" dirty="0">
                 <a:effectLst/>
               </a:rPr>
-              <a:t>Interactive Data Visualizations with D3.js and </a:t>
-            </a:r>
-            <a:r>
-              <a:rPr lang="en-US" sz="3200" b="1" dirty="0" err="1">
+              <a:t>Interactive Data Visualizations with </a:t>
+            </a:r>
+            <a:r>
+              <a:rPr lang="en-US" sz="3200" b="1" dirty="0" smtClean="0">
                 <a:effectLst/>
               </a:rPr>
-              <a:t>ASP.Net</a:t>
+              <a:t>D3.js</a:t>
             </a:r>
             <a:endParaRPr lang="en-US" sz="3200" b="1" dirty="0">
               <a:effectLst/>
@@ -8836,8 +8010,8 @@
         </p:nvSpPr>
         <p:spPr>
           <a:xfrm>
-            <a:off x="138699" y="3890710"/>
-            <a:ext cx="8378687" cy="1569660"/>
+            <a:off x="214899" y="1727241"/>
+            <a:ext cx="6340106" cy="1692771"/>
           </a:xfrm>
           <a:prstGeom prst="rect">
             <a:avLst/>
@@ -8851,9 +8025,14 @@
           <a:lstStyle/>
           <a:p>
             <a:r>
-              <a:rPr lang="en-US" sz="2400" dirty="0"/>
-              <a:t>Dustin Ewers</a:t>
-            </a:r>
+              <a:rPr lang="en-US" sz="3200" dirty="0"/>
+              <a:t>Dustin </a:t>
+            </a:r>
+            <a:r>
+              <a:rPr lang="en-US" sz="3200" dirty="0" smtClean="0"/>
+              <a:t>Ewers</a:t>
+            </a:r>
+            <a:endParaRPr lang="en-US" sz="3200" dirty="0"/>
           </a:p>
           <a:p>
             <a:r>
@@ -8872,10 +8051,10 @@
               <a:t>Website: </a:t>
             </a:r>
             <a:r>
-              <a:rPr lang="en-US" sz="2400" dirty="0">
+              <a:rPr lang="en-US" sz="2400" dirty="0" smtClean="0">
                 <a:hlinkClick r:id="rId2"/>
               </a:rPr>
-              <a:t>www.dustinewers.com</a:t>
+              <a:t>http://dustinewers.com</a:t>
             </a:r>
             <a:endParaRPr lang="en-US" sz="2400" dirty="0"/>
           </a:p>
@@ -8902,8 +8081,8 @@
         </p:nvSpPr>
         <p:spPr>
           <a:xfrm>
-            <a:off x="138699" y="5657671"/>
-            <a:ext cx="8978900" cy="1200329"/>
+            <a:off x="214899" y="5242436"/>
+            <a:ext cx="6052551" cy="830997"/>
           </a:xfrm>
           <a:prstGeom prst="rect">
             <a:avLst/>
@@ -8926,15 +8105,89 @@
               <a:rPr lang="en-US" sz="2400" dirty="0">
                 <a:hlinkClick r:id="rId4"/>
               </a:rPr>
-              <a:t>https://github.com/DustinEwers/D3-DotNetMVC-Demos</a:t>
+              <a:t>https://</a:t>
+            </a:r>
+            <a:r>
+              <a:rPr lang="en-US" sz="2400" dirty="0" smtClean="0">
+                <a:hlinkClick r:id="rId4"/>
+              </a:rPr>
+              <a:t>github.com/DustinEwers/D3-js-Demos</a:t>
             </a:r>
             <a:endParaRPr lang="en-US" sz="2400" dirty="0"/>
           </a:p>
-          <a:p>
-            <a:endParaRPr lang="en-US" sz="2400" dirty="0"/>
-          </a:p>
-        </p:txBody>
-      </p:sp>
+        </p:txBody>
+      </p:sp>
+      <p:pic>
+        <p:nvPicPr>
+          <p:cNvPr id="8" name="Picture 7"/>
+          <p:cNvPicPr>
+            <a:picLocks noChangeAspect="1"/>
+          </p:cNvPicPr>
+          <p:nvPr/>
+        </p:nvPicPr>
+        <p:blipFill>
+          <a:blip r:embed="rId5">
+            <a:extLst>
+              <a:ext uri="{28A0092B-C50C-407E-A947-70E740481C1C}">
+                <a14:useLocalDpi xmlns:a14="http://schemas.microsoft.com/office/drawing/2010/main" val="0"/>
+              </a:ext>
+            </a:extLst>
+          </a:blip>
+          <a:stretch>
+            <a:fillRect/>
+          </a:stretch>
+        </p:blipFill>
+        <p:spPr>
+          <a:xfrm>
+            <a:off x="214899" y="3469007"/>
+            <a:ext cx="3806119" cy="1724433"/>
+          </a:xfrm>
+          <a:prstGeom prst="rect">
+            <a:avLst/>
+          </a:prstGeom>
+        </p:spPr>
+      </p:pic>
+      <p:pic>
+        <p:nvPicPr>
+          <p:cNvPr id="1028" name="Picture 4" descr="https://www.thatconference.com/images/footer-logo.png"/>
+          <p:cNvPicPr>
+            <a:picLocks noChangeAspect="1" noChangeArrowheads="1"/>
+          </p:cNvPicPr>
+          <p:nvPr/>
+        </p:nvPicPr>
+        <p:blipFill>
+          <a:blip r:embed="rId6">
+            <a:extLst>
+              <a:ext uri="{28A0092B-C50C-407E-A947-70E740481C1C}">
+                <a14:useLocalDpi xmlns:a14="http://schemas.microsoft.com/office/drawing/2010/main" val="0"/>
+              </a:ext>
+            </a:extLst>
+          </a:blip>
+          <a:srcRect/>
+          <a:stretch>
+            <a:fillRect/>
+          </a:stretch>
+        </p:blipFill>
+        <p:spPr bwMode="auto">
+          <a:xfrm>
+            <a:off x="6478805" y="1778002"/>
+            <a:ext cx="5435033" cy="4295431"/>
+          </a:xfrm>
+          <a:prstGeom prst="rect">
+            <a:avLst/>
+          </a:prstGeom>
+          <a:noFill/>
+          <a:extLst>
+            <a:ext uri="{909E8E84-426E-40DD-AFC4-6F175D3DCCD1}">
+              <a14:hiddenFill xmlns:a14="http://schemas.microsoft.com/office/drawing/2010/main">
+                <a:solidFill>
+                  <a:srgbClr val="FFFFFF"/>
+                </a:solidFill>
+              </a14:hiddenFill>
+            </a:ext>
+          </a:extLst>
+        </p:spPr>
+      </p:pic>
     </p:spTree>
     <p:extLst>
       <p:ext uri="{BB962C8B-B14F-4D97-AF65-F5344CB8AC3E}">
@@ -8991,446 +8244,6 @@
           <a:p>
             <a:r>
               <a:rPr lang="en-US" sz="6000" dirty="0"/>
-              <a:t>Why Not D3.js?</a:t>
-            </a:r>
-          </a:p>
-        </p:txBody>
-      </p:sp>
-    </p:spTree>
-    <p:extLst>
-      <p:ext uri="{BB962C8B-B14F-4D97-AF65-F5344CB8AC3E}">
-        <p14:creationId xmlns:p14="http://schemas.microsoft.com/office/powerpoint/2010/main" val="3000307880"/>
-      </p:ext>
-    </p:extLst>
-  </p:cSld>
-  <p:clrMapOvr>
-    <a:masterClrMapping/>
-  </p:clrMapOvr>
-  <p:timing>
-    <p:tnLst>
-      <p:par>
-        <p:cTn id="1" dur="indefinite" restart="never" nodeType="tmRoot"/>
-      </p:par>
-    </p:tnLst>
-  </p:timing>
-</p:sld>
-</file>
-
-<file path=ppt/slides/slide11.xml><?xml version="1.0" encoding="utf-8"?>
-<p:sld xmlns:a="http://schemas.openxmlformats.org/drawingml/2006/main" xmlns:r="http://schemas.openxmlformats.org/officeDocument/2006/relationships" xmlns:p="http://schemas.openxmlformats.org/presentationml/2006/main">
-  <p:cSld>
-    <p:spTree>
-      <p:nvGrpSpPr>
-        <p:cNvPr id="1" name=""/>
-        <p:cNvGrpSpPr/>
-        <p:nvPr/>
-      </p:nvGrpSpPr>
-      <p:grpSpPr>
-        <a:xfrm>
-          <a:off x="0" y="0"/>
-          <a:ext cx="0" cy="0"/>
-          <a:chOff x="0" y="0"/>
-          <a:chExt cx="0" cy="0"/>
-        </a:xfrm>
-      </p:grpSpPr>
-      <p:sp>
-        <p:nvSpPr>
-          <p:cNvPr id="2" name="Title 1"/>
-          <p:cNvSpPr>
-            <a:spLocks noGrp="1"/>
-          </p:cNvSpPr>
-          <p:nvPr>
-            <p:ph type="title"/>
-          </p:nvPr>
-        </p:nvSpPr>
-        <p:spPr/>
-        <p:txBody>
-          <a:bodyPr>
-            <a:noAutofit/>
-          </a:bodyPr>
-          <a:lstStyle/>
-          <a:p>
-            <a:r>
-              <a:rPr lang="en-US" sz="6000" dirty="0"/>
-              <a:t>Just Enough SVG</a:t>
-            </a:r>
-          </a:p>
-        </p:txBody>
-      </p:sp>
-      <p:sp>
-        <p:nvSpPr>
-          <p:cNvPr id="3" name="Content Placeholder 2"/>
-          <p:cNvSpPr>
-            <a:spLocks noGrp="1"/>
-          </p:cNvSpPr>
-          <p:nvPr>
-            <p:ph idx="1"/>
-          </p:nvPr>
-        </p:nvSpPr>
-        <p:spPr/>
-        <p:txBody>
-          <a:bodyPr/>
-          <a:lstStyle/>
-          <a:p>
-            <a:endParaRPr lang="en-US" dirty="0"/>
-          </a:p>
-        </p:txBody>
-      </p:sp>
-    </p:spTree>
-    <p:extLst>
-      <p:ext uri="{BB962C8B-B14F-4D97-AF65-F5344CB8AC3E}">
-        <p14:creationId xmlns:p14="http://schemas.microsoft.com/office/powerpoint/2010/main" val="3546670545"/>
-      </p:ext>
-    </p:extLst>
-  </p:cSld>
-  <p:clrMapOvr>
-    <a:masterClrMapping/>
-  </p:clrMapOvr>
-  <p:timing>
-    <p:tnLst>
-      <p:par>
-        <p:cTn id="1" dur="indefinite" restart="never" nodeType="tmRoot"/>
-      </p:par>
-    </p:tnLst>
-  </p:timing>
-</p:sld>
-</file>
-
-<file path=ppt/slides/slide12.xml><?xml version="1.0" encoding="utf-8"?>
-<p:sld xmlns:a="http://schemas.openxmlformats.org/drawingml/2006/main" xmlns:r="http://schemas.openxmlformats.org/officeDocument/2006/relationships" xmlns:p="http://schemas.openxmlformats.org/presentationml/2006/main">
-  <p:cSld>
-    <p:spTree>
-      <p:nvGrpSpPr>
-        <p:cNvPr id="1" name=""/>
-        <p:cNvGrpSpPr/>
-        <p:nvPr/>
-      </p:nvGrpSpPr>
-      <p:grpSpPr>
-        <a:xfrm>
-          <a:off x="0" y="0"/>
-          <a:ext cx="0" cy="0"/>
-          <a:chOff x="0" y="0"/>
-          <a:chExt cx="0" cy="0"/>
-        </a:xfrm>
-      </p:grpSpPr>
-      <p:sp>
-        <p:nvSpPr>
-          <p:cNvPr id="2" name="Title 1"/>
-          <p:cNvSpPr>
-            <a:spLocks noGrp="1"/>
-          </p:cNvSpPr>
-          <p:nvPr>
-            <p:ph type="title"/>
-          </p:nvPr>
-        </p:nvSpPr>
-        <p:spPr/>
-        <p:txBody>
-          <a:bodyPr>
-            <a:noAutofit/>
-          </a:bodyPr>
-          <a:lstStyle/>
-          <a:p>
-            <a:r>
-              <a:rPr lang="en-US" sz="6000" dirty="0"/>
-              <a:t>SVG Circle</a:t>
-            </a:r>
-          </a:p>
-        </p:txBody>
-      </p:sp>
-      <p:sp>
-        <p:nvSpPr>
-          <p:cNvPr id="3" name="Content Placeholder 2"/>
-          <p:cNvSpPr>
-            <a:spLocks noGrp="1"/>
-          </p:cNvSpPr>
-          <p:nvPr>
-            <p:ph idx="1"/>
-          </p:nvPr>
-        </p:nvSpPr>
-        <p:spPr>
-          <a:xfrm>
-            <a:off x="2209348" y="2156588"/>
-            <a:ext cx="3843791" cy="1458151"/>
-          </a:xfrm>
-        </p:spPr>
-        <p:txBody>
-          <a:bodyPr/>
-          <a:lstStyle/>
-          <a:p>
-            <a:pPr marL="27675" indent="0">
-              <a:buNone/>
-            </a:pPr>
-            <a:endParaRPr lang="en-US" dirty="0"/>
-          </a:p>
-        </p:txBody>
-      </p:sp>
-      <p:pic>
-        <p:nvPicPr>
-          <p:cNvPr id="5" name="Picture 4"/>
-          <p:cNvPicPr>
-            <a:picLocks noChangeAspect="1"/>
-          </p:cNvPicPr>
-          <p:nvPr/>
-        </p:nvPicPr>
-        <p:blipFill>
-          <a:blip r:embed="rId3"/>
-          <a:stretch>
-            <a:fillRect/>
-          </a:stretch>
-        </p:blipFill>
-        <p:spPr>
-          <a:xfrm>
-            <a:off x="1652069" y="2042288"/>
-            <a:ext cx="8879879" cy="3703745"/>
-          </a:xfrm>
-          <a:prstGeom prst="rect">
-            <a:avLst/>
-          </a:prstGeom>
-        </p:spPr>
-      </p:pic>
-    </p:spTree>
-    <p:extLst>
-      <p:ext uri="{BB962C8B-B14F-4D97-AF65-F5344CB8AC3E}">
-        <p14:creationId xmlns:p14="http://schemas.microsoft.com/office/powerpoint/2010/main" val="3749296673"/>
-      </p:ext>
-    </p:extLst>
-  </p:cSld>
-  <p:clrMapOvr>
-    <a:masterClrMapping/>
-  </p:clrMapOvr>
-  <p:timing>
-    <p:tnLst>
-      <p:par>
-        <p:cTn id="1" dur="indefinite" restart="never" nodeType="tmRoot"/>
-      </p:par>
-    </p:tnLst>
-  </p:timing>
-</p:sld>
-</file>
-
-<file path=ppt/slides/slide13.xml><?xml version="1.0" encoding="utf-8"?>
-<p:sld xmlns:a="http://schemas.openxmlformats.org/drawingml/2006/main" xmlns:r="http://schemas.openxmlformats.org/officeDocument/2006/relationships" xmlns:p="http://schemas.openxmlformats.org/presentationml/2006/main">
-  <p:cSld>
-    <p:spTree>
-      <p:nvGrpSpPr>
-        <p:cNvPr id="1" name=""/>
-        <p:cNvGrpSpPr/>
-        <p:nvPr/>
-      </p:nvGrpSpPr>
-      <p:grpSpPr>
-        <a:xfrm>
-          <a:off x="0" y="0"/>
-          <a:ext cx="0" cy="0"/>
-          <a:chOff x="0" y="0"/>
-          <a:chExt cx="0" cy="0"/>
-        </a:xfrm>
-      </p:grpSpPr>
-      <p:sp>
-        <p:nvSpPr>
-          <p:cNvPr id="2" name="Title 1"/>
-          <p:cNvSpPr>
-            <a:spLocks noGrp="1"/>
-          </p:cNvSpPr>
-          <p:nvPr>
-            <p:ph type="title"/>
-          </p:nvPr>
-        </p:nvSpPr>
-        <p:spPr/>
-        <p:txBody>
-          <a:bodyPr>
-            <a:noAutofit/>
-          </a:bodyPr>
-          <a:lstStyle/>
-          <a:p>
-            <a:r>
-              <a:rPr lang="en-US" sz="6000" dirty="0"/>
-              <a:t>SVG Rectangle</a:t>
-            </a:r>
-          </a:p>
-        </p:txBody>
-      </p:sp>
-      <p:pic>
-        <p:nvPicPr>
-          <p:cNvPr id="5" name="Picture 4"/>
-          <p:cNvPicPr>
-            <a:picLocks noChangeAspect="1"/>
-          </p:cNvPicPr>
-          <p:nvPr/>
-        </p:nvPicPr>
-        <p:blipFill>
-          <a:blip r:embed="rId3"/>
-          <a:stretch>
-            <a:fillRect/>
-          </a:stretch>
-        </p:blipFill>
-        <p:spPr>
-          <a:xfrm>
-            <a:off x="1640420" y="2082800"/>
-            <a:ext cx="8886781" cy="3441700"/>
-          </a:xfrm>
-          <a:prstGeom prst="rect">
-            <a:avLst/>
-          </a:prstGeom>
-        </p:spPr>
-      </p:pic>
-    </p:spTree>
-    <p:extLst>
-      <p:ext uri="{BB962C8B-B14F-4D97-AF65-F5344CB8AC3E}">
-        <p14:creationId xmlns:p14="http://schemas.microsoft.com/office/powerpoint/2010/main" val="721676251"/>
-      </p:ext>
-    </p:extLst>
-  </p:cSld>
-  <p:clrMapOvr>
-    <a:masterClrMapping/>
-  </p:clrMapOvr>
-  <p:timing>
-    <p:tnLst>
-      <p:par>
-        <p:cTn id="1" dur="indefinite" restart="never" nodeType="tmRoot"/>
-      </p:par>
-    </p:tnLst>
-  </p:timing>
-</p:sld>
-</file>
-
-<file path=ppt/slides/slide14.xml><?xml version="1.0" encoding="utf-8"?>
-<p:sld xmlns:a="http://schemas.openxmlformats.org/drawingml/2006/main" xmlns:r="http://schemas.openxmlformats.org/officeDocument/2006/relationships" xmlns:p="http://schemas.openxmlformats.org/presentationml/2006/main">
-  <p:cSld>
-    <p:spTree>
-      <p:nvGrpSpPr>
-        <p:cNvPr id="1" name=""/>
-        <p:cNvGrpSpPr/>
-        <p:nvPr/>
-      </p:nvGrpSpPr>
-      <p:grpSpPr>
-        <a:xfrm>
-          <a:off x="0" y="0"/>
-          <a:ext cx="0" cy="0"/>
-          <a:chOff x="0" y="0"/>
-          <a:chExt cx="0" cy="0"/>
-        </a:xfrm>
-      </p:grpSpPr>
-      <p:sp>
-        <p:nvSpPr>
-          <p:cNvPr id="2" name="Title 1"/>
-          <p:cNvSpPr>
-            <a:spLocks noGrp="1"/>
-          </p:cNvSpPr>
-          <p:nvPr>
-            <p:ph type="title"/>
-          </p:nvPr>
-        </p:nvSpPr>
-        <p:spPr/>
-        <p:txBody>
-          <a:bodyPr>
-            <a:noAutofit/>
-          </a:bodyPr>
-          <a:lstStyle/>
-          <a:p>
-            <a:r>
-              <a:rPr lang="en-US" sz="6000" dirty="0"/>
-              <a:t>Demo Time!</a:t>
-            </a:r>
-          </a:p>
-        </p:txBody>
-      </p:sp>
-      <p:sp>
-        <p:nvSpPr>
-          <p:cNvPr id="3" name="Content Placeholder 2"/>
-          <p:cNvSpPr>
-            <a:spLocks noGrp="1"/>
-          </p:cNvSpPr>
-          <p:nvPr>
-            <p:ph idx="1"/>
-          </p:nvPr>
-        </p:nvSpPr>
-        <p:spPr>
-          <a:xfrm>
-            <a:off x="1577157" y="2850051"/>
-            <a:ext cx="9029700" cy="617050"/>
-          </a:xfrm>
-        </p:spPr>
-        <p:txBody>
-          <a:bodyPr>
-            <a:normAutofit/>
-          </a:bodyPr>
-          <a:lstStyle/>
-          <a:p>
-            <a:pPr marL="27675" indent="0" algn="ctr">
-              <a:buNone/>
-            </a:pPr>
-            <a:r>
-              <a:rPr lang="en-US" sz="2800" dirty="0">
-                <a:hlinkClick r:id="rId3"/>
-              </a:rPr>
-              <a:t>https://github.com/DustinEwers/D3-DotNetMVC-Demos</a:t>
-            </a:r>
-            <a:endParaRPr lang="en-US" sz="2800" dirty="0"/>
-          </a:p>
-          <a:p>
-            <a:pPr marL="27675" indent="0" algn="ctr">
-              <a:buNone/>
-            </a:pPr>
-            <a:endParaRPr lang="en-US" dirty="0"/>
-          </a:p>
-        </p:txBody>
-      </p:sp>
-    </p:spTree>
-    <p:extLst>
-      <p:ext uri="{BB962C8B-B14F-4D97-AF65-F5344CB8AC3E}">
-        <p14:creationId xmlns:p14="http://schemas.microsoft.com/office/powerpoint/2010/main" val="593212302"/>
-      </p:ext>
-    </p:extLst>
-  </p:cSld>
-  <p:clrMapOvr>
-    <a:masterClrMapping/>
-  </p:clrMapOvr>
-  <p:timing>
-    <p:tnLst>
-      <p:par>
-        <p:cTn id="1" dur="indefinite" restart="never" nodeType="tmRoot"/>
-      </p:par>
-    </p:tnLst>
-  </p:timing>
-</p:sld>
-</file>
-
-<file path=ppt/slides/slide15.xml><?xml version="1.0" encoding="utf-8"?>
-<p:sld xmlns:a="http://schemas.openxmlformats.org/drawingml/2006/main" xmlns:r="http://schemas.openxmlformats.org/officeDocument/2006/relationships" xmlns:p="http://schemas.openxmlformats.org/presentationml/2006/main">
-  <p:cSld>
-    <p:spTree>
-      <p:nvGrpSpPr>
-        <p:cNvPr id="1" name=""/>
-        <p:cNvGrpSpPr/>
-        <p:nvPr/>
-      </p:nvGrpSpPr>
-      <p:grpSpPr>
-        <a:xfrm>
-          <a:off x="0" y="0"/>
-          <a:ext cx="0" cy="0"/>
-          <a:chOff x="0" y="0"/>
-          <a:chExt cx="0" cy="0"/>
-        </a:xfrm>
-      </p:grpSpPr>
-      <p:sp>
-        <p:nvSpPr>
-          <p:cNvPr id="2" name="Title 1"/>
-          <p:cNvSpPr>
-            <a:spLocks noGrp="1"/>
-          </p:cNvSpPr>
-          <p:nvPr>
-            <p:ph type="title"/>
-          </p:nvPr>
-        </p:nvSpPr>
-        <p:spPr/>
-        <p:txBody>
-          <a:bodyPr>
-            <a:noAutofit/>
-          </a:bodyPr>
-          <a:lstStyle/>
-          <a:p>
-            <a:r>
-              <a:rPr lang="en-US" sz="6000" dirty="0"/>
               <a:t>Resources</a:t>
             </a:r>
           </a:p>
@@ -9594,9 +8407,23 @@
                 <a:effectLst/>
                 <a:hlinkClick r:id="rId9"/>
               </a:rPr>
-              <a:t>http://www.bls.gov/</a:t>
-            </a:r>
-            <a:endParaRPr lang="en-US" dirty="0">
+              <a:t>http://</a:t>
+            </a:r>
+            <a:r>
+              <a:rPr lang="en-US">
+                <a:effectLst/>
+                <a:hlinkClick r:id="rId9"/>
+              </a:rPr>
+              <a:t>www.bls.gov</a:t>
+            </a:r>
+            <a:r>
+              <a:rPr lang="en-US" smtClean="0">
+                <a:effectLst/>
+                <a:hlinkClick r:id="rId9"/>
+              </a:rPr>
+              <a:t>/</a:t>
+            </a:r>
+            <a:endParaRPr lang="en-US" smtClean="0">
               <a:effectLst/>
             </a:endParaRPr>
           </a:p>
@@ -9605,20 +8432,13 @@
               <a:buNone/>
             </a:pPr>
             <a:r>
-              <a:rPr lang="en-US" dirty="0" smtClean="0">
+              <a:rPr lang="en-US" smtClean="0">
                 <a:effectLst/>
                 <a:hlinkClick r:id="rId10"/>
               </a:rPr>
-              <a:t>https</a:t>
-            </a:r>
-            <a:r>
-              <a:rPr lang="en-US" dirty="0">
-                <a:effectLst/>
-                <a:hlinkClick r:id="rId10"/>
-              </a:rPr>
-              <a:t>://data.cityofmadison.com/</a:t>
-            </a:r>
-            <a:endParaRPr lang="en-US" dirty="0">
+              <a:t>https://data.cityofmadison.com/</a:t>
+            </a:r>
+            <a:endParaRPr lang="en-US" smtClean="0">
               <a:effectLst/>
             </a:endParaRPr>
           </a:p>
@@ -9626,7 +8446,7 @@
             <a:pPr marL="27675" indent="0">
               <a:buNone/>
             </a:pPr>
-            <a:endParaRPr lang="en-US" dirty="0"/>
+            <a:endParaRPr lang="en-US" smtClean="0"/>
           </a:p>
           <a:p>
             <a:pPr marL="27675" indent="0">
@@ -9685,8 +8505,8 @@
         </p:nvSpPr>
         <p:spPr>
           <a:xfrm>
-            <a:off x="2222046" y="132036"/>
-            <a:ext cx="7765322" cy="1059350"/>
+            <a:off x="743474" y="0"/>
+            <a:ext cx="10353762" cy="747293"/>
           </a:xfrm>
         </p:spPr>
         <p:txBody>
@@ -9696,103 +8516,593 @@
           <a:lstStyle/>
           <a:p>
             <a:r>
-              <a:rPr lang="en-US" sz="6000" dirty="0"/>
-              <a:t>Roadmap</a:t>
+              <a:rPr lang="en-US" dirty="0" smtClean="0"/>
+              <a:t>That Conference 2014 Sponsors</a:t>
             </a:r>
             <a:endParaRPr lang="en-US" dirty="0"/>
           </a:p>
         </p:txBody>
       </p:sp>
-      <p:sp>
-        <p:nvSpPr>
-          <p:cNvPr id="11" name="Content Placeholder 10"/>
-          <p:cNvSpPr>
-            <a:spLocks noGrp="1"/>
-          </p:cNvSpPr>
+      <p:pic>
+        <p:nvPicPr>
+          <p:cNvPr id="2050" name="Picture 2" descr="https://thatconference.blob.core.windows.net/sponsorimages/ibm.jpg"/>
+          <p:cNvPicPr>
+            <a:picLocks noGrp="1" noChangeAspect="1" noChangeArrowheads="1"/>
+          </p:cNvPicPr>
           <p:nvPr>
             <p:ph idx="1"/>
           </p:nvPr>
-        </p:nvSpPr>
-        <p:spPr>
-          <a:xfrm>
-            <a:off x="1764846" y="1191387"/>
-            <a:ext cx="7765322" cy="5565013"/>
-          </a:xfrm>
+        </p:nvPicPr>
+        <p:blipFill>
+          <a:blip r:embed="rId3">
+            <a:extLst>
+              <a:ext uri="{28A0092B-C50C-407E-A947-70E740481C1C}">
+                <a14:useLocalDpi xmlns:a14="http://schemas.microsoft.com/office/drawing/2010/main" val="0"/>
+              </a:ext>
+            </a:extLst>
+          </a:blip>
+          <a:srcRect/>
+          <a:stretch>
+            <a:fillRect/>
+          </a:stretch>
+        </p:blipFill>
+        <p:spPr bwMode="auto">
+          <a:xfrm>
+            <a:off x="243254" y="818421"/>
+            <a:ext cx="2716924" cy="2047731"/>
+          </a:xfrm>
+          <a:prstGeom prst="rect">
+            <a:avLst/>
+          </a:prstGeom>
+          <a:noFill/>
         </p:spPr>
-        <p:txBody>
-          <a:bodyPr>
-            <a:noAutofit/>
-          </a:bodyPr>
-          <a:lstStyle/>
-          <a:p>
-            <a:r>
-              <a:rPr lang="en-US" sz="2400" dirty="0"/>
-              <a:t>Why Data Visualization?</a:t>
-            </a:r>
-          </a:p>
-          <a:p>
-            <a:r>
-              <a:rPr lang="en-US" sz="2400" dirty="0"/>
-              <a:t>What is D3.js?</a:t>
-            </a:r>
-          </a:p>
-          <a:p>
-            <a:r>
-              <a:rPr lang="en-US" sz="2400" dirty="0"/>
-              <a:t>Why D3.js?</a:t>
-            </a:r>
-          </a:p>
-          <a:p>
-            <a:r>
-              <a:rPr lang="en-US" sz="2400" dirty="0"/>
-              <a:t>Why not D3.js?</a:t>
-            </a:r>
-          </a:p>
-          <a:p>
-            <a:r>
-              <a:rPr lang="en-US" sz="2400" dirty="0"/>
-              <a:t>Just enough SVG</a:t>
-            </a:r>
-          </a:p>
-          <a:p>
-            <a:r>
-              <a:rPr lang="en-US" sz="2400" dirty="0"/>
-              <a:t>Demos</a:t>
-            </a:r>
-          </a:p>
-          <a:p>
-            <a:pPr lvl="1"/>
-            <a:r>
-              <a:rPr lang="en-US" sz="2200" dirty="0"/>
-              <a:t>Using D3.js with ASP.NET</a:t>
-            </a:r>
-          </a:p>
-          <a:p>
-            <a:pPr lvl="1"/>
-            <a:r>
-              <a:rPr lang="en-US" sz="2200" dirty="0"/>
-              <a:t>Building Charts in D3.js</a:t>
-            </a:r>
-          </a:p>
-          <a:p>
-            <a:pPr lvl="1"/>
-            <a:r>
-              <a:rPr lang="en-US" sz="2200" dirty="0"/>
-              <a:t>Building Different Types of Visualizations</a:t>
-            </a:r>
-          </a:p>
-          <a:p>
-            <a:r>
-              <a:rPr lang="en-US" sz="2600" dirty="0"/>
-              <a:t>Resources</a:t>
-            </a:r>
-          </a:p>
-        </p:txBody>
-      </p:sp>
+      </p:pic>
+      <p:pic>
+        <p:nvPicPr>
+          <p:cNvPr id="2052" name="Picture 4" descr="https://thatconference.blob.core.windows.net/sponsorimages/InRule-Plat.jpg"/>
+          <p:cNvPicPr>
+            <a:picLocks noChangeAspect="1" noChangeArrowheads="1"/>
+          </p:cNvPicPr>
+          <p:nvPr/>
+        </p:nvPicPr>
+        <p:blipFill>
+          <a:blip r:embed="rId4">
+            <a:extLst>
+              <a:ext uri="{28A0092B-C50C-407E-A947-70E740481C1C}">
+                <a14:useLocalDpi xmlns:a14="http://schemas.microsoft.com/office/drawing/2010/main" val="0"/>
+              </a:ext>
+            </a:extLst>
+          </a:blip>
+          <a:srcRect/>
+          <a:stretch>
+            <a:fillRect/>
+          </a:stretch>
+        </p:blipFill>
+        <p:spPr bwMode="auto">
+          <a:xfrm>
+            <a:off x="3203431" y="818421"/>
+            <a:ext cx="2716924" cy="2047731"/>
+          </a:xfrm>
+          <a:prstGeom prst="rect">
+            <a:avLst/>
+          </a:prstGeom>
+          <a:noFill/>
+        </p:spPr>
+      </p:pic>
+      <p:pic>
+        <p:nvPicPr>
+          <p:cNvPr id="2054" name="Picture 6" descr="https://thatconference.blob.core.windows.net/sponsorimages/API-plat.jpg"/>
+          <p:cNvPicPr>
+            <a:picLocks noChangeAspect="1" noChangeArrowheads="1"/>
+          </p:cNvPicPr>
+          <p:nvPr/>
+        </p:nvPicPr>
+        <p:blipFill>
+          <a:blip r:embed="rId5">
+            <a:extLst>
+              <a:ext uri="{28A0092B-C50C-407E-A947-70E740481C1C}">
+                <a14:useLocalDpi xmlns:a14="http://schemas.microsoft.com/office/drawing/2010/main" val="0"/>
+              </a:ext>
+            </a:extLst>
+          </a:blip>
+          <a:srcRect/>
+          <a:stretch>
+            <a:fillRect/>
+          </a:stretch>
+        </p:blipFill>
+        <p:spPr bwMode="auto">
+          <a:xfrm>
+            <a:off x="6184413" y="818421"/>
+            <a:ext cx="2680615" cy="2020365"/>
+          </a:xfrm>
+          <a:prstGeom prst="rect">
+            <a:avLst/>
+          </a:prstGeom>
+          <a:noFill/>
+        </p:spPr>
+      </p:pic>
+      <p:pic>
+        <p:nvPicPr>
+          <p:cNvPr id="2056" name="Picture 8" descr="https://thatconference.blob.core.windows.net/sponsorimages/wordpress-com.jpg"/>
+          <p:cNvPicPr>
+            <a:picLocks noChangeAspect="1" noChangeArrowheads="1"/>
+          </p:cNvPicPr>
+          <p:nvPr/>
+        </p:nvPicPr>
+        <p:blipFill>
+          <a:blip r:embed="rId6">
+            <a:extLst>
+              <a:ext uri="{28A0092B-C50C-407E-A947-70E740481C1C}">
+                <a14:useLocalDpi xmlns:a14="http://schemas.microsoft.com/office/drawing/2010/main" val="0"/>
+              </a:ext>
+            </a:extLst>
+          </a:blip>
+          <a:srcRect/>
+          <a:stretch>
+            <a:fillRect/>
+          </a:stretch>
+        </p:blipFill>
+        <p:spPr bwMode="auto">
+          <a:xfrm>
+            <a:off x="9129086" y="818421"/>
+            <a:ext cx="2680615" cy="2020365"/>
+          </a:xfrm>
+          <a:prstGeom prst="rect">
+            <a:avLst/>
+          </a:prstGeom>
+          <a:noFill/>
+        </p:spPr>
+      </p:pic>
+      <p:pic>
+        <p:nvPicPr>
+          <p:cNvPr id="2058" name="Picture 10" descr="https://thatconference.blob.core.windows.net/sponsorimages/skyline.png"/>
+          <p:cNvPicPr>
+            <a:picLocks noChangeAspect="1" noChangeArrowheads="1"/>
+          </p:cNvPicPr>
+          <p:nvPr/>
+        </p:nvPicPr>
+        <p:blipFill>
+          <a:blip r:embed="rId7">
+            <a:extLst>
+              <a:ext uri="{28A0092B-C50C-407E-A947-70E740481C1C}">
+                <a14:useLocalDpi xmlns:a14="http://schemas.microsoft.com/office/drawing/2010/main" val="0"/>
+              </a:ext>
+            </a:extLst>
+          </a:blip>
+          <a:srcRect/>
+          <a:stretch>
+            <a:fillRect/>
+          </a:stretch>
+        </p:blipFill>
+        <p:spPr bwMode="auto">
+          <a:xfrm>
+            <a:off x="565931" y="3003178"/>
+            <a:ext cx="2071570" cy="1381046"/>
+          </a:xfrm>
+          <a:prstGeom prst="rect">
+            <a:avLst/>
+          </a:prstGeom>
+          <a:noFill/>
+        </p:spPr>
+      </p:pic>
+      <p:pic>
+        <p:nvPicPr>
+          <p:cNvPr id="2060" name="Picture 12" descr="https://thatconference.blob.core.windows.net/sponsorimages/safenet.png"/>
+          <p:cNvPicPr>
+            <a:picLocks noChangeAspect="1" noChangeArrowheads="1"/>
+          </p:cNvPicPr>
+          <p:nvPr/>
+        </p:nvPicPr>
+        <p:blipFill>
+          <a:blip r:embed="rId8">
+            <a:extLst>
+              <a:ext uri="{28A0092B-C50C-407E-A947-70E740481C1C}">
+                <a14:useLocalDpi xmlns:a14="http://schemas.microsoft.com/office/drawing/2010/main" val="0"/>
+              </a:ext>
+            </a:extLst>
+          </a:blip>
+          <a:srcRect/>
+          <a:stretch>
+            <a:fillRect/>
+          </a:stretch>
+        </p:blipFill>
+        <p:spPr bwMode="auto">
+          <a:xfrm>
+            <a:off x="2787535" y="3003178"/>
+            <a:ext cx="2071570" cy="1381046"/>
+          </a:xfrm>
+          <a:prstGeom prst="rect">
+            <a:avLst/>
+          </a:prstGeom>
+          <a:noFill/>
+        </p:spPr>
+      </p:pic>
+      <p:pic>
+        <p:nvPicPr>
+          <p:cNvPr id="2062" name="Picture 14" descr="https://thatconference.blob.core.windows.net/sponsorimages/devExpress.jpg"/>
+          <p:cNvPicPr>
+            <a:picLocks noChangeAspect="1" noChangeArrowheads="1"/>
+          </p:cNvPicPr>
+          <p:nvPr/>
+        </p:nvPicPr>
+        <p:blipFill>
+          <a:blip r:embed="rId9">
+            <a:extLst>
+              <a:ext uri="{28A0092B-C50C-407E-A947-70E740481C1C}">
+                <a14:useLocalDpi xmlns:a14="http://schemas.microsoft.com/office/drawing/2010/main" val="0"/>
+              </a:ext>
+            </a:extLst>
+          </a:blip>
+          <a:srcRect/>
+          <a:stretch>
+            <a:fillRect/>
+          </a:stretch>
+        </p:blipFill>
+        <p:spPr bwMode="auto">
+          <a:xfrm>
+            <a:off x="5009139" y="3003178"/>
+            <a:ext cx="2071570" cy="1381046"/>
+          </a:xfrm>
+          <a:prstGeom prst="rect">
+            <a:avLst/>
+          </a:prstGeom>
+          <a:noFill/>
+        </p:spPr>
+      </p:pic>
+      <p:pic>
+        <p:nvPicPr>
+          <p:cNvPr id="2064" name="Picture 16" descr="https://thatconference.blob.core.windows.net/sponsorimages/onmi.jpg"/>
+          <p:cNvPicPr>
+            <a:picLocks noChangeAspect="1" noChangeArrowheads="1"/>
+          </p:cNvPicPr>
+          <p:nvPr/>
+        </p:nvPicPr>
+        <p:blipFill>
+          <a:blip r:embed="rId10">
+            <a:extLst>
+              <a:ext uri="{28A0092B-C50C-407E-A947-70E740481C1C}">
+                <a14:useLocalDpi xmlns:a14="http://schemas.microsoft.com/office/drawing/2010/main" val="0"/>
+              </a:ext>
+            </a:extLst>
+          </a:blip>
+          <a:srcRect/>
+          <a:stretch>
+            <a:fillRect/>
+          </a:stretch>
+        </p:blipFill>
+        <p:spPr bwMode="auto">
+          <a:xfrm>
+            <a:off x="9452347" y="3003178"/>
+            <a:ext cx="2071570" cy="1381046"/>
+          </a:xfrm>
+          <a:prstGeom prst="rect">
+            <a:avLst/>
+          </a:prstGeom>
+          <a:noFill/>
+        </p:spPr>
+      </p:pic>
+      <p:pic>
+        <p:nvPicPr>
+          <p:cNvPr id="2066" name="Picture 18" descr="https://thatconference.blob.core.windows.net/sponsorimages/corvisa.jpg"/>
+          <p:cNvPicPr>
+            <a:picLocks noChangeAspect="1" noChangeArrowheads="1"/>
+          </p:cNvPicPr>
+          <p:nvPr/>
+        </p:nvPicPr>
+        <p:blipFill>
+          <a:blip r:embed="rId11">
+            <a:extLst>
+              <a:ext uri="{28A0092B-C50C-407E-A947-70E740481C1C}">
+                <a14:useLocalDpi xmlns:a14="http://schemas.microsoft.com/office/drawing/2010/main" val="0"/>
+              </a:ext>
+            </a:extLst>
+          </a:blip>
+          <a:srcRect/>
+          <a:stretch>
+            <a:fillRect/>
+          </a:stretch>
+        </p:blipFill>
+        <p:spPr bwMode="auto">
+          <a:xfrm>
+            <a:off x="7230743" y="3003178"/>
+            <a:ext cx="2071570" cy="1381046"/>
+          </a:xfrm>
+          <a:prstGeom prst="rect">
+            <a:avLst/>
+          </a:prstGeom>
+          <a:noFill/>
+        </p:spPr>
+      </p:pic>
+      <p:grpSp>
+        <p:nvGrpSpPr>
+          <p:cNvPr id="7" name="Group 6"/>
+          <p:cNvGrpSpPr/>
+          <p:nvPr/>
+        </p:nvGrpSpPr>
+        <p:grpSpPr>
+          <a:xfrm>
+            <a:off x="565931" y="4521250"/>
+            <a:ext cx="4043014" cy="1317170"/>
+            <a:chOff x="1131186" y="4521250"/>
+            <a:chExt cx="4378637" cy="1426512"/>
+          </a:xfrm>
+        </p:grpSpPr>
+        <p:pic>
+          <p:nvPicPr>
+            <p:cNvPr id="2068" name="Picture 20" descr="https://thatconference.blob.core.windows.net/sponsorimages/sonomaPartners.jpg"/>
+            <p:cNvPicPr>
+              <a:picLocks noChangeAspect="1" noChangeArrowheads="1"/>
+            </p:cNvPicPr>
+            <p:nvPr/>
+          </p:nvPicPr>
+          <p:blipFill>
+            <a:blip r:embed="rId12">
+              <a:extLst>
+                <a:ext uri="{28A0092B-C50C-407E-A947-70E740481C1C}">
+                  <a14:useLocalDpi xmlns:a14="http://schemas.microsoft.com/office/drawing/2010/main" val="0"/>
+                </a:ext>
+              </a:extLst>
+            </a:blip>
+            <a:srcRect/>
+            <a:stretch>
+              <a:fillRect/>
+            </a:stretch>
+          </p:blipFill>
+          <p:spPr bwMode="auto">
+            <a:xfrm>
+              <a:off x="1131186" y="4521250"/>
+              <a:ext cx="2139768" cy="1426512"/>
+            </a:xfrm>
+            <a:prstGeom prst="rect">
+              <a:avLst/>
+            </a:prstGeom>
+            <a:noFill/>
+          </p:spPr>
+        </p:pic>
+        <p:pic>
+          <p:nvPicPr>
+            <p:cNvPr id="2070" name="Picture 22" descr="https://thatconference.blob.core.windows.net/sponsorimages/jetbrains.jpg"/>
+            <p:cNvPicPr>
+              <a:picLocks noChangeAspect="1" noChangeArrowheads="1"/>
+            </p:cNvPicPr>
+            <p:nvPr/>
+          </p:nvPicPr>
+          <p:blipFill>
+            <a:blip r:embed="rId13">
+              <a:extLst>
+                <a:ext uri="{28A0092B-C50C-407E-A947-70E740481C1C}">
+                  <a14:useLocalDpi xmlns:a14="http://schemas.microsoft.com/office/drawing/2010/main" val="0"/>
+                </a:ext>
+              </a:extLst>
+            </a:blip>
+            <a:srcRect/>
+            <a:stretch>
+              <a:fillRect/>
+            </a:stretch>
+          </p:blipFill>
+          <p:spPr bwMode="auto">
+            <a:xfrm>
+              <a:off x="3370055" y="4521250"/>
+              <a:ext cx="2139768" cy="1426512"/>
+            </a:xfrm>
+            <a:prstGeom prst="rect">
+              <a:avLst/>
+            </a:prstGeom>
+            <a:noFill/>
+          </p:spPr>
+        </p:pic>
+      </p:grpSp>
+      <p:grpSp>
+        <p:nvGrpSpPr>
+          <p:cNvPr id="8" name="Group 7"/>
+          <p:cNvGrpSpPr/>
+          <p:nvPr/>
+        </p:nvGrpSpPr>
+        <p:grpSpPr>
+          <a:xfrm>
+            <a:off x="6436427" y="4545157"/>
+            <a:ext cx="5087490" cy="2271421"/>
+            <a:chOff x="5174110" y="4513232"/>
+            <a:chExt cx="5256971" cy="2347090"/>
+          </a:xfrm>
+        </p:grpSpPr>
+        <p:pic>
+          <p:nvPicPr>
+            <p:cNvPr id="2072" name="Picture 24" descr="https://thatconference.blob.core.windows.net/sponsorimages/jjkeller.png"/>
+            <p:cNvPicPr>
+              <a:picLocks noChangeAspect="1" noChangeArrowheads="1"/>
+            </p:cNvPicPr>
+            <p:nvPr/>
+          </p:nvPicPr>
+          <p:blipFill>
+            <a:blip r:embed="rId14">
+              <a:extLst>
+                <a:ext uri="{28A0092B-C50C-407E-A947-70E740481C1C}">
+                  <a14:useLocalDpi xmlns:a14="http://schemas.microsoft.com/office/drawing/2010/main" val="0"/>
+                </a:ext>
+              </a:extLst>
+            </a:blip>
+            <a:srcRect/>
+            <a:stretch>
+              <a:fillRect/>
+            </a:stretch>
+          </p:blipFill>
+          <p:spPr bwMode="auto">
+            <a:xfrm>
+              <a:off x="6964605" y="5736844"/>
+              <a:ext cx="1685217" cy="1123478"/>
+            </a:xfrm>
+            <a:prstGeom prst="rect">
+              <a:avLst/>
+            </a:prstGeom>
+            <a:noFill/>
+          </p:spPr>
+        </p:pic>
+        <p:pic>
+          <p:nvPicPr>
+            <p:cNvPr id="2074" name="Picture 26" descr="https://thatconference.blob.core.windows.net/sponsorimages/nrc.jpg"/>
+            <p:cNvPicPr>
+              <a:picLocks noChangeAspect="1" noChangeArrowheads="1"/>
+            </p:cNvPicPr>
+            <p:nvPr/>
+          </p:nvPicPr>
+          <p:blipFill>
+            <a:blip r:embed="rId15">
+              <a:extLst>
+                <a:ext uri="{28A0092B-C50C-407E-A947-70E740481C1C}">
+                  <a14:useLocalDpi xmlns:a14="http://schemas.microsoft.com/office/drawing/2010/main" val="0"/>
+                </a:ext>
+              </a:extLst>
+            </a:blip>
+            <a:srcRect/>
+            <a:stretch>
+              <a:fillRect/>
+            </a:stretch>
+          </p:blipFill>
+          <p:spPr bwMode="auto">
+            <a:xfrm>
+              <a:off x="5174110" y="5734522"/>
+              <a:ext cx="1685217" cy="1123478"/>
+            </a:xfrm>
+            <a:prstGeom prst="rect">
+              <a:avLst/>
+            </a:prstGeom>
+            <a:noFill/>
+          </p:spPr>
+        </p:pic>
+        <p:pic>
+          <p:nvPicPr>
+            <p:cNvPr id="2076" name="Picture 28" descr="https://thatconference.blob.core.windows.net/sponsorimages/MSFT.png"/>
+            <p:cNvPicPr>
+              <a:picLocks noChangeAspect="1" noChangeArrowheads="1"/>
+            </p:cNvPicPr>
+            <p:nvPr/>
+          </p:nvPicPr>
+          <p:blipFill>
+            <a:blip r:embed="rId16">
+              <a:extLst>
+                <a:ext uri="{28A0092B-C50C-407E-A947-70E740481C1C}">
+                  <a14:useLocalDpi xmlns:a14="http://schemas.microsoft.com/office/drawing/2010/main" val="0"/>
+                </a:ext>
+              </a:extLst>
+            </a:blip>
+            <a:srcRect/>
+            <a:stretch>
+              <a:fillRect/>
+            </a:stretch>
+          </p:blipFill>
+          <p:spPr bwMode="auto">
+            <a:xfrm>
+              <a:off x="5174110" y="4525557"/>
+              <a:ext cx="1685217" cy="1123478"/>
+            </a:xfrm>
+            <a:prstGeom prst="rect">
+              <a:avLst/>
+            </a:prstGeom>
+            <a:noFill/>
+          </p:spPr>
+        </p:pic>
+        <p:pic>
+          <p:nvPicPr>
+            <p:cNvPr id="2078" name="Picture 30" descr="https://thatconference.blob.core.windows.net/sponsorimages/centare.jpg"/>
+            <p:cNvPicPr>
+              <a:picLocks noChangeAspect="1" noChangeArrowheads="1"/>
+            </p:cNvPicPr>
+            <p:nvPr/>
+          </p:nvPicPr>
+          <p:blipFill>
+            <a:blip r:embed="rId17">
+              <a:extLst>
+                <a:ext uri="{28A0092B-C50C-407E-A947-70E740481C1C}">
+                  <a14:useLocalDpi xmlns:a14="http://schemas.microsoft.com/office/drawing/2010/main" val="0"/>
+                </a:ext>
+              </a:extLst>
+            </a:blip>
+            <a:srcRect/>
+            <a:stretch>
+              <a:fillRect/>
+            </a:stretch>
+          </p:blipFill>
+          <p:spPr bwMode="auto">
+            <a:xfrm>
+              <a:off x="6958428" y="4515511"/>
+              <a:ext cx="1685217" cy="1123478"/>
+            </a:xfrm>
+            <a:prstGeom prst="rect">
+              <a:avLst/>
+            </a:prstGeom>
+            <a:noFill/>
+          </p:spPr>
+        </p:pic>
+        <p:pic>
+          <p:nvPicPr>
+            <p:cNvPr id="2080" name="Picture 32" descr="https://thatconference.blob.core.windows.net/sponsorimages/exacta.jpg"/>
+            <p:cNvPicPr>
+              <a:picLocks noChangeAspect="1" noChangeArrowheads="1"/>
+            </p:cNvPicPr>
+            <p:nvPr/>
+          </p:nvPicPr>
+          <p:blipFill>
+            <a:blip r:embed="rId18">
+              <a:extLst>
+                <a:ext uri="{28A0092B-C50C-407E-A947-70E740481C1C}">
+                  <a14:useLocalDpi xmlns:a14="http://schemas.microsoft.com/office/drawing/2010/main" val="0"/>
+                </a:ext>
+              </a:extLst>
+            </a:blip>
+            <a:srcRect/>
+            <a:stretch>
+              <a:fillRect/>
+            </a:stretch>
+          </p:blipFill>
+          <p:spPr bwMode="auto">
+            <a:xfrm>
+              <a:off x="8733510" y="4513232"/>
+              <a:ext cx="1685217" cy="1123478"/>
+            </a:xfrm>
+            <a:prstGeom prst="rect">
+              <a:avLst/>
+            </a:prstGeom>
+            <a:noFill/>
+          </p:spPr>
+        </p:pic>
+        <p:pic>
+          <p:nvPicPr>
+            <p:cNvPr id="2082" name="Picture 34" descr="https://thatconference.blob.core.windows.net/sponsorimages/c1.png"/>
+            <p:cNvPicPr>
+              <a:picLocks noChangeAspect="1" noChangeArrowheads="1"/>
+            </p:cNvPicPr>
+            <p:nvPr/>
+          </p:nvPicPr>
+          <p:blipFill>
+            <a:blip r:embed="rId19">
+              <a:extLst>
+                <a:ext uri="{28A0092B-C50C-407E-A947-70E740481C1C}">
+                  <a14:useLocalDpi xmlns:a14="http://schemas.microsoft.com/office/drawing/2010/main" val="0"/>
+                </a:ext>
+              </a:extLst>
+            </a:blip>
+            <a:srcRect/>
+            <a:stretch>
+              <a:fillRect/>
+            </a:stretch>
+          </p:blipFill>
+          <p:spPr bwMode="auto">
+            <a:xfrm>
+              <a:off x="8745864" y="5728774"/>
+              <a:ext cx="1685217" cy="1123478"/>
+            </a:xfrm>
+            <a:prstGeom prst="rect">
+              <a:avLst/>
+            </a:prstGeom>
+            <a:noFill/>
+          </p:spPr>
+        </p:pic>
+      </p:grpSp>
     </p:spTree>
     <p:extLst>
       <p:ext uri="{BB962C8B-B14F-4D97-AF65-F5344CB8AC3E}">
-        <p14:creationId xmlns:p14="http://schemas.microsoft.com/office/powerpoint/2010/main" val="3075287476"/>
+        <p14:creationId xmlns:p14="http://schemas.microsoft.com/office/powerpoint/2010/main" val="2316687795"/>
       </p:ext>
     </p:extLst>
   </p:cSld>
@@ -9838,8 +9148,38 @@
         </p:nvSpPr>
         <p:spPr>
           <a:xfrm>
-            <a:off x="915126" y="260684"/>
-            <a:ext cx="10353762" cy="970450"/>
+            <a:off x="2222046" y="132036"/>
+            <a:ext cx="7765322" cy="1059350"/>
+          </a:xfrm>
+        </p:spPr>
+        <p:txBody>
+          <a:bodyPr>
+            <a:normAutofit/>
+          </a:bodyPr>
+          <a:lstStyle/>
+          <a:p>
+            <a:r>
+              <a:rPr lang="en-US" sz="6000" dirty="0"/>
+              <a:t>Roadmap</a:t>
+            </a:r>
+            <a:endParaRPr lang="en-US" dirty="0"/>
+          </a:p>
+        </p:txBody>
+      </p:sp>
+      <p:sp>
+        <p:nvSpPr>
+          <p:cNvPr id="11" name="Content Placeholder 10"/>
+          <p:cNvSpPr>
+            <a:spLocks noGrp="1"/>
+          </p:cNvSpPr>
+          <p:nvPr>
+            <p:ph idx="1"/>
+          </p:nvPr>
+        </p:nvSpPr>
+        <p:spPr>
+          <a:xfrm>
+            <a:off x="1764846" y="1191387"/>
+            <a:ext cx="7765322" cy="5565013"/>
           </a:xfrm>
         </p:spPr>
         <p:txBody>
@@ -9849,40 +9189,73 @@
           <a:lstStyle/>
           <a:p>
             <a:r>
-              <a:rPr lang="en-US" sz="6000" dirty="0"/>
-              <a:t>Why Data Visualization? </a:t>
-            </a:r>
-          </a:p>
-        </p:txBody>
-      </p:sp>
-      <p:pic>
-        <p:nvPicPr>
-          <p:cNvPr id="4" name="Picture 3"/>
-          <p:cNvPicPr>
-            <a:picLocks noChangeAspect="1"/>
-          </p:cNvPicPr>
-          <p:nvPr/>
-        </p:nvPicPr>
-        <p:blipFill>
-          <a:blip r:embed="rId3"/>
-          <a:stretch>
-            <a:fillRect/>
-          </a:stretch>
-        </p:blipFill>
-        <p:spPr>
-          <a:xfrm>
-            <a:off x="1347537" y="1422742"/>
-            <a:ext cx="9488940" cy="5307916"/>
-          </a:xfrm>
-          <a:prstGeom prst="rect">
-            <a:avLst/>
-          </a:prstGeom>
-        </p:spPr>
-      </p:pic>
+              <a:rPr lang="en-US" sz="2400" dirty="0"/>
+              <a:t>Why Data Visualization?</a:t>
+            </a:r>
+          </a:p>
+          <a:p>
+            <a:r>
+              <a:rPr lang="en-US" sz="2400" dirty="0"/>
+              <a:t>What is D3.js?</a:t>
+            </a:r>
+          </a:p>
+          <a:p>
+            <a:r>
+              <a:rPr lang="en-US" sz="2400" dirty="0"/>
+              <a:t>Why D3.js?</a:t>
+            </a:r>
+          </a:p>
+          <a:p>
+            <a:r>
+              <a:rPr lang="en-US" sz="2400" dirty="0"/>
+              <a:t>Why not D3.js?</a:t>
+            </a:r>
+          </a:p>
+          <a:p>
+            <a:r>
+              <a:rPr lang="en-US" sz="2400" dirty="0"/>
+              <a:t>Just enough SVG</a:t>
+            </a:r>
+          </a:p>
+          <a:p>
+            <a:r>
+              <a:rPr lang="en-US" sz="2400" dirty="0"/>
+              <a:t>Demos</a:t>
+            </a:r>
+          </a:p>
+          <a:p>
+            <a:pPr lvl="1"/>
+            <a:r>
+              <a:rPr lang="en-US" sz="2200" dirty="0"/>
+              <a:t>Using D3.js with ASP.NET</a:t>
+            </a:r>
+          </a:p>
+          <a:p>
+            <a:pPr lvl="1"/>
+            <a:r>
+              <a:rPr lang="en-US" sz="2200" dirty="0"/>
+              <a:t>Building Charts in D3.js</a:t>
+            </a:r>
+          </a:p>
+          <a:p>
+            <a:pPr lvl="1"/>
+            <a:r>
+              <a:rPr lang="en-US" sz="2200" dirty="0"/>
+              <a:t>Building Different Types of Visualizations</a:t>
+            </a:r>
+          </a:p>
+          <a:p>
+            <a:r>
+              <a:rPr lang="en-US" sz="2600" dirty="0"/>
+              <a:t>Resources</a:t>
+            </a:r>
+          </a:p>
+        </p:txBody>
+      </p:sp>
     </p:spTree>
     <p:extLst>
       <p:ext uri="{BB962C8B-B14F-4D97-AF65-F5344CB8AC3E}">
-        <p14:creationId xmlns:p14="http://schemas.microsoft.com/office/powerpoint/2010/main" val="2929499422"/>
+        <p14:creationId xmlns:p14="http://schemas.microsoft.com/office/powerpoint/2010/main" val="3075287476"/>
       </p:ext>
     </p:extLst>
   </p:cSld>
@@ -9928,8 +9301,8 @@
         </p:nvSpPr>
         <p:spPr>
           <a:xfrm>
-            <a:off x="0" y="101600"/>
-            <a:ext cx="12192000" cy="884989"/>
+            <a:off x="915126" y="260684"/>
+            <a:ext cx="10353762" cy="970450"/>
           </a:xfrm>
         </p:spPr>
         <p:txBody>
@@ -9940,104 +9313,8 @@
           <a:p>
             <a:r>
               <a:rPr lang="en-US" sz="6000" dirty="0"/>
-              <a:t>Data Visualization Adds Meaning</a:t>
-            </a:r>
-          </a:p>
-        </p:txBody>
-      </p:sp>
-      <p:sp>
-        <p:nvSpPr>
-          <p:cNvPr id="3" name="Content Placeholder 2"/>
-          <p:cNvSpPr>
-            <a:spLocks noGrp="1"/>
-          </p:cNvSpPr>
-          <p:nvPr>
-            <p:ph idx="1"/>
-          </p:nvPr>
-        </p:nvSpPr>
-        <p:spPr>
-          <a:xfrm>
-            <a:off x="753980" y="4317999"/>
-            <a:ext cx="7404100" cy="2540001"/>
-          </a:xfrm>
-        </p:spPr>
-        <p:txBody>
-          <a:bodyPr>
-            <a:normAutofit fontScale="85000" lnSpcReduction="20000"/>
-          </a:bodyPr>
-          <a:lstStyle/>
-          <a:p>
-            <a:pPr marL="337500" lvl="1" indent="0">
-              <a:buNone/>
-            </a:pPr>
-            <a:endParaRPr lang="en-US" dirty="0" smtClean="0"/>
-          </a:p>
-          <a:p>
-            <a:pPr marL="337500" lvl="1" indent="0">
-              <a:buNone/>
-            </a:pPr>
-            <a:endParaRPr lang="en-US" dirty="0"/>
-          </a:p>
-          <a:p>
-            <a:pPr marL="337500" lvl="1" indent="0">
-              <a:buNone/>
-            </a:pPr>
-            <a:endParaRPr lang="en-US" dirty="0" smtClean="0"/>
-          </a:p>
-          <a:p>
-            <a:pPr marL="337500" lvl="1" indent="0">
-              <a:buNone/>
-            </a:pPr>
-            <a:endParaRPr lang="en-US" dirty="0"/>
-          </a:p>
-          <a:p>
-            <a:pPr marL="337500" lvl="1" indent="0">
-              <a:buNone/>
-            </a:pPr>
-            <a:endParaRPr lang="en-US" dirty="0" smtClean="0"/>
-          </a:p>
-          <a:p>
-            <a:pPr marL="337500" lvl="1" indent="0">
-              <a:buNone/>
-            </a:pPr>
-            <a:endParaRPr lang="en-US" dirty="0"/>
-          </a:p>
-          <a:p>
-            <a:pPr marL="337500" lvl="1" indent="0">
-              <a:buNone/>
-            </a:pPr>
-            <a:endParaRPr lang="en-US" dirty="0" smtClean="0"/>
-          </a:p>
-          <a:p>
-            <a:pPr marL="337500" lvl="1" indent="0">
-              <a:buNone/>
-            </a:pPr>
-            <a:r>
-              <a:rPr lang="en-US" dirty="0"/>
-              <a:t>Source: </a:t>
-            </a:r>
-            <a:r>
-              <a:rPr lang="en-US" dirty="0">
-                <a:hlinkClick r:id="rId3"/>
-              </a:rPr>
-              <a:t>http://kepler.nasa.gov/multimedia/artwork/diagrams/?</a:t>
-            </a:r>
-            <a:r>
-              <a:rPr lang="en-US" dirty="0" smtClean="0">
-                <a:hlinkClick r:id="rId3"/>
-              </a:rPr>
-              <a:t>ImageID=123</a:t>
-            </a:r>
-            <a:endParaRPr lang="en-US" dirty="0" smtClean="0"/>
-          </a:p>
-          <a:p>
-            <a:pPr marL="337500" lvl="1" indent="0">
-              <a:buNone/>
-            </a:pPr>
-            <a:endParaRPr lang="en-US" dirty="0"/>
-          </a:p>
-          <a:p>
-            <a:endParaRPr lang="en-US" dirty="0"/>
+              <a:t>Why Data Visualization? </a:t>
+            </a:r>
           </a:p>
         </p:txBody>
       </p:sp>
@@ -10050,15 +9327,15 @@
           <p:nvPr/>
         </p:nvPicPr>
         <p:blipFill>
-          <a:blip r:embed="rId4"/>
+          <a:blip r:embed="rId3"/>
           <a:stretch>
             <a:fillRect/>
           </a:stretch>
         </p:blipFill>
         <p:spPr>
           <a:xfrm>
-            <a:off x="1203158" y="885921"/>
-            <a:ext cx="9785684" cy="5332074"/>
+            <a:off x="1347537" y="1422742"/>
+            <a:ext cx="9488940" cy="5307916"/>
           </a:xfrm>
           <a:prstGeom prst="rect">
             <a:avLst/>
@@ -10068,7 +9345,7 @@
     </p:spTree>
     <p:extLst>
       <p:ext uri="{BB962C8B-B14F-4D97-AF65-F5344CB8AC3E}">
-        <p14:creationId xmlns:p14="http://schemas.microsoft.com/office/powerpoint/2010/main" val="870951136"/>
+        <p14:creationId xmlns:p14="http://schemas.microsoft.com/office/powerpoint/2010/main" val="2929499422"/>
       </p:ext>
     </p:extLst>
   </p:cSld>
@@ -10114,8 +9391,8 @@
         </p:nvSpPr>
         <p:spPr>
           <a:xfrm>
-            <a:off x="0" y="323203"/>
-            <a:ext cx="12192000" cy="727838"/>
+            <a:off x="0" y="101600"/>
+            <a:ext cx="12192000" cy="884989"/>
           </a:xfrm>
         </p:spPr>
         <p:txBody>
@@ -10125,8 +9402,8 @@
           <a:lstStyle/>
           <a:p>
             <a:r>
-              <a:rPr lang="en-US" sz="5400" dirty="0"/>
-              <a:t>Data Visualization can Tell Stories</a:t>
+              <a:rPr lang="en-US" sz="6000" dirty="0"/>
+              <a:t>Data Visualization Adds Meaning</a:t>
             </a:r>
           </a:p>
         </p:txBody>
@@ -10143,32 +9420,87 @@
         </p:nvSpPr>
         <p:spPr>
           <a:xfrm>
-            <a:off x="2162545" y="5930273"/>
-            <a:ext cx="5097380" cy="391674"/>
+            <a:off x="753980" y="4317999"/>
+            <a:ext cx="7404100" cy="2540001"/>
           </a:xfrm>
         </p:spPr>
         <p:txBody>
           <a:bodyPr>
-            <a:noAutofit/>
+            <a:normAutofit fontScale="85000" lnSpcReduction="20000"/>
           </a:bodyPr>
           <a:lstStyle/>
           <a:p>
-            <a:pPr marL="27675" indent="0">
+            <a:pPr marL="337500" lvl="1" indent="0">
               <a:buNone/>
             </a:pPr>
-            <a:r>
-              <a:rPr lang="en-US" sz="1600" dirty="0">
+            <a:endParaRPr lang="en-US" dirty="0" smtClean="0"/>
+          </a:p>
+          <a:p>
+            <a:pPr marL="337500" lvl="1" indent="0">
+              <a:buNone/>
+            </a:pPr>
+            <a:endParaRPr lang="en-US" dirty="0"/>
+          </a:p>
+          <a:p>
+            <a:pPr marL="337500" lvl="1" indent="0">
+              <a:buNone/>
+            </a:pPr>
+            <a:endParaRPr lang="en-US" dirty="0" smtClean="0"/>
+          </a:p>
+          <a:p>
+            <a:pPr marL="337500" lvl="1" indent="0">
+              <a:buNone/>
+            </a:pPr>
+            <a:endParaRPr lang="en-US" dirty="0"/>
+          </a:p>
+          <a:p>
+            <a:pPr marL="337500" lvl="1" indent="0">
+              <a:buNone/>
+            </a:pPr>
+            <a:endParaRPr lang="en-US" dirty="0" smtClean="0"/>
+          </a:p>
+          <a:p>
+            <a:pPr marL="337500" lvl="1" indent="0">
+              <a:buNone/>
+            </a:pPr>
+            <a:endParaRPr lang="en-US" dirty="0"/>
+          </a:p>
+          <a:p>
+            <a:pPr marL="337500" lvl="1" indent="0">
+              <a:buNone/>
+            </a:pPr>
+            <a:endParaRPr lang="en-US" dirty="0" smtClean="0"/>
+          </a:p>
+          <a:p>
+            <a:pPr marL="337500" lvl="1" indent="0">
+              <a:buNone/>
+            </a:pPr>
+            <a:r>
+              <a:rPr lang="en-US" dirty="0"/>
+              <a:t>Source: </a:t>
+            </a:r>
+            <a:r>
+              <a:rPr lang="en-US" dirty="0">
                 <a:hlinkClick r:id="rId3"/>
               </a:rPr>
-              <a:t>Source: http://bost.ocks.org/mike/nations/</a:t>
-            </a:r>
-            <a:endParaRPr lang="en-US" sz="1600" dirty="0"/>
-          </a:p>
-          <a:p>
-            <a:pPr marL="27675" indent="0">
+              <a:t>http://kepler.nasa.gov/multimedia/artwork/diagrams/?</a:t>
+            </a:r>
+            <a:r>
+              <a:rPr lang="en-US" dirty="0" smtClean="0">
+                <a:hlinkClick r:id="rId3"/>
+              </a:rPr>
+              <a:t>ImageID=123</a:t>
+            </a:r>
+            <a:endParaRPr lang="en-US" dirty="0" smtClean="0"/>
+          </a:p>
+          <a:p>
+            <a:pPr marL="337500" lvl="1" indent="0">
               <a:buNone/>
             </a:pPr>
-            <a:endParaRPr lang="en-US" sz="1600" dirty="0"/>
+            <a:endParaRPr lang="en-US" dirty="0"/>
+          </a:p>
+          <a:p>
+            <a:endParaRPr lang="en-US" dirty="0"/>
           </a:p>
         </p:txBody>
       </p:sp>
@@ -10188,63 +9520,18 @@
         </p:blipFill>
         <p:spPr>
           <a:xfrm>
-            <a:off x="2225968" y="1049627"/>
-            <a:ext cx="7740064" cy="4815120"/>
+            <a:off x="1203158" y="885921"/>
+            <a:ext cx="9785684" cy="5332074"/>
           </a:xfrm>
           <a:prstGeom prst="rect">
             <a:avLst/>
           </a:prstGeom>
         </p:spPr>
       </p:pic>
-      <p:sp>
-        <p:nvSpPr>
-          <p:cNvPr id="5" name="TextBox 4"/>
-          <p:cNvSpPr txBox="1"/>
-          <p:nvPr/>
-        </p:nvSpPr>
-        <p:spPr>
-          <a:xfrm>
-            <a:off x="2162545" y="6365127"/>
-            <a:ext cx="5611528" cy="1200329"/>
-          </a:xfrm>
-          <a:prstGeom prst="rect">
-            <a:avLst/>
-          </a:prstGeom>
-          <a:noFill/>
-        </p:spPr>
-        <p:txBody>
-          <a:bodyPr wrap="square" rtlCol="0">
-            <a:spAutoFit/>
-          </a:bodyPr>
-          <a:lstStyle/>
-          <a:p>
-            <a:r>
-              <a:rPr lang="en-US" dirty="0"/>
-              <a:t>200 Years That Changed the World: </a:t>
-            </a:r>
-            <a:r>
-              <a:rPr lang="en-US" dirty="0">
-                <a:hlinkClick r:id="rId5"/>
-              </a:rPr>
-              <a:t>www.bit.ly/c6ItL7</a:t>
-            </a:r>
-            <a:endParaRPr lang="en-US" dirty="0"/>
-          </a:p>
-          <a:p>
-            <a:endParaRPr lang="en-US" dirty="0"/>
-          </a:p>
-          <a:p>
-            <a:endParaRPr lang="en-US" dirty="0"/>
-          </a:p>
-          <a:p>
-            <a:endParaRPr lang="en-US" dirty="0"/>
-          </a:p>
-        </p:txBody>
-      </p:sp>
     </p:spTree>
     <p:extLst>
       <p:ext uri="{BB962C8B-B14F-4D97-AF65-F5344CB8AC3E}">
-        <p14:creationId xmlns:p14="http://schemas.microsoft.com/office/powerpoint/2010/main" val="2629999514"/>
+        <p14:creationId xmlns:p14="http://schemas.microsoft.com/office/powerpoint/2010/main" val="870951136"/>
       </p:ext>
     </p:extLst>
   </p:cSld>
@@ -10290,8 +9577,8 @@
         </p:nvSpPr>
         <p:spPr>
           <a:xfrm>
-            <a:off x="0" y="515553"/>
-            <a:ext cx="11959389" cy="727838"/>
+            <a:off x="0" y="323203"/>
+            <a:ext cx="12192000" cy="727838"/>
           </a:xfrm>
         </p:spPr>
         <p:txBody>
@@ -10301,42 +9588,126 @@
           <a:lstStyle/>
           <a:p>
             <a:r>
-              <a:rPr lang="en-US" sz="4400" dirty="0"/>
-              <a:t>Data Visualization Increases Customer Engagement</a:t>
-            </a:r>
+              <a:rPr lang="en-US" sz="5400" dirty="0"/>
+              <a:t>Data Visualization can Tell Stories</a:t>
+            </a:r>
+          </a:p>
+        </p:txBody>
+      </p:sp>
+      <p:sp>
+        <p:nvSpPr>
+          <p:cNvPr id="3" name="Content Placeholder 2"/>
+          <p:cNvSpPr>
+            <a:spLocks noGrp="1"/>
+          </p:cNvSpPr>
+          <p:nvPr>
+            <p:ph idx="1"/>
+          </p:nvPr>
+        </p:nvSpPr>
+        <p:spPr>
+          <a:xfrm>
+            <a:off x="2162545" y="5930273"/>
+            <a:ext cx="5097380" cy="391674"/>
+          </a:xfrm>
+        </p:spPr>
+        <p:txBody>
+          <a:bodyPr>
+            <a:noAutofit/>
+          </a:bodyPr>
+          <a:lstStyle/>
+          <a:p>
+            <a:pPr marL="27675" indent="0">
+              <a:buNone/>
+            </a:pPr>
+            <a:r>
+              <a:rPr lang="en-US" sz="1600" dirty="0">
+                <a:hlinkClick r:id="rId3"/>
+              </a:rPr>
+              <a:t>Source: http://bost.ocks.org/mike/nations/</a:t>
+            </a:r>
+            <a:endParaRPr lang="en-US" sz="1600" dirty="0"/>
+          </a:p>
+          <a:p>
+            <a:pPr marL="27675" indent="0">
+              <a:buNone/>
+            </a:pPr>
+            <a:endParaRPr lang="en-US" sz="1600" dirty="0"/>
           </a:p>
         </p:txBody>
       </p:sp>
       <p:pic>
         <p:nvPicPr>
-          <p:cNvPr id="4" name="Content Placeholder 3"/>
+          <p:cNvPr id="4" name="Picture 3"/>
           <p:cNvPicPr>
-            <a:picLocks noGrp="1" noChangeAspect="1"/>
+            <a:picLocks noChangeAspect="1"/>
           </p:cNvPicPr>
-          <p:nvPr>
-            <p:ph idx="1"/>
-          </p:nvPr>
+          <p:nvPr/>
         </p:nvPicPr>
         <p:blipFill>
-          <a:blip r:embed="rId3"/>
+          <a:blip r:embed="rId4"/>
           <a:stretch>
             <a:fillRect/>
           </a:stretch>
         </p:blipFill>
         <p:spPr>
           <a:xfrm>
-            <a:off x="565485" y="1340913"/>
-            <a:ext cx="11215228" cy="4526288"/>
+            <a:off x="2225968" y="1049627"/>
+            <a:ext cx="7740064" cy="4815120"/>
           </a:xfrm>
           <a:prstGeom prst="rect">
             <a:avLst/>
           </a:prstGeom>
         </p:spPr>
       </p:pic>
+      <p:sp>
+        <p:nvSpPr>
+          <p:cNvPr id="5" name="TextBox 4"/>
+          <p:cNvSpPr txBox="1"/>
+          <p:nvPr/>
+        </p:nvSpPr>
+        <p:spPr>
+          <a:xfrm>
+            <a:off x="2162545" y="6365127"/>
+            <a:ext cx="5611528" cy="1200329"/>
+          </a:xfrm>
+          <a:prstGeom prst="rect">
+            <a:avLst/>
+          </a:prstGeom>
+          <a:noFill/>
+        </p:spPr>
+        <p:txBody>
+          <a:bodyPr wrap="square" rtlCol="0">
+            <a:spAutoFit/>
+          </a:bodyPr>
+          <a:lstStyle/>
+          <a:p>
+            <a:r>
+              <a:rPr lang="en-US" dirty="0"/>
+              <a:t>200 Years That Changed the World: </a:t>
+            </a:r>
+            <a:r>
+              <a:rPr lang="en-US" dirty="0">
+                <a:hlinkClick r:id="rId5"/>
+              </a:rPr>
+              <a:t>www.bit.ly/c6ItL7</a:t>
+            </a:r>
+            <a:endParaRPr lang="en-US" dirty="0"/>
+          </a:p>
+          <a:p>
+            <a:endParaRPr lang="en-US" dirty="0"/>
+          </a:p>
+          <a:p>
+            <a:endParaRPr lang="en-US" dirty="0"/>
+          </a:p>
+          <a:p>
+            <a:endParaRPr lang="en-US" dirty="0"/>
+          </a:p>
+        </p:txBody>
+      </p:sp>
     </p:spTree>
     <p:extLst>
       <p:ext uri="{BB962C8B-B14F-4D97-AF65-F5344CB8AC3E}">
-        <p14:creationId xmlns:p14="http://schemas.microsoft.com/office/powerpoint/2010/main" val="952232083"/>
+        <p14:creationId xmlns:p14="http://schemas.microsoft.com/office/powerpoint/2010/main" val="2629999514"/>
       </p:ext>
     </p:extLst>
   </p:cSld>
@@ -10382,8 +9753,8 @@
         </p:nvSpPr>
         <p:spPr>
           <a:xfrm>
-            <a:off x="0" y="361950"/>
-            <a:ext cx="12192000" cy="727838"/>
+            <a:off x="0" y="515553"/>
+            <a:ext cx="11959389" cy="727838"/>
           </a:xfrm>
         </p:spPr>
         <p:txBody>
@@ -10393,75 +9764,42 @@
           <a:lstStyle/>
           <a:p>
             <a:r>
-              <a:rPr lang="en-US" sz="5400" dirty="0"/>
-              <a:t>We’ve Never Had More Available Data</a:t>
-            </a:r>
-          </a:p>
-        </p:txBody>
-      </p:sp>
-      <p:sp>
-        <p:nvSpPr>
-          <p:cNvPr id="8" name="Content Placeholder 7"/>
-          <p:cNvSpPr>
-            <a:spLocks noGrp="1"/>
-          </p:cNvSpPr>
+              <a:rPr lang="en-US" sz="4400" dirty="0"/>
+              <a:t>Data Visualization Increases Customer Engagement</a:t>
+            </a:r>
+          </a:p>
+        </p:txBody>
+      </p:sp>
+      <p:pic>
+        <p:nvPicPr>
+          <p:cNvPr id="4" name="Content Placeholder 3"/>
+          <p:cNvPicPr>
+            <a:picLocks noGrp="1" noChangeAspect="1"/>
+          </p:cNvPicPr>
           <p:nvPr>
             <p:ph idx="1"/>
           </p:nvPr>
-        </p:nvSpPr>
+        </p:nvPicPr>
+        <p:blipFill>
+          <a:blip r:embed="rId3"/>
+          <a:stretch>
+            <a:fillRect/>
+          </a:stretch>
+        </p:blipFill>
         <p:spPr>
           <a:xfrm>
-            <a:off x="1440662" y="1372270"/>
-            <a:ext cx="7765322" cy="3797301"/>
-          </a:xfrm>
+            <a:off x="565485" y="1340913"/>
+            <a:ext cx="11215228" cy="4526288"/>
+          </a:xfrm>
+          <a:prstGeom prst="rect">
+            <a:avLst/>
+          </a:prstGeom>
         </p:spPr>
-        <p:txBody>
-          <a:bodyPr>
-            <a:noAutofit/>
-          </a:bodyPr>
-          <a:lstStyle/>
-          <a:p>
-            <a:r>
-              <a:rPr lang="en-US" sz="3200" dirty="0"/>
-              <a:t>Governments</a:t>
-            </a:r>
-          </a:p>
-          <a:p>
-            <a:r>
-              <a:rPr lang="en-US" sz="3200" dirty="0"/>
-              <a:t>Research organizations</a:t>
-            </a:r>
-          </a:p>
-          <a:p>
-            <a:r>
-              <a:rPr lang="en-US" sz="3200" dirty="0"/>
-              <a:t>NGOs</a:t>
-            </a:r>
-          </a:p>
-          <a:p>
-            <a:r>
-              <a:rPr lang="en-US" sz="3200" dirty="0"/>
-              <a:t>The Internet of Things</a:t>
-            </a:r>
-          </a:p>
-          <a:p>
-            <a:r>
-              <a:rPr lang="en-US" sz="3200" dirty="0"/>
-              <a:t>Logging &amp; Usage Data</a:t>
-            </a:r>
-          </a:p>
-          <a:p>
-            <a:r>
-              <a:rPr lang="en-US" sz="3200" dirty="0"/>
-              <a:t>Financial Data</a:t>
-            </a:r>
-          </a:p>
-        </p:txBody>
-      </p:sp>
+      </p:pic>
     </p:spTree>
     <p:extLst>
       <p:ext uri="{BB962C8B-B14F-4D97-AF65-F5344CB8AC3E}">
-        <p14:creationId xmlns:p14="http://schemas.microsoft.com/office/powerpoint/2010/main" val="1404473094"/>
+        <p14:creationId xmlns:p14="http://schemas.microsoft.com/office/powerpoint/2010/main" val="952232083"/>
       </p:ext>
     </p:extLst>
   </p:cSld>
@@ -10507,8 +9845,8 @@
         </p:nvSpPr>
         <p:spPr>
           <a:xfrm>
-            <a:off x="2101062" y="539917"/>
-            <a:ext cx="7765322" cy="727838"/>
+            <a:off x="0" y="361950"/>
+            <a:ext cx="12192000" cy="727838"/>
           </a:xfrm>
         </p:spPr>
         <p:txBody>
@@ -10518,10 +9856,67 @@
           <a:lstStyle/>
           <a:p>
             <a:r>
-              <a:rPr lang="en-US" sz="6000" dirty="0">
-                <a:latin typeface="Calibri" panose="020F0502020204030204" pitchFamily="34" charset="0"/>
-              </a:rPr>
-              <a:t>What is D3.js?</a:t>
+              <a:rPr lang="en-US" sz="5400" dirty="0"/>
+              <a:t>We’ve Never Had More Available Data</a:t>
+            </a:r>
+          </a:p>
+        </p:txBody>
+      </p:sp>
+      <p:sp>
+        <p:nvSpPr>
+          <p:cNvPr id="8" name="Content Placeholder 7"/>
+          <p:cNvSpPr>
+            <a:spLocks noGrp="1"/>
+          </p:cNvSpPr>
+          <p:nvPr>
+            <p:ph idx="1"/>
+          </p:nvPr>
+        </p:nvSpPr>
+        <p:spPr>
+          <a:xfrm>
+            <a:off x="1440662" y="1372270"/>
+            <a:ext cx="7765322" cy="3797301"/>
+          </a:xfrm>
+        </p:spPr>
+        <p:txBody>
+          <a:bodyPr>
+            <a:noAutofit/>
+          </a:bodyPr>
+          <a:lstStyle/>
+          <a:p>
+            <a:r>
+              <a:rPr lang="en-US" sz="3200" dirty="0"/>
+              <a:t>Governments</a:t>
+            </a:r>
+          </a:p>
+          <a:p>
+            <a:r>
+              <a:rPr lang="en-US" sz="3200" dirty="0"/>
+              <a:t>Research organizations</a:t>
+            </a:r>
+          </a:p>
+          <a:p>
+            <a:r>
+              <a:rPr lang="en-US" sz="3200" dirty="0"/>
+              <a:t>NGOs</a:t>
+            </a:r>
+          </a:p>
+          <a:p>
+            <a:r>
+              <a:rPr lang="en-US" sz="3200" dirty="0"/>
+              <a:t>The Internet of Things</a:t>
+            </a:r>
+          </a:p>
+          <a:p>
+            <a:r>
+              <a:rPr lang="en-US" sz="3200" dirty="0"/>
+              <a:t>Logging &amp; Usage Data</a:t>
+            </a:r>
+          </a:p>
+          <a:p>
+            <a:r>
+              <a:rPr lang="en-US" sz="3200" dirty="0"/>
+              <a:t>Financial Data</a:t>
             </a:r>
           </a:p>
         </p:txBody>
@@ -10529,7 +9924,7 @@
     </p:spTree>
     <p:extLst>
       <p:ext uri="{BB962C8B-B14F-4D97-AF65-F5344CB8AC3E}">
-        <p14:creationId xmlns:p14="http://schemas.microsoft.com/office/powerpoint/2010/main" val="1217426071"/>
+        <p14:creationId xmlns:p14="http://schemas.microsoft.com/office/powerpoint/2010/main" val="1404473094"/>
       </p:ext>
     </p:extLst>
   </p:cSld>
@@ -10582,7 +9977,7 @@
           <a:p>
             <a:r>
               <a:rPr lang="en-US" sz="6000" dirty="0"/>
-              <a:t>Why D3.js?</a:t>
+              <a:t>Demo Time!</a:t>
             </a:r>
           </a:p>
         </p:txBody>
@@ -10602,14 +9997,14 @@
           <a:bodyPr/>
           <a:lstStyle/>
           <a:p>
-            <a:endParaRPr lang="en-US" dirty="0"/>
+            <a:endParaRPr lang="en-US"/>
           </a:p>
         </p:txBody>
       </p:sp>
     </p:spTree>
     <p:extLst>
       <p:ext uri="{BB962C8B-B14F-4D97-AF65-F5344CB8AC3E}">
-        <p14:creationId xmlns:p14="http://schemas.microsoft.com/office/powerpoint/2010/main" val="2673403050"/>
+        <p14:creationId xmlns:p14="http://schemas.microsoft.com/office/powerpoint/2010/main" val="593212302"/>
       </p:ext>
     </p:extLst>
   </p:cSld>

</xml_diff>

<commit_message>
Slide updates + adding data files
</commit_message>
<xml_diff>
--- a/slides/d3.pptx
+++ b/slides/d3.pptx
@@ -206,7 +206,7 @@
           <a:p>
             <a:fld id="{F2FD5E34-5871-4249-913E-D69CD2F5B120}" type="datetimeFigureOut">
               <a:rPr lang="en-US" smtClean="0"/>
-              <a:t>7/21/2014</a:t>
+              <a:t>7/22/2014</a:t>
             </a:fld>
             <a:endParaRPr lang="en-US"/>
           </a:p>
@@ -768,11 +768,184 @@
             </a:r>
           </a:p>
           <a:p>
+            <a:pPr marL="0" indent="0">
+              <a:buFontTx/>
+              <a:buNone/>
+            </a:pPr>
             <a:r>
               <a:rPr lang="en-US" baseline="0" dirty="0" smtClean="0"/>
-              <a:t>- Numbers are less prone to manipulation</a:t>
-            </a:r>
-            <a:endParaRPr lang="en-US" dirty="0"/>
+              <a:t>- Numbers </a:t>
+            </a:r>
+            <a:r>
+              <a:rPr lang="en-US" baseline="0" dirty="0" smtClean="0"/>
+              <a:t>are less prone to </a:t>
+            </a:r>
+            <a:r>
+              <a:rPr lang="en-US" baseline="0" dirty="0" smtClean="0"/>
+              <a:t>manipulation</a:t>
+            </a:r>
+          </a:p>
+          <a:p>
+            <a:pPr marL="171450" indent="-171450">
+              <a:buFontTx/>
+              <a:buChar char="-"/>
+            </a:pPr>
+            <a:endParaRPr lang="en-US" baseline="0" dirty="0" smtClean="0"/>
+          </a:p>
+          <a:p>
+            <a:pPr marL="0" indent="0">
+              <a:buFontTx/>
+              <a:buNone/>
+            </a:pPr>
+            <a:r>
+              <a:rPr lang="en-US" baseline="0" dirty="0" smtClean="0"/>
+              <a:t>Data </a:t>
+            </a:r>
+            <a:r>
+              <a:rPr lang="en-US" baseline="0" dirty="0" err="1" smtClean="0"/>
+              <a:t>viz</a:t>
+            </a:r>
+            <a:r>
+              <a:rPr lang="en-US" baseline="0" dirty="0" smtClean="0"/>
+              <a:t> gives you three things: </a:t>
+            </a:r>
+          </a:p>
+          <a:p>
+            <a:pPr marL="0" indent="0">
+              <a:buFontTx/>
+              <a:buNone/>
+            </a:pPr>
+            <a:endParaRPr lang="en-US" baseline="0" dirty="0" smtClean="0"/>
+          </a:p>
+          <a:p>
+            <a:pPr marL="0" indent="0">
+              <a:buFontTx/>
+              <a:buNone/>
+            </a:pPr>
+            <a:r>
+              <a:rPr lang="en-US" baseline="0" dirty="0" smtClean="0"/>
+              <a:t>Understanding </a:t>
+            </a:r>
+          </a:p>
+          <a:p>
+            <a:pPr marL="0" indent="0">
+              <a:buFontTx/>
+              <a:buNone/>
+            </a:pPr>
+            <a:r>
+              <a:rPr lang="en-US" baseline="0" dirty="0" smtClean="0"/>
+              <a:t>– Data </a:t>
+            </a:r>
+            <a:r>
+              <a:rPr lang="en-US" baseline="0" dirty="0" err="1" smtClean="0"/>
+              <a:t>viz</a:t>
+            </a:r>
+            <a:r>
+              <a:rPr lang="en-US" baseline="0" dirty="0" smtClean="0"/>
+              <a:t> adds meaning</a:t>
+            </a:r>
+          </a:p>
+          <a:p>
+            <a:pPr marL="0" indent="0">
+              <a:buFontTx/>
+              <a:buNone/>
+            </a:pPr>
+            <a:r>
+              <a:rPr lang="en-US" baseline="0" dirty="0" smtClean="0"/>
+              <a:t>- Data </a:t>
+            </a:r>
+            <a:r>
+              <a:rPr lang="en-US" baseline="0" dirty="0" err="1" smtClean="0"/>
+              <a:t>viz</a:t>
+            </a:r>
+            <a:r>
+              <a:rPr lang="en-US" baseline="0" dirty="0" smtClean="0"/>
+              <a:t> can tell stories	</a:t>
+            </a:r>
+          </a:p>
+          <a:p>
+            <a:pPr marL="0" indent="0">
+              <a:buFontTx/>
+              <a:buNone/>
+            </a:pPr>
+            <a:endParaRPr lang="en-US" baseline="0" dirty="0" smtClean="0"/>
+          </a:p>
+          <a:p>
+            <a:pPr marL="0" indent="0">
+              <a:buFontTx/>
+              <a:buNone/>
+            </a:pPr>
+            <a:r>
+              <a:rPr lang="en-US" baseline="0" dirty="0" smtClean="0"/>
+              <a:t>Persuasion</a:t>
+            </a:r>
+          </a:p>
+          <a:p>
+            <a:pPr marL="0" indent="0">
+              <a:buFontTx/>
+              <a:buNone/>
+            </a:pPr>
+            <a:r>
+              <a:rPr lang="en-US" baseline="0" dirty="0" smtClean="0"/>
+              <a:t>- People respond persuasively to two things: stories and images. Data </a:t>
+            </a:r>
+            <a:r>
+              <a:rPr lang="en-US" baseline="0" dirty="0" err="1" smtClean="0"/>
+              <a:t>viz</a:t>
+            </a:r>
+            <a:r>
+              <a:rPr lang="en-US" baseline="0" dirty="0" smtClean="0"/>
+              <a:t> gives you both.</a:t>
+            </a:r>
+          </a:p>
+          <a:p>
+            <a:pPr marL="0" indent="0">
+              <a:buFontTx/>
+              <a:buNone/>
+            </a:pPr>
+            <a:endParaRPr lang="en-US" baseline="0" dirty="0" smtClean="0"/>
+          </a:p>
+          <a:p>
+            <a:pPr marL="0" indent="0">
+              <a:buFontTx/>
+              <a:buNone/>
+            </a:pPr>
+            <a:r>
+              <a:rPr lang="en-US" baseline="0" dirty="0" smtClean="0"/>
+              <a:t>Efficiency</a:t>
+            </a:r>
+          </a:p>
+          <a:p>
+            <a:pPr marL="171450" indent="-171450">
+              <a:buFontTx/>
+              <a:buChar char="-"/>
+            </a:pPr>
+            <a:r>
+              <a:rPr lang="en-US" baseline="0" dirty="0" smtClean="0"/>
+              <a:t>There’s more data than ever before and the trend is only going up. Data </a:t>
+            </a:r>
+            <a:r>
+              <a:rPr lang="en-US" baseline="0" dirty="0" err="1" smtClean="0"/>
+              <a:t>viz</a:t>
+            </a:r>
+            <a:r>
+              <a:rPr lang="en-US" baseline="0" dirty="0" smtClean="0"/>
+              <a:t> makes it easier to understand.</a:t>
+            </a:r>
+          </a:p>
+          <a:p>
+            <a:pPr marL="171450" indent="-171450">
+              <a:buFontTx/>
+              <a:buChar char="-"/>
+            </a:pPr>
+            <a:endParaRPr lang="en-US" baseline="0" dirty="0" smtClean="0"/>
+          </a:p>
+          <a:p>
+            <a:pPr marL="0" indent="0">
+              <a:buFontTx/>
+              <a:buNone/>
+            </a:pPr>
+            <a:endParaRPr lang="en-US" baseline="0" dirty="0" smtClean="0"/>
           </a:p>
         </p:txBody>
       </p:sp>
@@ -2189,7 +2362,7 @@
           <a:p>
             <a:fld id="{67971B23-299D-4CF4-B59D-A17DAEBDFBC2}" type="datetimeFigureOut">
               <a:rPr lang="en-US" smtClean="0"/>
-              <a:t>7/21/2014</a:t>
+              <a:t>7/22/2014</a:t>
             </a:fld>
             <a:endParaRPr lang="en-US"/>
           </a:p>
@@ -2487,7 +2660,7 @@
           <a:p>
             <a:fld id="{67971B23-299D-4CF4-B59D-A17DAEBDFBC2}" type="datetimeFigureOut">
               <a:rPr lang="en-US" smtClean="0"/>
-              <a:t>7/21/2014</a:t>
+              <a:t>7/22/2014</a:t>
             </a:fld>
             <a:endParaRPr lang="en-US"/>
           </a:p>
@@ -2679,7 +2852,7 @@
           <a:p>
             <a:fld id="{67971B23-299D-4CF4-B59D-A17DAEBDFBC2}" type="datetimeFigureOut">
               <a:rPr lang="en-US" smtClean="0"/>
-              <a:t>7/21/2014</a:t>
+              <a:t>7/22/2014</a:t>
             </a:fld>
             <a:endParaRPr lang="en-US"/>
           </a:p>
@@ -2940,7 +3113,7 @@
           <a:p>
             <a:fld id="{67971B23-299D-4CF4-B59D-A17DAEBDFBC2}" type="datetimeFigureOut">
               <a:rPr lang="en-US" smtClean="0"/>
-              <a:t>7/21/2014</a:t>
+              <a:t>7/22/2014</a:t>
             </a:fld>
             <a:endParaRPr lang="en-US"/>
           </a:p>
@@ -3364,7 +3537,7 @@
           <a:p>
             <a:fld id="{67971B23-299D-4CF4-B59D-A17DAEBDFBC2}" type="datetimeFigureOut">
               <a:rPr lang="en-US" smtClean="0"/>
-              <a:t>7/21/2014</a:t>
+              <a:t>7/22/2014</a:t>
             </a:fld>
             <a:endParaRPr lang="en-US"/>
           </a:p>
@@ -3901,7 +4074,7 @@
           <a:p>
             <a:fld id="{67971B23-299D-4CF4-B59D-A17DAEBDFBC2}" type="datetimeFigureOut">
               <a:rPr lang="en-US" smtClean="0"/>
-              <a:t>7/21/2014</a:t>
+              <a:t>7/22/2014</a:t>
             </a:fld>
             <a:endParaRPr lang="en-US"/>
           </a:p>
@@ -4765,7 +4938,7 @@
           <a:p>
             <a:fld id="{67971B23-299D-4CF4-B59D-A17DAEBDFBC2}" type="datetimeFigureOut">
               <a:rPr lang="en-US" smtClean="0"/>
-              <a:t>7/21/2014</a:t>
+              <a:t>7/22/2014</a:t>
             </a:fld>
             <a:endParaRPr lang="en-US"/>
           </a:p>
@@ -4935,7 +5108,7 @@
           <a:p>
             <a:fld id="{67971B23-299D-4CF4-B59D-A17DAEBDFBC2}" type="datetimeFigureOut">
               <a:rPr lang="en-US" smtClean="0"/>
-              <a:t>7/21/2014</a:t>
+              <a:t>7/22/2014</a:t>
             </a:fld>
             <a:endParaRPr lang="en-US"/>
           </a:p>
@@ -5119,7 +5292,7 @@
           <a:p>
             <a:fld id="{67971B23-299D-4CF4-B59D-A17DAEBDFBC2}" type="datetimeFigureOut">
               <a:rPr lang="en-US" smtClean="0"/>
-              <a:t>7/21/2014</a:t>
+              <a:t>7/22/2014</a:t>
             </a:fld>
             <a:endParaRPr lang="en-US"/>
           </a:p>
@@ -5289,7 +5462,7 @@
           <a:p>
             <a:fld id="{67971B23-299D-4CF4-B59D-A17DAEBDFBC2}" type="datetimeFigureOut">
               <a:rPr lang="en-US" smtClean="0"/>
-              <a:t>7/21/2014</a:t>
+              <a:t>7/22/2014</a:t>
             </a:fld>
             <a:endParaRPr lang="en-US"/>
           </a:p>
@@ -5533,7 +5706,7 @@
           <a:p>
             <a:fld id="{67971B23-299D-4CF4-B59D-A17DAEBDFBC2}" type="datetimeFigureOut">
               <a:rPr lang="en-US" smtClean="0"/>
-              <a:t>7/21/2014</a:t>
+              <a:t>7/22/2014</a:t>
             </a:fld>
             <a:endParaRPr lang="en-US"/>
           </a:p>
@@ -5769,7 +5942,7 @@
           <a:p>
             <a:fld id="{67971B23-299D-4CF4-B59D-A17DAEBDFBC2}" type="datetimeFigureOut">
               <a:rPr lang="en-US" smtClean="0"/>
-              <a:t>7/21/2014</a:t>
+              <a:t>7/22/2014</a:t>
             </a:fld>
             <a:endParaRPr lang="en-US"/>
           </a:p>
@@ -6235,7 +6408,7 @@
           <a:p>
             <a:fld id="{67971B23-299D-4CF4-B59D-A17DAEBDFBC2}" type="datetimeFigureOut">
               <a:rPr lang="en-US" smtClean="0"/>
-              <a:t>7/21/2014</a:t>
+              <a:t>7/22/2014</a:t>
             </a:fld>
             <a:endParaRPr lang="en-US"/>
           </a:p>
@@ -6353,7 +6526,7 @@
           <a:p>
             <a:fld id="{67971B23-299D-4CF4-B59D-A17DAEBDFBC2}" type="datetimeFigureOut">
               <a:rPr lang="en-US" smtClean="0"/>
-              <a:t>7/21/2014</a:t>
+              <a:t>7/22/2014</a:t>
             </a:fld>
             <a:endParaRPr lang="en-US"/>
           </a:p>
@@ -6448,7 +6621,7 @@
           <a:p>
             <a:fld id="{67971B23-299D-4CF4-B59D-A17DAEBDFBC2}" type="datetimeFigureOut">
               <a:rPr lang="en-US" smtClean="0"/>
-              <a:t>7/21/2014</a:t>
+              <a:t>7/22/2014</a:t>
             </a:fld>
             <a:endParaRPr lang="en-US"/>
           </a:p>
@@ -6703,7 +6876,7 @@
           <a:p>
             <a:fld id="{67971B23-299D-4CF4-B59D-A17DAEBDFBC2}" type="datetimeFigureOut">
               <a:rPr lang="en-US" smtClean="0"/>
-              <a:t>7/21/2014</a:t>
+              <a:t>7/22/2014</a:t>
             </a:fld>
             <a:endParaRPr lang="en-US"/>
           </a:p>
@@ -7003,7 +7176,7 @@
           <a:p>
             <a:fld id="{67971B23-299D-4CF4-B59D-A17DAEBDFBC2}" type="datetimeFigureOut">
               <a:rPr lang="en-US" smtClean="0"/>
-              <a:t>7/21/2014</a:t>
+              <a:t>7/22/2014</a:t>
             </a:fld>
             <a:endParaRPr lang="en-US"/>
           </a:p>
@@ -7237,7 +7410,7 @@
           <a:p>
             <a:fld id="{67971B23-299D-4CF4-B59D-A17DAEBDFBC2}" type="datetimeFigureOut">
               <a:rPr lang="en-US" smtClean="0"/>
-              <a:t>7/21/2014</a:t>
+              <a:t>7/22/2014</a:t>
             </a:fld>
             <a:endParaRPr lang="en-US"/>
           </a:p>
@@ -7944,13 +8117,7 @@
               <a:rPr lang="en-US" sz="6000" b="1" dirty="0" smtClean="0">
                 <a:effectLst/>
               </a:rPr>
-              <a:t>Campfire </a:t>
-            </a:r>
-            <a:r>
-              <a:rPr lang="en-US" sz="6000" b="1" dirty="0" smtClean="0">
-                <a:effectLst/>
-              </a:rPr>
-              <a:t>Stories </a:t>
+              <a:t>Campfire Stories </a:t>
             </a:r>
             <a:r>
               <a:rPr lang="en-US" sz="6000" b="1" dirty="0">
@@ -9179,7 +9346,7 @@
         <p:spPr>
           <a:xfrm>
             <a:off x="1764846" y="1191387"/>
-            <a:ext cx="7765322" cy="5565013"/>
+            <a:ext cx="7765322" cy="4488977"/>
           </a:xfrm>
         </p:spPr>
         <p:txBody>
@@ -9188,67 +9355,61 @@
           </a:bodyPr>
           <a:lstStyle/>
           <a:p>
+            <a:pPr>
+              <a:buFont typeface="Wingdings" panose="05000000000000000000" pitchFamily="2" charset="2"/>
+              <a:buChar char="Ø"/>
+            </a:pPr>
             <a:r>
               <a:rPr lang="en-US" sz="2400" dirty="0"/>
               <a:t>Why Data Visualization?</a:t>
             </a:r>
           </a:p>
           <a:p>
+            <a:pPr>
+              <a:buFont typeface="Wingdings" panose="05000000000000000000" pitchFamily="2" charset="2"/>
+              <a:buChar char="Ø"/>
+            </a:pPr>
             <a:r>
               <a:rPr lang="en-US" sz="2400" dirty="0"/>
               <a:t>What is D3.js?</a:t>
             </a:r>
           </a:p>
           <a:p>
+            <a:pPr>
+              <a:buFont typeface="Wingdings" panose="05000000000000000000" pitchFamily="2" charset="2"/>
+              <a:buChar char="Ø"/>
+            </a:pPr>
             <a:r>
               <a:rPr lang="en-US" sz="2400" dirty="0"/>
               <a:t>Why D3.js?</a:t>
             </a:r>
           </a:p>
           <a:p>
+            <a:pPr>
+              <a:buFont typeface="Wingdings" panose="05000000000000000000" pitchFamily="2" charset="2"/>
+              <a:buChar char="Ø"/>
+            </a:pPr>
             <a:r>
               <a:rPr lang="en-US" sz="2400" dirty="0"/>
               <a:t>Why not D3.js?</a:t>
             </a:r>
           </a:p>
           <a:p>
-            <a:r>
-              <a:rPr lang="en-US" sz="2400" dirty="0"/>
-              <a:t>Just enough SVG</a:t>
-            </a:r>
-          </a:p>
-          <a:p>
-            <a:r>
-              <a:rPr lang="en-US" sz="2400" dirty="0"/>
-              <a:t>Demos</a:t>
-            </a:r>
-          </a:p>
-          <a:p>
-            <a:pPr lvl="1"/>
-            <a:r>
-              <a:rPr lang="en-US" sz="2200" dirty="0"/>
-              <a:t>Using D3.js with ASP.NET</a:t>
-            </a:r>
-          </a:p>
-          <a:p>
-            <a:pPr lvl="1"/>
-            <a:r>
-              <a:rPr lang="en-US" sz="2200" dirty="0"/>
-              <a:t>Building Charts in D3.js</a:t>
-            </a:r>
-          </a:p>
-          <a:p>
-            <a:pPr lvl="1"/>
-            <a:r>
-              <a:rPr lang="en-US" sz="2200" dirty="0"/>
-              <a:t>Building Different Types of Visualizations</a:t>
-            </a:r>
-          </a:p>
-          <a:p>
-            <a:r>
-              <a:rPr lang="en-US" sz="2600" dirty="0"/>
-              <a:t>Resources</a:t>
-            </a:r>
+            <a:pPr>
+              <a:buFont typeface="Wingdings" panose="05000000000000000000" pitchFamily="2" charset="2"/>
+              <a:buChar char="Ø"/>
+            </a:pPr>
+            <a:r>
+              <a:rPr lang="en-US" sz="2400" dirty="0" smtClean="0"/>
+              <a:t>How do I use D3.js? (Demos)</a:t>
+            </a:r>
+          </a:p>
+          <a:p>
+            <a:pPr lvl="1">
+              <a:buFont typeface="Wingdings" panose="05000000000000000000" pitchFamily="2" charset="2"/>
+              <a:buChar char="Ø"/>
+            </a:pPr>
+            <a:endParaRPr lang="en-US" sz="2400" dirty="0"/>
           </a:p>
         </p:txBody>
       </p:sp>

</xml_diff>

<commit_message>
Updating Slides for That Conference
</commit_message>
<xml_diff>
--- a/slides/d3.pptx
+++ b/slides/d3.pptx
@@ -5,11 +5,11 @@
     <p:sldMasterId id="2147483696" r:id="rId1"/>
   </p:sldMasterIdLst>
   <p:notesMasterIdLst>
-    <p:notesMasterId r:id="rId12"/>
+    <p:notesMasterId r:id="rId13"/>
   </p:notesMasterIdLst>
   <p:sldIdLst>
     <p:sldId id="256" r:id="rId2"/>
-    <p:sldId id="277" r:id="rId3"/>
+    <p:sldId id="278" r:id="rId3"/>
     <p:sldId id="257" r:id="rId4"/>
     <p:sldId id="273" r:id="rId5"/>
     <p:sldId id="275" r:id="rId6"/>
@@ -18,6 +18,7 @@
     <p:sldId id="258" r:id="rId9"/>
     <p:sldId id="263" r:id="rId10"/>
     <p:sldId id="272" r:id="rId11"/>
+    <p:sldId id="279" r:id="rId12"/>
   </p:sldIdLst>
   <p:sldSz cx="12192000" cy="6858000"/>
   <p:notesSz cx="6858000" cy="9144000"/>
@@ -206,7 +207,7 @@
           <a:p>
             <a:fld id="{F2FD5E34-5871-4249-913E-D69CD2F5B120}" type="datetimeFigureOut">
               <a:rPr lang="en-US" smtClean="0"/>
-              <a:t>7/22/2014</a:t>
+              <a:t>7/30/2014</a:t>
             </a:fld>
             <a:endParaRPr lang="en-US"/>
           </a:p>
@@ -493,7 +494,7 @@
       </p:grpSpPr>
       <p:sp>
         <p:nvSpPr>
-          <p:cNvPr id="2" name="Slide Image Placeholder 1"/>
+          <p:cNvPr id="46" name="Shape 46"/>
           <p:cNvSpPr>
             <a:spLocks noGrp="1" noRot="1" noChangeAspect="1"/>
           </p:cNvSpPr>
@@ -501,54 +502,144 @@
             <p:ph type="sldImg"/>
           </p:nvPr>
         </p:nvSpPr>
-        <p:spPr/>
-      </p:sp>
-      <p:sp>
-        <p:nvSpPr>
-          <p:cNvPr id="3" name="Notes Placeholder 2"/>
-          <p:cNvSpPr>
-            <a:spLocks noGrp="1"/>
-          </p:cNvSpPr>
-          <p:nvPr>
-            <p:ph type="body" idx="1"/>
-          </p:nvPr>
-        </p:nvSpPr>
-        <p:spPr/>
+        <p:spPr>
+          <a:xfrm>
+            <a:off x="381000" y="685800"/>
+            <a:ext cx="6096000" cy="3429000"/>
+          </a:xfrm>
+          <a:prstGeom prst="rect">
+            <a:avLst/>
+          </a:prstGeom>
+        </p:spPr>
         <p:txBody>
           <a:bodyPr/>
           <a:lstStyle/>
           <a:p>
-            <a:endParaRPr lang="en-US" dirty="0"/>
-          </a:p>
-        </p:txBody>
-      </p:sp>
-      <p:sp>
-        <p:nvSpPr>
-          <p:cNvPr id="4" name="Slide Number Placeholder 3"/>
-          <p:cNvSpPr>
-            <a:spLocks noGrp="1"/>
-          </p:cNvSpPr>
-          <p:nvPr>
-            <p:ph type="sldNum" sz="quarter" idx="10"/>
-          </p:nvPr>
-        </p:nvSpPr>
-        <p:spPr/>
+            <a:pPr lvl="0"/>
+            <a:endParaRPr/>
+          </a:p>
+        </p:txBody>
+      </p:sp>
+      <p:sp>
+        <p:nvSpPr>
+          <p:cNvPr id="47" name="Shape 47"/>
+          <p:cNvSpPr>
+            <a:spLocks noGrp="1"/>
+          </p:cNvSpPr>
+          <p:nvPr>
+            <p:ph type="body" sz="quarter" idx="1"/>
+          </p:nvPr>
+        </p:nvSpPr>
+        <p:spPr>
+          <a:prstGeom prst="rect">
+            <a:avLst/>
+          </a:prstGeom>
+        </p:spPr>
         <p:txBody>
           <a:bodyPr/>
           <a:lstStyle/>
           <a:p>
-            <a:fld id="{2CA6A022-9899-462F-AF11-091E7F58E280}" type="slidenum">
-              <a:rPr lang="en-US" smtClean="0"/>
-              <a:t>2</a:t>
-            </a:fld>
-            <a:endParaRPr lang="en-US"/>
+            <a:pPr lvl="0">
+              <a:defRPr sz="1800"/>
+            </a:pPr>
+            <a:r>
+              <a:rPr sz="3200"/>
+              <a:t>Please take a moment and thank our Principal, Platinum and Gold Sponsors.</a:t>
+            </a:r>
           </a:p>
         </p:txBody>
       </p:sp>
     </p:spTree>
     <p:extLst>
       <p:ext uri="{BB962C8B-B14F-4D97-AF65-F5344CB8AC3E}">
-        <p14:creationId xmlns:p14="http://schemas.microsoft.com/office/powerpoint/2010/main" val="1663577141"/>
+        <p14:creationId xmlns:p14="http://schemas.microsoft.com/office/powerpoint/2010/main" val="3149310461"/>
+      </p:ext>
+    </p:extLst>
+  </p:cSld>
+  <p:clrMapOvr>
+    <a:masterClrMapping/>
+  </p:clrMapOvr>
+</p:notes>
+</file>
+
+<file path=ppt/notesSlides/notesSlide10.xml><?xml version="1.0" encoding="utf-8"?>
+<p:notes xmlns:a="http://schemas.openxmlformats.org/drawingml/2006/main" xmlns:r="http://schemas.openxmlformats.org/officeDocument/2006/relationships" xmlns:p="http://schemas.openxmlformats.org/presentationml/2006/main">
+  <p:cSld>
+    <p:spTree>
+      <p:nvGrpSpPr>
+        <p:cNvPr id="1" name=""/>
+        <p:cNvGrpSpPr/>
+        <p:nvPr/>
+      </p:nvGrpSpPr>
+      <p:grpSpPr>
+        <a:xfrm>
+          <a:off x="0" y="0"/>
+          <a:ext cx="0" cy="0"/>
+          <a:chOff x="0" y="0"/>
+          <a:chExt cx="0" cy="0"/>
+        </a:xfrm>
+      </p:grpSpPr>
+      <p:sp>
+        <p:nvSpPr>
+          <p:cNvPr id="51" name="Shape 51"/>
+          <p:cNvSpPr>
+            <a:spLocks noGrp="1" noRot="1" noChangeAspect="1"/>
+          </p:cNvSpPr>
+          <p:nvPr>
+            <p:ph type="sldImg"/>
+          </p:nvPr>
+        </p:nvSpPr>
+        <p:spPr>
+          <a:xfrm>
+            <a:off x="381000" y="685800"/>
+            <a:ext cx="6096000" cy="3429000"/>
+          </a:xfrm>
+          <a:prstGeom prst="rect">
+            <a:avLst/>
+          </a:prstGeom>
+        </p:spPr>
+        <p:txBody>
+          <a:bodyPr/>
+          <a:lstStyle/>
+          <a:p>
+            <a:pPr lvl="0"/>
+            <a:endParaRPr/>
+          </a:p>
+        </p:txBody>
+      </p:sp>
+      <p:sp>
+        <p:nvSpPr>
+          <p:cNvPr id="52" name="Shape 52"/>
+          <p:cNvSpPr>
+            <a:spLocks noGrp="1"/>
+          </p:cNvSpPr>
+          <p:nvPr>
+            <p:ph type="body" sz="quarter" idx="1"/>
+          </p:nvPr>
+        </p:nvSpPr>
+        <p:spPr>
+          <a:prstGeom prst="rect">
+            <a:avLst/>
+          </a:prstGeom>
+        </p:spPr>
+        <p:txBody>
+          <a:bodyPr/>
+          <a:lstStyle/>
+          <a:p>
+            <a:pPr lvl="0">
+              <a:defRPr sz="1800"/>
+            </a:pPr>
+            <a:r>
+              <a:rPr sz="3200"/>
+              <a:t>Next year’s date.</a:t>
+            </a:r>
+          </a:p>
+        </p:txBody>
+      </p:sp>
+    </p:spTree>
+    <p:extLst>
+      <p:ext uri="{BB962C8B-B14F-4D97-AF65-F5344CB8AC3E}">
+        <p14:creationId xmlns:p14="http://schemas.microsoft.com/office/powerpoint/2010/main" val="1821011422"/>
       </p:ext>
     </p:extLst>
   </p:cSld>
@@ -774,15 +865,7 @@
             </a:pPr>
             <a:r>
               <a:rPr lang="en-US" baseline="0" dirty="0" smtClean="0"/>
-              <a:t>- Numbers </a:t>
-            </a:r>
-            <a:r>
-              <a:rPr lang="en-US" baseline="0" dirty="0" smtClean="0"/>
-              <a:t>are less prone to </a:t>
-            </a:r>
-            <a:r>
-              <a:rPr lang="en-US" baseline="0" dirty="0" smtClean="0"/>
-              <a:t>manipulation</a:t>
+              <a:t>- Numbers are less prone to manipulation</a:t>
             </a:r>
           </a:p>
           <a:p>
@@ -2362,7 +2445,7 @@
           <a:p>
             <a:fld id="{67971B23-299D-4CF4-B59D-A17DAEBDFBC2}" type="datetimeFigureOut">
               <a:rPr lang="en-US" smtClean="0"/>
-              <a:t>7/22/2014</a:t>
+              <a:t>7/30/2014</a:t>
             </a:fld>
             <a:endParaRPr lang="en-US"/>
           </a:p>
@@ -2660,7 +2743,7 @@
           <a:p>
             <a:fld id="{67971B23-299D-4CF4-B59D-A17DAEBDFBC2}" type="datetimeFigureOut">
               <a:rPr lang="en-US" smtClean="0"/>
-              <a:t>7/22/2014</a:t>
+              <a:t>7/30/2014</a:t>
             </a:fld>
             <a:endParaRPr lang="en-US"/>
           </a:p>
@@ -2852,7 +2935,7 @@
           <a:p>
             <a:fld id="{67971B23-299D-4CF4-B59D-A17DAEBDFBC2}" type="datetimeFigureOut">
               <a:rPr lang="en-US" smtClean="0"/>
-              <a:t>7/22/2014</a:t>
+              <a:t>7/30/2014</a:t>
             </a:fld>
             <a:endParaRPr lang="en-US"/>
           </a:p>
@@ -3113,7 +3196,7 @@
           <a:p>
             <a:fld id="{67971B23-299D-4CF4-B59D-A17DAEBDFBC2}" type="datetimeFigureOut">
               <a:rPr lang="en-US" smtClean="0"/>
-              <a:t>7/22/2014</a:t>
+              <a:t>7/30/2014</a:t>
             </a:fld>
             <a:endParaRPr lang="en-US"/>
           </a:p>
@@ -3537,7 +3620,7 @@
           <a:p>
             <a:fld id="{67971B23-299D-4CF4-B59D-A17DAEBDFBC2}" type="datetimeFigureOut">
               <a:rPr lang="en-US" smtClean="0"/>
-              <a:t>7/22/2014</a:t>
+              <a:t>7/30/2014</a:t>
             </a:fld>
             <a:endParaRPr lang="en-US"/>
           </a:p>
@@ -4074,7 +4157,7 @@
           <a:p>
             <a:fld id="{67971B23-299D-4CF4-B59D-A17DAEBDFBC2}" type="datetimeFigureOut">
               <a:rPr lang="en-US" smtClean="0"/>
-              <a:t>7/22/2014</a:t>
+              <a:t>7/30/2014</a:t>
             </a:fld>
             <a:endParaRPr lang="en-US"/>
           </a:p>
@@ -4938,7 +5021,7 @@
           <a:p>
             <a:fld id="{67971B23-299D-4CF4-B59D-A17DAEBDFBC2}" type="datetimeFigureOut">
               <a:rPr lang="en-US" smtClean="0"/>
-              <a:t>7/22/2014</a:t>
+              <a:t>7/30/2014</a:t>
             </a:fld>
             <a:endParaRPr lang="en-US"/>
           </a:p>
@@ -5108,7 +5191,7 @@
           <a:p>
             <a:fld id="{67971B23-299D-4CF4-B59D-A17DAEBDFBC2}" type="datetimeFigureOut">
               <a:rPr lang="en-US" smtClean="0"/>
-              <a:t>7/22/2014</a:t>
+              <a:t>7/30/2014</a:t>
             </a:fld>
             <a:endParaRPr lang="en-US"/>
           </a:p>
@@ -5292,7 +5375,7 @@
           <a:p>
             <a:fld id="{67971B23-299D-4CF4-B59D-A17DAEBDFBC2}" type="datetimeFigureOut">
               <a:rPr lang="en-US" smtClean="0"/>
-              <a:t>7/22/2014</a:t>
+              <a:t>7/30/2014</a:t>
             </a:fld>
             <a:endParaRPr lang="en-US"/>
           </a:p>
@@ -5350,6 +5433,180 @@
   <p:clrMapOvr>
     <a:masterClrMapping/>
   </p:clrMapOvr>
+</p:sldLayout>
+</file>
+
+<file path=ppt/slideLayouts/slideLayout18.xml><?xml version="1.0" encoding="utf-8"?>
+<p:sldLayout xmlns:a="http://schemas.openxmlformats.org/drawingml/2006/main" xmlns:r="http://schemas.openxmlformats.org/officeDocument/2006/relationships" xmlns:p="http://schemas.openxmlformats.org/presentationml/2006/main" type="tx">
+  <p:cSld name="Title &amp; Subtitle">
+    <p:spTree>
+      <p:nvGrpSpPr>
+        <p:cNvPr id="1" name=""/>
+        <p:cNvGrpSpPr/>
+        <p:nvPr/>
+      </p:nvGrpSpPr>
+      <p:grpSpPr>
+        <a:xfrm>
+          <a:off x="0" y="0"/>
+          <a:ext cx="0" cy="0"/>
+          <a:chOff x="0" y="0"/>
+          <a:chExt cx="0" cy="0"/>
+        </a:xfrm>
+      </p:grpSpPr>
+      <p:sp>
+        <p:nvSpPr>
+          <p:cNvPr id="5" name="Shape 5"/>
+          <p:cNvSpPr>
+            <a:spLocks noGrp="1"/>
+          </p:cNvSpPr>
+          <p:nvPr>
+            <p:ph type="title"/>
+          </p:nvPr>
+        </p:nvSpPr>
+        <p:spPr>
+          <a:xfrm>
+            <a:off x="2416969" y="1151930"/>
+            <a:ext cx="7358063" cy="2321719"/>
+          </a:xfrm>
+          <a:prstGeom prst="rect">
+            <a:avLst/>
+          </a:prstGeom>
+        </p:spPr>
+        <p:txBody>
+          <a:bodyPr anchor="b"/>
+          <a:lstStyle/>
+          <a:p>
+            <a:pPr lvl="0">
+              <a:defRPr sz="1800"/>
+            </a:pPr>
+            <a:r>
+              <a:rPr sz="5600"/>
+              <a:t>Title Text</a:t>
+            </a:r>
+          </a:p>
+        </p:txBody>
+      </p:sp>
+      <p:sp>
+        <p:nvSpPr>
+          <p:cNvPr id="6" name="Shape 6"/>
+          <p:cNvSpPr>
+            <a:spLocks noGrp="1"/>
+          </p:cNvSpPr>
+          <p:nvPr>
+            <p:ph type="body" idx="1"/>
+          </p:nvPr>
+        </p:nvSpPr>
+        <p:spPr>
+          <a:xfrm>
+            <a:off x="2416969" y="3536156"/>
+            <a:ext cx="7358063" cy="794743"/>
+          </a:xfrm>
+          <a:prstGeom prst="rect">
+            <a:avLst/>
+          </a:prstGeom>
+        </p:spPr>
+        <p:txBody>
+          <a:bodyPr anchor="t"/>
+          <a:lstStyle>
+            <a:lvl1pPr marL="0" indent="0" algn="ctr">
+              <a:spcBef>
+                <a:spcPts val="0"/>
+              </a:spcBef>
+              <a:buSzTx/>
+              <a:buNone/>
+              <a:defRPr sz="2200"/>
+            </a:lvl1pPr>
+            <a:lvl2pPr marL="0" indent="114300" algn="ctr">
+              <a:spcBef>
+                <a:spcPts val="0"/>
+              </a:spcBef>
+              <a:buSzTx/>
+              <a:buNone/>
+              <a:defRPr sz="2200"/>
+            </a:lvl2pPr>
+            <a:lvl3pPr marL="0" indent="228600" algn="ctr">
+              <a:spcBef>
+                <a:spcPts val="0"/>
+              </a:spcBef>
+              <a:buSzTx/>
+              <a:buNone/>
+              <a:defRPr sz="2200"/>
+            </a:lvl3pPr>
+            <a:lvl4pPr marL="0" indent="342900" algn="ctr">
+              <a:spcBef>
+                <a:spcPts val="0"/>
+              </a:spcBef>
+              <a:buSzTx/>
+              <a:buNone/>
+              <a:defRPr sz="2200"/>
+            </a:lvl4pPr>
+            <a:lvl5pPr marL="0" indent="457200" algn="ctr">
+              <a:spcBef>
+                <a:spcPts val="0"/>
+              </a:spcBef>
+              <a:buSzTx/>
+              <a:buNone/>
+              <a:defRPr sz="2200"/>
+            </a:lvl5pPr>
+          </a:lstStyle>
+          <a:p>
+            <a:pPr lvl="0">
+              <a:defRPr sz="1800"/>
+            </a:pPr>
+            <a:r>
+              <a:rPr sz="2200"/>
+              <a:t>Body Level One</a:t>
+            </a:r>
+          </a:p>
+          <a:p>
+            <a:pPr lvl="1">
+              <a:defRPr sz="1800"/>
+            </a:pPr>
+            <a:r>
+              <a:rPr sz="2200"/>
+              <a:t>Body Level Two</a:t>
+            </a:r>
+          </a:p>
+          <a:p>
+            <a:pPr lvl="2">
+              <a:defRPr sz="1800"/>
+            </a:pPr>
+            <a:r>
+              <a:rPr sz="2200"/>
+              <a:t>Body Level Three</a:t>
+            </a:r>
+          </a:p>
+          <a:p>
+            <a:pPr lvl="3">
+              <a:defRPr sz="1800"/>
+            </a:pPr>
+            <a:r>
+              <a:rPr sz="2200"/>
+              <a:t>Body Level Four</a:t>
+            </a:r>
+          </a:p>
+          <a:p>
+            <a:pPr lvl="4">
+              <a:defRPr sz="1800"/>
+            </a:pPr>
+            <a:r>
+              <a:rPr sz="2200"/>
+              <a:t>Body Level Five</a:t>
+            </a:r>
+          </a:p>
+        </p:txBody>
+      </p:sp>
+    </p:spTree>
+    <p:extLst>
+      <p:ext uri="{BB962C8B-B14F-4D97-AF65-F5344CB8AC3E}">
+        <p14:creationId xmlns:p14="http://schemas.microsoft.com/office/powerpoint/2010/main" val="789088730"/>
+      </p:ext>
+    </p:extLst>
+  </p:cSld>
+  <p:clrMapOvr>
+    <a:masterClrMapping/>
+  </p:clrMapOvr>
+  <p:transition spd="med"/>
 </p:sldLayout>
 </file>
 
@@ -5462,7 +5719,7 @@
           <a:p>
             <a:fld id="{67971B23-299D-4CF4-B59D-A17DAEBDFBC2}" type="datetimeFigureOut">
               <a:rPr lang="en-US" smtClean="0"/>
-              <a:t>7/22/2014</a:t>
+              <a:t>7/30/2014</a:t>
             </a:fld>
             <a:endParaRPr lang="en-US"/>
           </a:p>
@@ -5706,7 +5963,7 @@
           <a:p>
             <a:fld id="{67971B23-299D-4CF4-B59D-A17DAEBDFBC2}" type="datetimeFigureOut">
               <a:rPr lang="en-US" smtClean="0"/>
-              <a:t>7/22/2014</a:t>
+              <a:t>7/30/2014</a:t>
             </a:fld>
             <a:endParaRPr lang="en-US"/>
           </a:p>
@@ -5942,7 +6199,7 @@
           <a:p>
             <a:fld id="{67971B23-299D-4CF4-B59D-A17DAEBDFBC2}" type="datetimeFigureOut">
               <a:rPr lang="en-US" smtClean="0"/>
-              <a:t>7/22/2014</a:t>
+              <a:t>7/30/2014</a:t>
             </a:fld>
             <a:endParaRPr lang="en-US"/>
           </a:p>
@@ -6408,7 +6665,7 @@
           <a:p>
             <a:fld id="{67971B23-299D-4CF4-B59D-A17DAEBDFBC2}" type="datetimeFigureOut">
               <a:rPr lang="en-US" smtClean="0"/>
-              <a:t>7/22/2014</a:t>
+              <a:t>7/30/2014</a:t>
             </a:fld>
             <a:endParaRPr lang="en-US"/>
           </a:p>
@@ -6526,7 +6783,7 @@
           <a:p>
             <a:fld id="{67971B23-299D-4CF4-B59D-A17DAEBDFBC2}" type="datetimeFigureOut">
               <a:rPr lang="en-US" smtClean="0"/>
-              <a:t>7/22/2014</a:t>
+              <a:t>7/30/2014</a:t>
             </a:fld>
             <a:endParaRPr lang="en-US"/>
           </a:p>
@@ -6621,7 +6878,7 @@
           <a:p>
             <a:fld id="{67971B23-299D-4CF4-B59D-A17DAEBDFBC2}" type="datetimeFigureOut">
               <a:rPr lang="en-US" smtClean="0"/>
-              <a:t>7/22/2014</a:t>
+              <a:t>7/30/2014</a:t>
             </a:fld>
             <a:endParaRPr lang="en-US"/>
           </a:p>
@@ -6876,7 +7133,7 @@
           <a:p>
             <a:fld id="{67971B23-299D-4CF4-B59D-A17DAEBDFBC2}" type="datetimeFigureOut">
               <a:rPr lang="en-US" smtClean="0"/>
-              <a:t>7/22/2014</a:t>
+              <a:t>7/30/2014</a:t>
             </a:fld>
             <a:endParaRPr lang="en-US"/>
           </a:p>
@@ -7176,7 +7433,7 @@
           <a:p>
             <a:fld id="{67971B23-299D-4CF4-B59D-A17DAEBDFBC2}" type="datetimeFigureOut">
               <a:rPr lang="en-US" smtClean="0"/>
-              <a:t>7/22/2014</a:t>
+              <a:t>7/30/2014</a:t>
             </a:fld>
             <a:endParaRPr lang="en-US"/>
           </a:p>
@@ -7410,7 +7667,7 @@
           <a:p>
             <a:fld id="{67971B23-299D-4CF4-B59D-A17DAEBDFBC2}" type="datetimeFigureOut">
               <a:rPr lang="en-US" smtClean="0"/>
-              <a:t>7/22/2014</a:t>
+              <a:t>7/30/2014</a:t>
             </a:fld>
             <a:endParaRPr lang="en-US"/>
           </a:p>
@@ -7534,6 +7791,7 @@
     <p:sldLayoutId id="2147483711" r:id="rId15"/>
     <p:sldLayoutId id="2147483712" r:id="rId16"/>
     <p:sldLayoutId id="2147483713" r:id="rId17"/>
+    <p:sldLayoutId id="2147483714" r:id="rId18"/>
   </p:sldLayoutIdLst>
   <p:txStyles>
     <p:titleStyle>
@@ -8643,6 +8901,94 @@
 </p:sld>
 </file>
 
+<file path=ppt/slides/slide11.xml><?xml version="1.0" encoding="utf-8"?>
+<p:sld xmlns:a="http://schemas.openxmlformats.org/drawingml/2006/main" xmlns:r="http://schemas.openxmlformats.org/officeDocument/2006/relationships" xmlns:p="http://schemas.openxmlformats.org/presentationml/2006/main">
+  <p:cSld>
+    <p:spTree>
+      <p:nvGrpSpPr>
+        <p:cNvPr id="1" name=""/>
+        <p:cNvGrpSpPr/>
+        <p:nvPr/>
+      </p:nvGrpSpPr>
+      <p:grpSpPr>
+        <a:xfrm>
+          <a:off x="0" y="0"/>
+          <a:ext cx="0" cy="0"/>
+          <a:chOff x="0" y="0"/>
+          <a:chExt cx="0" cy="0"/>
+        </a:xfrm>
+      </p:grpSpPr>
+      <p:pic>
+        <p:nvPicPr>
+          <p:cNvPr id="50" name="nextYear.png"/>
+          <p:cNvPicPr/>
+          <p:nvPr/>
+        </p:nvPicPr>
+        <p:blipFill>
+          <a:blip r:embed="rId3">
+            <a:extLst/>
+          </a:blip>
+          <a:stretch>
+            <a:fillRect/>
+          </a:stretch>
+        </p:blipFill>
+        <p:spPr>
+          <a:xfrm>
+            <a:off x="3970595" y="1886129"/>
+            <a:ext cx="4250812" cy="3085743"/>
+          </a:xfrm>
+          <a:prstGeom prst="rect">
+            <a:avLst/>
+          </a:prstGeom>
+          <a:ln w="12700">
+            <a:miter lim="400000"/>
+          </a:ln>
+        </p:spPr>
+      </p:pic>
+      <p:sp>
+        <p:nvSpPr>
+          <p:cNvPr id="2" name="TextBox 1"/>
+          <p:cNvSpPr txBox="1"/>
+          <p:nvPr/>
+        </p:nvSpPr>
+        <p:spPr>
+          <a:xfrm>
+            <a:off x="4389636" y="526943"/>
+            <a:ext cx="3412729" cy="584775"/>
+          </a:xfrm>
+          <a:prstGeom prst="rect">
+            <a:avLst/>
+          </a:prstGeom>
+          <a:noFill/>
+        </p:spPr>
+        <p:txBody>
+          <a:bodyPr wrap="none" rtlCol="0">
+            <a:spAutoFit/>
+          </a:bodyPr>
+          <a:lstStyle/>
+          <a:p>
+            <a:r>
+              <a:rPr lang="en-US" sz="3200" dirty="0" smtClean="0"/>
+              <a:t>See you next year…</a:t>
+            </a:r>
+            <a:endParaRPr lang="en-US" sz="3200" dirty="0"/>
+          </a:p>
+        </p:txBody>
+      </p:sp>
+    </p:spTree>
+    <p:extLst>
+      <p:ext uri="{BB962C8B-B14F-4D97-AF65-F5344CB8AC3E}">
+        <p14:creationId xmlns:p14="http://schemas.microsoft.com/office/powerpoint/2010/main" val="770339461"/>
+      </p:ext>
+    </p:extLst>
+  </p:cSld>
+  <p:clrMapOvr>
+    <a:masterClrMapping/>
+  </p:clrMapOvr>
+  <p:transition spd="med"/>
+</p:sld>
+</file>
+
 <file path=ppt/slides/slide2.xml><?xml version="1.0" encoding="utf-8"?>
 <p:sld xmlns:a="http://schemas.openxmlformats.org/drawingml/2006/main" xmlns:r="http://schemas.openxmlformats.org/officeDocument/2006/relationships" xmlns:p="http://schemas.openxmlformats.org/presentationml/2006/main">
   <p:cSld>
@@ -8660,629 +9006,314 @@
           <a:chExt cx="0" cy="0"/>
         </a:xfrm>
       </p:grpSpPr>
-      <p:sp>
-        <p:nvSpPr>
-          <p:cNvPr id="2" name="Title 1"/>
-          <p:cNvSpPr>
-            <a:spLocks noGrp="1"/>
-          </p:cNvSpPr>
-          <p:nvPr>
-            <p:ph type="title"/>
-          </p:nvPr>
-        </p:nvSpPr>
-        <p:spPr>
-          <a:xfrm>
-            <a:off x="743474" y="0"/>
-            <a:ext cx="10353762" cy="747293"/>
-          </a:xfrm>
-        </p:spPr>
-        <p:txBody>
-          <a:bodyPr>
-            <a:normAutofit/>
-          </a:bodyPr>
-          <a:lstStyle/>
-          <a:p>
-            <a:r>
-              <a:rPr lang="en-US" dirty="0" smtClean="0"/>
-              <a:t>That Conference 2014 Sponsors</a:t>
-            </a:r>
-            <a:endParaRPr lang="en-US" dirty="0"/>
-          </a:p>
-        </p:txBody>
-      </p:sp>
       <p:pic>
         <p:nvPicPr>
-          <p:cNvPr id="2050" name="Picture 2" descr="https://thatconference.blob.core.windows.net/sponsorimages/ibm.jpg"/>
-          <p:cNvPicPr>
-            <a:picLocks noGrp="1" noChangeAspect="1" noChangeArrowheads="1"/>
-          </p:cNvPicPr>
-          <p:nvPr>
-            <p:ph idx="1"/>
-          </p:nvPr>
+          <p:cNvPr id="35" name="API-plat.jpg"/>
+          <p:cNvPicPr/>
+          <p:nvPr/>
         </p:nvPicPr>
         <p:blipFill>
           <a:blip r:embed="rId3">
-            <a:extLst>
-              <a:ext uri="{28A0092B-C50C-407E-A947-70E740481C1C}">
-                <a14:useLocalDpi xmlns:a14="http://schemas.microsoft.com/office/drawing/2010/main" val="0"/>
-              </a:ext>
-            </a:extLst>
+            <a:extLst/>
           </a:blip>
-          <a:srcRect/>
           <a:stretch>
             <a:fillRect/>
           </a:stretch>
         </p:blipFill>
-        <p:spPr bwMode="auto">
-          <a:xfrm>
-            <a:off x="243254" y="818421"/>
-            <a:ext cx="2716924" cy="2047731"/>
+        <p:spPr>
+          <a:xfrm>
+            <a:off x="3387701" y="2645678"/>
+            <a:ext cx="2578101" cy="1943101"/>
           </a:xfrm>
           <a:prstGeom prst="rect">
             <a:avLst/>
           </a:prstGeom>
-          <a:noFill/>
+          <a:ln w="12700">
+            <a:miter lim="400000"/>
+          </a:ln>
         </p:spPr>
       </p:pic>
       <p:pic>
         <p:nvPicPr>
-          <p:cNvPr id="2052" name="Picture 4" descr="https://thatconference.blob.core.windows.net/sponsorimages/InRule-Plat.jpg"/>
-          <p:cNvPicPr>
-            <a:picLocks noChangeAspect="1" noChangeArrowheads="1"/>
-          </p:cNvPicPr>
+          <p:cNvPr id="36" name="InRule-Plat.jpg"/>
+          <p:cNvPicPr/>
           <p:nvPr/>
         </p:nvPicPr>
         <p:blipFill>
           <a:blip r:embed="rId4">
-            <a:extLst>
-              <a:ext uri="{28A0092B-C50C-407E-A947-70E740481C1C}">
-                <a14:useLocalDpi xmlns:a14="http://schemas.microsoft.com/office/drawing/2010/main" val="0"/>
-              </a:ext>
-            </a:extLst>
+            <a:extLst/>
           </a:blip>
-          <a:srcRect/>
           <a:stretch>
             <a:fillRect/>
           </a:stretch>
         </p:blipFill>
-        <p:spPr bwMode="auto">
-          <a:xfrm>
-            <a:off x="3203431" y="818421"/>
-            <a:ext cx="2716924" cy="2047731"/>
+        <p:spPr>
+          <a:xfrm>
+            <a:off x="549202" y="2645678"/>
+            <a:ext cx="2578101" cy="1943101"/>
           </a:xfrm>
           <a:prstGeom prst="rect">
             <a:avLst/>
           </a:prstGeom>
-          <a:noFill/>
+          <a:ln w="12700">
+            <a:miter lim="400000"/>
+          </a:ln>
         </p:spPr>
       </p:pic>
       <p:pic>
         <p:nvPicPr>
-          <p:cNvPr id="2054" name="Picture 6" descr="https://thatconference.blob.core.windows.net/sponsorimages/API-plat.jpg"/>
-          <p:cNvPicPr>
-            <a:picLocks noChangeAspect="1" noChangeArrowheads="1"/>
-          </p:cNvPicPr>
+          <p:cNvPr id="37" name="paypalBraintree.jpg"/>
+          <p:cNvPicPr/>
           <p:nvPr/>
         </p:nvPicPr>
         <p:blipFill>
           <a:blip r:embed="rId5">
-            <a:extLst>
-              <a:ext uri="{28A0092B-C50C-407E-A947-70E740481C1C}">
-                <a14:useLocalDpi xmlns:a14="http://schemas.microsoft.com/office/drawing/2010/main" val="0"/>
-              </a:ext>
-            </a:extLst>
+            <a:extLst/>
           </a:blip>
-          <a:srcRect/>
           <a:stretch>
             <a:fillRect/>
           </a:stretch>
         </p:blipFill>
-        <p:spPr bwMode="auto">
-          <a:xfrm>
-            <a:off x="6184413" y="818421"/>
-            <a:ext cx="2680615" cy="2020365"/>
+        <p:spPr>
+          <a:xfrm>
+            <a:off x="9064698" y="2645678"/>
+            <a:ext cx="2578101" cy="1943101"/>
           </a:xfrm>
           <a:prstGeom prst="rect">
             <a:avLst/>
           </a:prstGeom>
-          <a:noFill/>
+          <a:ln w="12700">
+            <a:miter lim="400000"/>
+          </a:ln>
         </p:spPr>
       </p:pic>
       <p:pic>
         <p:nvPicPr>
-          <p:cNvPr id="2056" name="Picture 8" descr="https://thatconference.blob.core.windows.net/sponsorimages/wordpress-com.jpg"/>
-          <p:cNvPicPr>
-            <a:picLocks noChangeAspect="1" noChangeArrowheads="1"/>
-          </p:cNvPicPr>
+          <p:cNvPr id="38" name="wordpress-com.jpg"/>
+          <p:cNvPicPr/>
           <p:nvPr/>
         </p:nvPicPr>
         <p:blipFill>
           <a:blip r:embed="rId6">
-            <a:extLst>
-              <a:ext uri="{28A0092B-C50C-407E-A947-70E740481C1C}">
-                <a14:useLocalDpi xmlns:a14="http://schemas.microsoft.com/office/drawing/2010/main" val="0"/>
-              </a:ext>
-            </a:extLst>
+            <a:extLst/>
           </a:blip>
-          <a:srcRect/>
           <a:stretch>
             <a:fillRect/>
           </a:stretch>
         </p:blipFill>
-        <p:spPr bwMode="auto">
-          <a:xfrm>
-            <a:off x="9129086" y="818421"/>
-            <a:ext cx="2680615" cy="2020365"/>
+        <p:spPr>
+          <a:xfrm>
+            <a:off x="6226199" y="2645678"/>
+            <a:ext cx="2578101" cy="1943101"/>
           </a:xfrm>
           <a:prstGeom prst="rect">
             <a:avLst/>
           </a:prstGeom>
-          <a:noFill/>
+          <a:ln w="12700">
+            <a:miter lim="400000"/>
+          </a:ln>
         </p:spPr>
       </p:pic>
       <p:pic>
         <p:nvPicPr>
-          <p:cNvPr id="2058" name="Picture 10" descr="https://thatconference.blob.core.windows.net/sponsorimages/skyline.png"/>
-          <p:cNvPicPr>
-            <a:picLocks noChangeAspect="1" noChangeArrowheads="1"/>
-          </p:cNvPicPr>
+          <p:cNvPr id="39" name="gold-1-skyline.jpg"/>
+          <p:cNvPicPr/>
           <p:nvPr/>
         </p:nvPicPr>
         <p:blipFill>
           <a:blip r:embed="rId7">
-            <a:extLst>
-              <a:ext uri="{28A0092B-C50C-407E-A947-70E740481C1C}">
-                <a14:useLocalDpi xmlns:a14="http://schemas.microsoft.com/office/drawing/2010/main" val="0"/>
-              </a:ext>
-            </a:extLst>
+            <a:extLst/>
           </a:blip>
-          <a:srcRect/>
           <a:stretch>
             <a:fillRect/>
           </a:stretch>
         </p:blipFill>
-        <p:spPr bwMode="auto">
-          <a:xfrm>
-            <a:off x="565931" y="3003178"/>
-            <a:ext cx="2071570" cy="1381046"/>
+        <p:spPr>
+          <a:xfrm>
+            <a:off x="1163812" y="4701353"/>
+            <a:ext cx="1270001" cy="1270001"/>
           </a:xfrm>
           <a:prstGeom prst="rect">
             <a:avLst/>
           </a:prstGeom>
-          <a:noFill/>
+          <a:ln w="12700">
+            <a:miter lim="400000"/>
+          </a:ln>
         </p:spPr>
       </p:pic>
       <p:pic>
         <p:nvPicPr>
-          <p:cNvPr id="2060" name="Picture 12" descr="https://thatconference.blob.core.windows.net/sponsorimages/safenet.png"/>
-          <p:cNvPicPr>
-            <a:picLocks noChangeAspect="1" noChangeArrowheads="1"/>
-          </p:cNvPicPr>
+          <p:cNvPr id="40" name="gold-6-ts.jpg"/>
+          <p:cNvPicPr/>
           <p:nvPr/>
         </p:nvPicPr>
         <p:blipFill>
           <a:blip r:embed="rId8">
-            <a:extLst>
-              <a:ext uri="{28A0092B-C50C-407E-A947-70E740481C1C}">
-                <a14:useLocalDpi xmlns:a14="http://schemas.microsoft.com/office/drawing/2010/main" val="0"/>
-              </a:ext>
-            </a:extLst>
+            <a:extLst/>
           </a:blip>
-          <a:srcRect/>
           <a:stretch>
             <a:fillRect/>
           </a:stretch>
         </p:blipFill>
-        <p:spPr bwMode="auto">
-          <a:xfrm>
-            <a:off x="2787535" y="3003178"/>
-            <a:ext cx="2071570" cy="1381046"/>
+        <p:spPr>
+          <a:xfrm>
+            <a:off x="9758188" y="4701353"/>
+            <a:ext cx="1270001" cy="1270001"/>
           </a:xfrm>
           <a:prstGeom prst="rect">
             <a:avLst/>
           </a:prstGeom>
-          <a:noFill/>
+          <a:ln w="12700">
+            <a:miter lim="400000"/>
+          </a:ln>
         </p:spPr>
       </p:pic>
       <p:pic>
         <p:nvPicPr>
-          <p:cNvPr id="2062" name="Picture 14" descr="https://thatconference.blob.core.windows.net/sponsorimages/devExpress.jpg"/>
-          <p:cNvPicPr>
-            <a:picLocks noChangeAspect="1" noChangeArrowheads="1"/>
-          </p:cNvPicPr>
+          <p:cNvPr id="41" name="gold-2-safenet.jpg"/>
+          <p:cNvPicPr/>
           <p:nvPr/>
         </p:nvPicPr>
         <p:blipFill>
           <a:blip r:embed="rId9">
-            <a:extLst>
-              <a:ext uri="{28A0092B-C50C-407E-A947-70E740481C1C}">
-                <a14:useLocalDpi xmlns:a14="http://schemas.microsoft.com/office/drawing/2010/main" val="0"/>
-              </a:ext>
-            </a:extLst>
+            <a:extLst/>
           </a:blip>
-          <a:srcRect/>
           <a:stretch>
             <a:fillRect/>
           </a:stretch>
         </p:blipFill>
-        <p:spPr bwMode="auto">
-          <a:xfrm>
-            <a:off x="5009139" y="3003178"/>
-            <a:ext cx="2071570" cy="1381046"/>
+        <p:spPr>
+          <a:xfrm>
+            <a:off x="2882687" y="4701353"/>
+            <a:ext cx="1270001" cy="1270001"/>
           </a:xfrm>
           <a:prstGeom prst="rect">
             <a:avLst/>
           </a:prstGeom>
-          <a:noFill/>
+          <a:ln w="12700">
+            <a:miter lim="400000"/>
+          </a:ln>
         </p:spPr>
       </p:pic>
       <p:pic>
         <p:nvPicPr>
-          <p:cNvPr id="2064" name="Picture 16" descr="https://thatconference.blob.core.windows.net/sponsorimages/onmi.jpg"/>
-          <p:cNvPicPr>
-            <a:picLocks noChangeAspect="1" noChangeArrowheads="1"/>
-          </p:cNvPicPr>
+          <p:cNvPr id="42" name="gold-3-devexpress.jpg"/>
+          <p:cNvPicPr/>
           <p:nvPr/>
         </p:nvPicPr>
         <p:blipFill>
           <a:blip r:embed="rId10">
-            <a:extLst>
-              <a:ext uri="{28A0092B-C50C-407E-A947-70E740481C1C}">
-                <a14:useLocalDpi xmlns:a14="http://schemas.microsoft.com/office/drawing/2010/main" val="0"/>
-              </a:ext>
-            </a:extLst>
+            <a:extLst/>
           </a:blip>
-          <a:srcRect/>
           <a:stretch>
             <a:fillRect/>
           </a:stretch>
         </p:blipFill>
-        <p:spPr bwMode="auto">
-          <a:xfrm>
-            <a:off x="9452347" y="3003178"/>
-            <a:ext cx="2071570" cy="1381046"/>
+        <p:spPr>
+          <a:xfrm>
+            <a:off x="4601562" y="4701353"/>
+            <a:ext cx="1270001" cy="1270001"/>
           </a:xfrm>
           <a:prstGeom prst="rect">
             <a:avLst/>
           </a:prstGeom>
-          <a:noFill/>
+          <a:ln w="12700">
+            <a:miter lim="400000"/>
+          </a:ln>
         </p:spPr>
       </p:pic>
       <p:pic>
         <p:nvPicPr>
-          <p:cNvPr id="2066" name="Picture 18" descr="https://thatconference.blob.core.windows.net/sponsorimages/corvisa.jpg"/>
-          <p:cNvPicPr>
-            <a:picLocks noChangeAspect="1" noChangeArrowheads="1"/>
-          </p:cNvPicPr>
+          <p:cNvPr id="43" name="gold-4-omni.jpg"/>
+          <p:cNvPicPr/>
           <p:nvPr/>
         </p:nvPicPr>
         <p:blipFill>
           <a:blip r:embed="rId11">
-            <a:extLst>
-              <a:ext uri="{28A0092B-C50C-407E-A947-70E740481C1C}">
-                <a14:useLocalDpi xmlns:a14="http://schemas.microsoft.com/office/drawing/2010/main" val="0"/>
-              </a:ext>
-            </a:extLst>
+            <a:extLst/>
           </a:blip>
-          <a:srcRect/>
           <a:stretch>
             <a:fillRect/>
           </a:stretch>
         </p:blipFill>
-        <p:spPr bwMode="auto">
-          <a:xfrm>
-            <a:off x="7230743" y="3003178"/>
-            <a:ext cx="2071570" cy="1381046"/>
+        <p:spPr>
+          <a:xfrm>
+            <a:off x="6320438" y="4701353"/>
+            <a:ext cx="1270001" cy="1270001"/>
           </a:xfrm>
           <a:prstGeom prst="rect">
             <a:avLst/>
           </a:prstGeom>
-          <a:noFill/>
+          <a:ln w="12700">
+            <a:miter lim="400000"/>
+          </a:ln>
         </p:spPr>
       </p:pic>
-      <p:grpSp>
-        <p:nvGrpSpPr>
-          <p:cNvPr id="7" name="Group 6"/>
-          <p:cNvGrpSpPr/>
+      <p:pic>
+        <p:nvPicPr>
+          <p:cNvPr id="44" name="gold-5-corvisa.jpg"/>
+          <p:cNvPicPr/>
           <p:nvPr/>
-        </p:nvGrpSpPr>
-        <p:grpSpPr>
-          <a:xfrm>
-            <a:off x="565931" y="4521250"/>
-            <a:ext cx="4043014" cy="1317170"/>
-            <a:chOff x="1131186" y="4521250"/>
-            <a:chExt cx="4378637" cy="1426512"/>
-          </a:xfrm>
-        </p:grpSpPr>
-        <p:pic>
-          <p:nvPicPr>
-            <p:cNvPr id="2068" name="Picture 20" descr="https://thatconference.blob.core.windows.net/sponsorimages/sonomaPartners.jpg"/>
-            <p:cNvPicPr>
-              <a:picLocks noChangeAspect="1" noChangeArrowheads="1"/>
-            </p:cNvPicPr>
-            <p:nvPr/>
-          </p:nvPicPr>
-          <p:blipFill>
-            <a:blip r:embed="rId12">
-              <a:extLst>
-                <a:ext uri="{28A0092B-C50C-407E-A947-70E740481C1C}">
-                  <a14:useLocalDpi xmlns:a14="http://schemas.microsoft.com/office/drawing/2010/main" val="0"/>
-                </a:ext>
-              </a:extLst>
-            </a:blip>
-            <a:srcRect/>
-            <a:stretch>
-              <a:fillRect/>
-            </a:stretch>
-          </p:blipFill>
-          <p:spPr bwMode="auto">
-            <a:xfrm>
-              <a:off x="1131186" y="4521250"/>
-              <a:ext cx="2139768" cy="1426512"/>
-            </a:xfrm>
-            <a:prstGeom prst="rect">
-              <a:avLst/>
-            </a:prstGeom>
-            <a:noFill/>
-          </p:spPr>
-        </p:pic>
-        <p:pic>
-          <p:nvPicPr>
-            <p:cNvPr id="2070" name="Picture 22" descr="https://thatconference.blob.core.windows.net/sponsorimages/jetbrains.jpg"/>
-            <p:cNvPicPr>
-              <a:picLocks noChangeAspect="1" noChangeArrowheads="1"/>
-            </p:cNvPicPr>
-            <p:nvPr/>
-          </p:nvPicPr>
-          <p:blipFill>
-            <a:blip r:embed="rId13">
-              <a:extLst>
-                <a:ext uri="{28A0092B-C50C-407E-A947-70E740481C1C}">
-                  <a14:useLocalDpi xmlns:a14="http://schemas.microsoft.com/office/drawing/2010/main" val="0"/>
-                </a:ext>
-              </a:extLst>
-            </a:blip>
-            <a:srcRect/>
-            <a:stretch>
-              <a:fillRect/>
-            </a:stretch>
-          </p:blipFill>
-          <p:spPr bwMode="auto">
-            <a:xfrm>
-              <a:off x="3370055" y="4521250"/>
-              <a:ext cx="2139768" cy="1426512"/>
-            </a:xfrm>
-            <a:prstGeom prst="rect">
-              <a:avLst/>
-            </a:prstGeom>
-            <a:noFill/>
-          </p:spPr>
-        </p:pic>
-      </p:grpSp>
-      <p:grpSp>
-        <p:nvGrpSpPr>
-          <p:cNvPr id="8" name="Group 7"/>
-          <p:cNvGrpSpPr/>
+        </p:nvPicPr>
+        <p:blipFill>
+          <a:blip r:embed="rId12">
+            <a:extLst/>
+          </a:blip>
+          <a:stretch>
+            <a:fillRect/>
+          </a:stretch>
+        </p:blipFill>
+        <p:spPr>
+          <a:xfrm>
+            <a:off x="8039313" y="4701353"/>
+            <a:ext cx="1270001" cy="1270001"/>
+          </a:xfrm>
+          <a:prstGeom prst="rect">
+            <a:avLst/>
+          </a:prstGeom>
+          <a:ln w="12700">
+            <a:miter lim="400000"/>
+          </a:ln>
+        </p:spPr>
+      </p:pic>
+      <p:pic>
+        <p:nvPicPr>
+          <p:cNvPr id="45" name="ibm.png"/>
+          <p:cNvPicPr/>
           <p:nvPr/>
-        </p:nvGrpSpPr>
-        <p:grpSpPr>
-          <a:xfrm>
-            <a:off x="6436427" y="4545157"/>
-            <a:ext cx="5087490" cy="2271421"/>
-            <a:chOff x="5174110" y="4513232"/>
-            <a:chExt cx="5256971" cy="2347090"/>
-          </a:xfrm>
-        </p:grpSpPr>
-        <p:pic>
-          <p:nvPicPr>
-            <p:cNvPr id="2072" name="Picture 24" descr="https://thatconference.blob.core.windows.net/sponsorimages/jjkeller.png"/>
-            <p:cNvPicPr>
-              <a:picLocks noChangeAspect="1" noChangeArrowheads="1"/>
-            </p:cNvPicPr>
-            <p:nvPr/>
-          </p:nvPicPr>
-          <p:blipFill>
-            <a:blip r:embed="rId14">
-              <a:extLst>
-                <a:ext uri="{28A0092B-C50C-407E-A947-70E740481C1C}">
-                  <a14:useLocalDpi xmlns:a14="http://schemas.microsoft.com/office/drawing/2010/main" val="0"/>
-                </a:ext>
-              </a:extLst>
-            </a:blip>
-            <a:srcRect/>
-            <a:stretch>
-              <a:fillRect/>
-            </a:stretch>
-          </p:blipFill>
-          <p:spPr bwMode="auto">
-            <a:xfrm>
-              <a:off x="6964605" y="5736844"/>
-              <a:ext cx="1685217" cy="1123478"/>
-            </a:xfrm>
-            <a:prstGeom prst="rect">
-              <a:avLst/>
-            </a:prstGeom>
-            <a:noFill/>
-          </p:spPr>
-        </p:pic>
-        <p:pic>
-          <p:nvPicPr>
-            <p:cNvPr id="2074" name="Picture 26" descr="https://thatconference.blob.core.windows.net/sponsorimages/nrc.jpg"/>
-            <p:cNvPicPr>
-              <a:picLocks noChangeAspect="1" noChangeArrowheads="1"/>
-            </p:cNvPicPr>
-            <p:nvPr/>
-          </p:nvPicPr>
-          <p:blipFill>
-            <a:blip r:embed="rId15">
-              <a:extLst>
-                <a:ext uri="{28A0092B-C50C-407E-A947-70E740481C1C}">
-                  <a14:useLocalDpi xmlns:a14="http://schemas.microsoft.com/office/drawing/2010/main" val="0"/>
-                </a:ext>
-              </a:extLst>
-            </a:blip>
-            <a:srcRect/>
-            <a:stretch>
-              <a:fillRect/>
-            </a:stretch>
-          </p:blipFill>
-          <p:spPr bwMode="auto">
-            <a:xfrm>
-              <a:off x="5174110" y="5734522"/>
-              <a:ext cx="1685217" cy="1123478"/>
-            </a:xfrm>
-            <a:prstGeom prst="rect">
-              <a:avLst/>
-            </a:prstGeom>
-            <a:noFill/>
-          </p:spPr>
-        </p:pic>
-        <p:pic>
-          <p:nvPicPr>
-            <p:cNvPr id="2076" name="Picture 28" descr="https://thatconference.blob.core.windows.net/sponsorimages/MSFT.png"/>
-            <p:cNvPicPr>
-              <a:picLocks noChangeAspect="1" noChangeArrowheads="1"/>
-            </p:cNvPicPr>
-            <p:nvPr/>
-          </p:nvPicPr>
-          <p:blipFill>
-            <a:blip r:embed="rId16">
-              <a:extLst>
-                <a:ext uri="{28A0092B-C50C-407E-A947-70E740481C1C}">
-                  <a14:useLocalDpi xmlns:a14="http://schemas.microsoft.com/office/drawing/2010/main" val="0"/>
-                </a:ext>
-              </a:extLst>
-            </a:blip>
-            <a:srcRect/>
-            <a:stretch>
-              <a:fillRect/>
-            </a:stretch>
-          </p:blipFill>
-          <p:spPr bwMode="auto">
-            <a:xfrm>
-              <a:off x="5174110" y="4525557"/>
-              <a:ext cx="1685217" cy="1123478"/>
-            </a:xfrm>
-            <a:prstGeom prst="rect">
-              <a:avLst/>
-            </a:prstGeom>
-            <a:noFill/>
-          </p:spPr>
-        </p:pic>
-        <p:pic>
-          <p:nvPicPr>
-            <p:cNvPr id="2078" name="Picture 30" descr="https://thatconference.blob.core.windows.net/sponsorimages/centare.jpg"/>
-            <p:cNvPicPr>
-              <a:picLocks noChangeAspect="1" noChangeArrowheads="1"/>
-            </p:cNvPicPr>
-            <p:nvPr/>
-          </p:nvPicPr>
-          <p:blipFill>
-            <a:blip r:embed="rId17">
-              <a:extLst>
-                <a:ext uri="{28A0092B-C50C-407E-A947-70E740481C1C}">
-                  <a14:useLocalDpi xmlns:a14="http://schemas.microsoft.com/office/drawing/2010/main" val="0"/>
-                </a:ext>
-              </a:extLst>
-            </a:blip>
-            <a:srcRect/>
-            <a:stretch>
-              <a:fillRect/>
-            </a:stretch>
-          </p:blipFill>
-          <p:spPr bwMode="auto">
-            <a:xfrm>
-              <a:off x="6958428" y="4515511"/>
-              <a:ext cx="1685217" cy="1123478"/>
-            </a:xfrm>
-            <a:prstGeom prst="rect">
-              <a:avLst/>
-            </a:prstGeom>
-            <a:noFill/>
-          </p:spPr>
-        </p:pic>
-        <p:pic>
-          <p:nvPicPr>
-            <p:cNvPr id="2080" name="Picture 32" descr="https://thatconference.blob.core.windows.net/sponsorimages/exacta.jpg"/>
-            <p:cNvPicPr>
-              <a:picLocks noChangeAspect="1" noChangeArrowheads="1"/>
-            </p:cNvPicPr>
-            <p:nvPr/>
-          </p:nvPicPr>
-          <p:blipFill>
-            <a:blip r:embed="rId18">
-              <a:extLst>
-                <a:ext uri="{28A0092B-C50C-407E-A947-70E740481C1C}">
-                  <a14:useLocalDpi xmlns:a14="http://schemas.microsoft.com/office/drawing/2010/main" val="0"/>
-                </a:ext>
-              </a:extLst>
-            </a:blip>
-            <a:srcRect/>
-            <a:stretch>
-              <a:fillRect/>
-            </a:stretch>
-          </p:blipFill>
-          <p:spPr bwMode="auto">
-            <a:xfrm>
-              <a:off x="8733510" y="4513232"/>
-              <a:ext cx="1685217" cy="1123478"/>
-            </a:xfrm>
-            <a:prstGeom prst="rect">
-              <a:avLst/>
-            </a:prstGeom>
-            <a:noFill/>
-          </p:spPr>
-        </p:pic>
-        <p:pic>
-          <p:nvPicPr>
-            <p:cNvPr id="2082" name="Picture 34" descr="https://thatconference.blob.core.windows.net/sponsorimages/c1.png"/>
-            <p:cNvPicPr>
-              <a:picLocks noChangeAspect="1" noChangeArrowheads="1"/>
-            </p:cNvPicPr>
-            <p:nvPr/>
-          </p:nvPicPr>
-          <p:blipFill>
-            <a:blip r:embed="rId19">
-              <a:extLst>
-                <a:ext uri="{28A0092B-C50C-407E-A947-70E740481C1C}">
-                  <a14:useLocalDpi xmlns:a14="http://schemas.microsoft.com/office/drawing/2010/main" val="0"/>
-                </a:ext>
-              </a:extLst>
-            </a:blip>
-            <a:srcRect/>
-            <a:stretch>
-              <a:fillRect/>
-            </a:stretch>
-          </p:blipFill>
-          <p:spPr bwMode="auto">
-            <a:xfrm>
-              <a:off x="8745864" y="5728774"/>
-              <a:ext cx="1685217" cy="1123478"/>
-            </a:xfrm>
-            <a:prstGeom prst="rect">
-              <a:avLst/>
-            </a:prstGeom>
-            <a:noFill/>
-          </p:spPr>
-        </p:pic>
-      </p:grpSp>
+        </p:nvPicPr>
+        <p:blipFill>
+          <a:blip r:embed="rId13">
+            <a:extLst/>
+          </a:blip>
+          <a:stretch>
+            <a:fillRect/>
+          </a:stretch>
+        </p:blipFill>
+        <p:spPr>
+          <a:xfrm>
+            <a:off x="3885817" y="683723"/>
+            <a:ext cx="4420367" cy="1771891"/>
+          </a:xfrm>
+          <a:prstGeom prst="rect">
+            <a:avLst/>
+          </a:prstGeom>
+          <a:ln w="12700">
+            <a:miter lim="400000"/>
+          </a:ln>
+        </p:spPr>
+      </p:pic>
     </p:spTree>
     <p:extLst>
       <p:ext uri="{BB962C8B-B14F-4D97-AF65-F5344CB8AC3E}">
-        <p14:creationId xmlns:p14="http://schemas.microsoft.com/office/powerpoint/2010/main" val="2316687795"/>
+        <p14:creationId xmlns:p14="http://schemas.microsoft.com/office/powerpoint/2010/main" val="429349011"/>
       </p:ext>
     </p:extLst>
   </p:cSld>
   <p:clrMapOvr>
     <a:masterClrMapping/>
   </p:clrMapOvr>
-  <p:timing>
-    <p:tnLst>
-      <p:par>
-        <p:cTn id="1" dur="indefinite" restart="never" nodeType="tmRoot"/>
-      </p:par>
-    </p:tnLst>
-  </p:timing>
+  <p:transition spd="med"/>
 </p:sld>
 </file>
 

</xml_diff>